<commit_message>
fixed figure 3  (whew!)
</commit_message>
<xml_diff>
--- a/journalWallFriction/pictures/pdf/irregular.pptx
+++ b/journalWallFriction/pictures/pdf/irregular.pptx
@@ -2,7 +2,7 @@
 <file path=ppt/presentation.xml><?xml version="1.0" encoding="utf-8"?>
 <p:presentation xmlns:a="http://schemas.openxmlformats.org/drawingml/2006/main" xmlns:r="http://schemas.openxmlformats.org/officeDocument/2006/relationships" xmlns:p="http://schemas.openxmlformats.org/presentationml/2006/main" saveSubsetFonts="1" autoCompressPictures="0">
   <p:sldMasterIdLst>
-    <p:sldMasterId id="2147483672" r:id="rId1"/>
+    <p:sldMasterId id="2147483684" r:id="rId1"/>
   </p:sldMasterIdLst>
   <p:notesMasterIdLst>
     <p:notesMasterId r:id="rId3"/>
@@ -10,7 +10,7 @@
   <p:sldIdLst>
     <p:sldId id="256" r:id="rId2"/>
   </p:sldIdLst>
-  <p:sldSz cx="12192000" cy="5943600"/>
+  <p:sldSz cx="12192000" cy="5486400"/>
   <p:notesSz cx="6858000" cy="9144000"/>
   <p:defaultTextStyle>
     <a:defPPr>
@@ -197,7 +197,7 @@
           <a:p>
             <a:fld id="{BE0D1828-7A1F-8649-BBE7-FF1FCC77B9E3}" type="datetimeFigureOut">
               <a:rPr lang="en-US" smtClean="0"/>
-              <a:t>5/30/18</a:t>
+              <a:t>12/7/18</a:t>
             </a:fld>
             <a:endParaRPr lang="en-US"/>
           </a:p>
@@ -215,8 +215,8 @@
         </p:nvSpPr>
         <p:spPr>
           <a:xfrm>
-            <a:off x="265113" y="1143000"/>
-            <a:ext cx="6327775" cy="3086100"/>
+            <a:off x="0" y="1143000"/>
+            <a:ext cx="6858000" cy="3086100"/>
           </a:xfrm>
           <a:prstGeom prst="rect">
             <a:avLst/>
@@ -493,8 +493,8 @@
         </p:nvSpPr>
         <p:spPr>
           <a:xfrm>
-            <a:off x="265113" y="1143000"/>
-            <a:ext cx="6327775" cy="3086100"/>
+            <a:off x="0" y="1143000"/>
+            <a:ext cx="6858000" cy="3086100"/>
           </a:xfrm>
         </p:spPr>
       </p:sp>
@@ -582,15 +582,15 @@
         </p:nvSpPr>
         <p:spPr>
           <a:xfrm>
-            <a:off x="1524000" y="972715"/>
-            <a:ext cx="9144000" cy="2069253"/>
+            <a:off x="1524000" y="897890"/>
+            <a:ext cx="9144000" cy="1910080"/>
           </a:xfrm>
         </p:spPr>
         <p:txBody>
           <a:bodyPr anchor="b"/>
           <a:lstStyle>
             <a:lvl1pPr algn="ctr">
-              <a:defRPr sz="5200"/>
+              <a:defRPr sz="4800"/>
             </a:lvl1pPr>
           </a:lstStyle>
           <a:p>
@@ -614,8 +614,8 @@
         </p:nvSpPr>
         <p:spPr>
           <a:xfrm>
-            <a:off x="1524000" y="3121766"/>
-            <a:ext cx="9144000" cy="1434994"/>
+            <a:off x="1524000" y="2881630"/>
+            <a:ext cx="9144000" cy="1324610"/>
           </a:xfrm>
         </p:spPr>
         <p:txBody>
@@ -623,39 +623,39 @@
           <a:lstStyle>
             <a:lvl1pPr marL="0" indent="0" algn="ctr">
               <a:buNone/>
-              <a:defRPr sz="2080"/>
+              <a:defRPr sz="1920"/>
             </a:lvl1pPr>
-            <a:lvl2pPr marL="396255" indent="0" algn="ctr">
-              <a:buNone/>
-              <a:defRPr sz="1733"/>
+            <a:lvl2pPr marL="365760" indent="0" algn="ctr">
+              <a:buNone/>
+              <a:defRPr sz="1600"/>
             </a:lvl2pPr>
-            <a:lvl3pPr marL="792510" indent="0" algn="ctr">
-              <a:buNone/>
-              <a:defRPr sz="1560"/>
+            <a:lvl3pPr marL="731520" indent="0" algn="ctr">
+              <a:buNone/>
+              <a:defRPr sz="1440"/>
             </a:lvl3pPr>
-            <a:lvl4pPr marL="1188766" indent="0" algn="ctr">
-              <a:buNone/>
-              <a:defRPr sz="1387"/>
+            <a:lvl4pPr marL="1097280" indent="0" algn="ctr">
+              <a:buNone/>
+              <a:defRPr sz="1280"/>
             </a:lvl4pPr>
-            <a:lvl5pPr marL="1585021" indent="0" algn="ctr">
-              <a:buNone/>
-              <a:defRPr sz="1387"/>
+            <a:lvl5pPr marL="1463040" indent="0" algn="ctr">
+              <a:buNone/>
+              <a:defRPr sz="1280"/>
             </a:lvl5pPr>
-            <a:lvl6pPr marL="1981276" indent="0" algn="ctr">
-              <a:buNone/>
-              <a:defRPr sz="1387"/>
+            <a:lvl6pPr marL="1828800" indent="0" algn="ctr">
+              <a:buNone/>
+              <a:defRPr sz="1280"/>
             </a:lvl6pPr>
-            <a:lvl7pPr marL="2377531" indent="0" algn="ctr">
-              <a:buNone/>
-              <a:defRPr sz="1387"/>
+            <a:lvl7pPr marL="2194560" indent="0" algn="ctr">
+              <a:buNone/>
+              <a:defRPr sz="1280"/>
             </a:lvl7pPr>
-            <a:lvl8pPr marL="2773787" indent="0" algn="ctr">
-              <a:buNone/>
-              <a:defRPr sz="1387"/>
+            <a:lvl8pPr marL="2560320" indent="0" algn="ctr">
+              <a:buNone/>
+              <a:defRPr sz="1280"/>
             </a:lvl8pPr>
-            <a:lvl9pPr marL="3170042" indent="0" algn="ctr">
-              <a:buNone/>
-              <a:defRPr sz="1387"/>
+            <a:lvl9pPr marL="2926080" indent="0" algn="ctr">
+              <a:buNone/>
+              <a:defRPr sz="1280"/>
             </a:lvl9pPr>
           </a:lstStyle>
           <a:p>
@@ -684,7 +684,7 @@
           <a:p>
             <a:fld id="{4378CE3F-9175-C14F-A5C9-B16D7D6FD914}" type="datetimeFigureOut">
               <a:rPr lang="en-US" smtClean="0"/>
-              <a:t>5/30/18</a:t>
+              <a:t>12/7/18</a:t>
             </a:fld>
             <a:endParaRPr lang="en-US"/>
           </a:p>
@@ -735,7 +735,7 @@
     </p:spTree>
     <p:extLst>
       <p:ext uri="{BB962C8B-B14F-4D97-AF65-F5344CB8AC3E}">
-        <p14:creationId xmlns:p14="http://schemas.microsoft.com/office/powerpoint/2010/main" val="4264084141"/>
+        <p14:creationId xmlns:p14="http://schemas.microsoft.com/office/powerpoint/2010/main" val="2180886903"/>
       </p:ext>
     </p:extLst>
   </p:cSld>
@@ -854,7 +854,7 @@
           <a:p>
             <a:fld id="{4378CE3F-9175-C14F-A5C9-B16D7D6FD914}" type="datetimeFigureOut">
               <a:rPr lang="en-US" smtClean="0"/>
-              <a:t>5/30/18</a:t>
+              <a:t>12/7/18</a:t>
             </a:fld>
             <a:endParaRPr lang="en-US"/>
           </a:p>
@@ -905,7 +905,7 @@
     </p:spTree>
     <p:extLst>
       <p:ext uri="{BB962C8B-B14F-4D97-AF65-F5344CB8AC3E}">
-        <p14:creationId xmlns:p14="http://schemas.microsoft.com/office/powerpoint/2010/main" val="3080210406"/>
+        <p14:creationId xmlns:p14="http://schemas.microsoft.com/office/powerpoint/2010/main" val="1147455115"/>
       </p:ext>
     </p:extLst>
   </p:cSld>
@@ -944,8 +944,8 @@
         </p:nvSpPr>
         <p:spPr>
           <a:xfrm>
-            <a:off x="8724900" y="316442"/>
-            <a:ext cx="2628900" cy="5036926"/>
+            <a:off x="8724900" y="292100"/>
+            <a:ext cx="2628900" cy="4649470"/>
           </a:xfrm>
         </p:spPr>
         <p:txBody>
@@ -972,8 +972,8 @@
         </p:nvSpPr>
         <p:spPr>
           <a:xfrm>
-            <a:off x="838200" y="316442"/>
-            <a:ext cx="7734300" cy="5036926"/>
+            <a:off x="838200" y="292100"/>
+            <a:ext cx="7734300" cy="4649470"/>
           </a:xfrm>
         </p:spPr>
         <p:txBody>
@@ -1034,7 +1034,7 @@
           <a:p>
             <a:fld id="{4378CE3F-9175-C14F-A5C9-B16D7D6FD914}" type="datetimeFigureOut">
               <a:rPr lang="en-US" smtClean="0"/>
-              <a:t>5/30/18</a:t>
+              <a:t>12/7/18</a:t>
             </a:fld>
             <a:endParaRPr lang="en-US"/>
           </a:p>
@@ -1085,7 +1085,7 @@
     </p:spTree>
     <p:extLst>
       <p:ext uri="{BB962C8B-B14F-4D97-AF65-F5344CB8AC3E}">
-        <p14:creationId xmlns:p14="http://schemas.microsoft.com/office/powerpoint/2010/main" val="2730636925"/>
+        <p14:creationId xmlns:p14="http://schemas.microsoft.com/office/powerpoint/2010/main" val="2410345977"/>
       </p:ext>
     </p:extLst>
   </p:cSld>
@@ -1204,7 +1204,7 @@
           <a:p>
             <a:fld id="{4378CE3F-9175-C14F-A5C9-B16D7D6FD914}" type="datetimeFigureOut">
               <a:rPr lang="en-US" smtClean="0"/>
-              <a:t>5/30/18</a:t>
+              <a:t>12/7/18</a:t>
             </a:fld>
             <a:endParaRPr lang="en-US"/>
           </a:p>
@@ -1255,7 +1255,7 @@
     </p:spTree>
     <p:extLst>
       <p:ext uri="{BB962C8B-B14F-4D97-AF65-F5344CB8AC3E}">
-        <p14:creationId xmlns:p14="http://schemas.microsoft.com/office/powerpoint/2010/main" val="4103850827"/>
+        <p14:creationId xmlns:p14="http://schemas.microsoft.com/office/powerpoint/2010/main" val="3735182838"/>
       </p:ext>
     </p:extLst>
   </p:cSld>
@@ -1294,15 +1294,15 @@
         </p:nvSpPr>
         <p:spPr>
           <a:xfrm>
-            <a:off x="831850" y="1481773"/>
-            <a:ext cx="10515600" cy="2472372"/>
+            <a:off x="831850" y="1367791"/>
+            <a:ext cx="10515600" cy="2282190"/>
           </a:xfrm>
         </p:spPr>
         <p:txBody>
           <a:bodyPr anchor="b"/>
           <a:lstStyle>
             <a:lvl1pPr>
-              <a:defRPr sz="5200"/>
+              <a:defRPr sz="4800"/>
             </a:lvl1pPr>
           </a:lstStyle>
           <a:p>
@@ -1326,8 +1326,8 @@
         </p:nvSpPr>
         <p:spPr>
           <a:xfrm>
-            <a:off x="831850" y="3977535"/>
-            <a:ext cx="10515600" cy="1300162"/>
+            <a:off x="831850" y="3671571"/>
+            <a:ext cx="10515600" cy="1200150"/>
           </a:xfrm>
         </p:spPr>
         <p:txBody>
@@ -1335,7 +1335,7 @@
           <a:lstStyle>
             <a:lvl1pPr marL="0" indent="0">
               <a:buNone/>
-              <a:defRPr sz="2080">
+              <a:defRPr sz="1920">
                 <a:solidFill>
                   <a:schemeClr val="tx1">
                     <a:tint val="75000"/>
@@ -1343,9 +1343,9 @@
                 </a:solidFill>
               </a:defRPr>
             </a:lvl1pPr>
-            <a:lvl2pPr marL="396255" indent="0">
-              <a:buNone/>
-              <a:defRPr sz="1733">
+            <a:lvl2pPr marL="365760" indent="0">
+              <a:buNone/>
+              <a:defRPr sz="1600">
                 <a:solidFill>
                   <a:schemeClr val="tx1">
                     <a:tint val="75000"/>
@@ -1353,9 +1353,9 @@
                 </a:solidFill>
               </a:defRPr>
             </a:lvl2pPr>
-            <a:lvl3pPr marL="792510" indent="0">
-              <a:buNone/>
-              <a:defRPr sz="1560">
+            <a:lvl3pPr marL="731520" indent="0">
+              <a:buNone/>
+              <a:defRPr sz="1440">
                 <a:solidFill>
                   <a:schemeClr val="tx1">
                     <a:tint val="75000"/>
@@ -1363,9 +1363,9 @@
                 </a:solidFill>
               </a:defRPr>
             </a:lvl3pPr>
-            <a:lvl4pPr marL="1188766" indent="0">
-              <a:buNone/>
-              <a:defRPr sz="1387">
+            <a:lvl4pPr marL="1097280" indent="0">
+              <a:buNone/>
+              <a:defRPr sz="1280">
                 <a:solidFill>
                   <a:schemeClr val="tx1">
                     <a:tint val="75000"/>
@@ -1373,9 +1373,9 @@
                 </a:solidFill>
               </a:defRPr>
             </a:lvl4pPr>
-            <a:lvl5pPr marL="1585021" indent="0">
-              <a:buNone/>
-              <a:defRPr sz="1387">
+            <a:lvl5pPr marL="1463040" indent="0">
+              <a:buNone/>
+              <a:defRPr sz="1280">
                 <a:solidFill>
                   <a:schemeClr val="tx1">
                     <a:tint val="75000"/>
@@ -1383,9 +1383,9 @@
                 </a:solidFill>
               </a:defRPr>
             </a:lvl5pPr>
-            <a:lvl6pPr marL="1981276" indent="0">
-              <a:buNone/>
-              <a:defRPr sz="1387">
+            <a:lvl6pPr marL="1828800" indent="0">
+              <a:buNone/>
+              <a:defRPr sz="1280">
                 <a:solidFill>
                   <a:schemeClr val="tx1">
                     <a:tint val="75000"/>
@@ -1393,9 +1393,9 @@
                 </a:solidFill>
               </a:defRPr>
             </a:lvl6pPr>
-            <a:lvl7pPr marL="2377531" indent="0">
-              <a:buNone/>
-              <a:defRPr sz="1387">
+            <a:lvl7pPr marL="2194560" indent="0">
+              <a:buNone/>
+              <a:defRPr sz="1280">
                 <a:solidFill>
                   <a:schemeClr val="tx1">
                     <a:tint val="75000"/>
@@ -1403,9 +1403,9 @@
                 </a:solidFill>
               </a:defRPr>
             </a:lvl7pPr>
-            <a:lvl8pPr marL="2773787" indent="0">
-              <a:buNone/>
-              <a:defRPr sz="1387">
+            <a:lvl8pPr marL="2560320" indent="0">
+              <a:buNone/>
+              <a:defRPr sz="1280">
                 <a:solidFill>
                   <a:schemeClr val="tx1">
                     <a:tint val="75000"/>
@@ -1413,9 +1413,9 @@
                 </a:solidFill>
               </a:defRPr>
             </a:lvl8pPr>
-            <a:lvl9pPr marL="3170042" indent="0">
-              <a:buNone/>
-              <a:defRPr sz="1387">
+            <a:lvl9pPr marL="2926080" indent="0">
+              <a:buNone/>
+              <a:defRPr sz="1280">
                 <a:solidFill>
                   <a:schemeClr val="tx1">
                     <a:tint val="75000"/>
@@ -1450,7 +1450,7 @@
           <a:p>
             <a:fld id="{4378CE3F-9175-C14F-A5C9-B16D7D6FD914}" type="datetimeFigureOut">
               <a:rPr lang="en-US" smtClean="0"/>
-              <a:t>5/30/18</a:t>
+              <a:t>12/7/18</a:t>
             </a:fld>
             <a:endParaRPr lang="en-US"/>
           </a:p>
@@ -1501,7 +1501,7 @@
     </p:spTree>
     <p:extLst>
       <p:ext uri="{BB962C8B-B14F-4D97-AF65-F5344CB8AC3E}">
-        <p14:creationId xmlns:p14="http://schemas.microsoft.com/office/powerpoint/2010/main" val="534575372"/>
+        <p14:creationId xmlns:p14="http://schemas.microsoft.com/office/powerpoint/2010/main" val="3007250918"/>
       </p:ext>
     </p:extLst>
   </p:cSld>
@@ -1563,8 +1563,8 @@
         </p:nvSpPr>
         <p:spPr>
           <a:xfrm>
-            <a:off x="838200" y="1582208"/>
-            <a:ext cx="5181600" cy="3771160"/>
+            <a:off x="838200" y="1460500"/>
+            <a:ext cx="5181600" cy="3481070"/>
           </a:xfrm>
         </p:spPr>
         <p:txBody>
@@ -1620,8 +1620,8 @@
         </p:nvSpPr>
         <p:spPr>
           <a:xfrm>
-            <a:off x="6172200" y="1582208"/>
-            <a:ext cx="5181600" cy="3771160"/>
+            <a:off x="6172200" y="1460500"/>
+            <a:ext cx="5181600" cy="3481070"/>
           </a:xfrm>
         </p:spPr>
         <p:txBody>
@@ -1682,7 +1682,7 @@
           <a:p>
             <a:fld id="{4378CE3F-9175-C14F-A5C9-B16D7D6FD914}" type="datetimeFigureOut">
               <a:rPr lang="en-US" smtClean="0"/>
-              <a:t>5/30/18</a:t>
+              <a:t>12/7/18</a:t>
             </a:fld>
             <a:endParaRPr lang="en-US"/>
           </a:p>
@@ -1733,7 +1733,7 @@
     </p:spTree>
     <p:extLst>
       <p:ext uri="{BB962C8B-B14F-4D97-AF65-F5344CB8AC3E}">
-        <p14:creationId xmlns:p14="http://schemas.microsoft.com/office/powerpoint/2010/main" val="3723815112"/>
+        <p14:creationId xmlns:p14="http://schemas.microsoft.com/office/powerpoint/2010/main" val="3075028304"/>
       </p:ext>
     </p:extLst>
   </p:cSld>
@@ -1772,8 +1772,8 @@
         </p:nvSpPr>
         <p:spPr>
           <a:xfrm>
-            <a:off x="839788" y="316442"/>
-            <a:ext cx="10515600" cy="1148821"/>
+            <a:off x="839788" y="292101"/>
+            <a:ext cx="10515600" cy="1060450"/>
           </a:xfrm>
         </p:spPr>
         <p:txBody>
@@ -1800,8 +1800,8 @@
         </p:nvSpPr>
         <p:spPr>
           <a:xfrm>
-            <a:off x="839789" y="1457008"/>
-            <a:ext cx="5157787" cy="714057"/>
+            <a:off x="839789" y="1344930"/>
+            <a:ext cx="5157787" cy="659130"/>
           </a:xfrm>
         </p:spPr>
         <p:txBody>
@@ -1809,39 +1809,39 @@
           <a:lstStyle>
             <a:lvl1pPr marL="0" indent="0">
               <a:buNone/>
-              <a:defRPr sz="2080" b="1"/>
+              <a:defRPr sz="1920" b="1"/>
             </a:lvl1pPr>
-            <a:lvl2pPr marL="396255" indent="0">
-              <a:buNone/>
-              <a:defRPr sz="1733" b="1"/>
+            <a:lvl2pPr marL="365760" indent="0">
+              <a:buNone/>
+              <a:defRPr sz="1600" b="1"/>
             </a:lvl2pPr>
-            <a:lvl3pPr marL="792510" indent="0">
-              <a:buNone/>
-              <a:defRPr sz="1560" b="1"/>
+            <a:lvl3pPr marL="731520" indent="0">
+              <a:buNone/>
+              <a:defRPr sz="1440" b="1"/>
             </a:lvl3pPr>
-            <a:lvl4pPr marL="1188766" indent="0">
-              <a:buNone/>
-              <a:defRPr sz="1387" b="1"/>
+            <a:lvl4pPr marL="1097280" indent="0">
+              <a:buNone/>
+              <a:defRPr sz="1280" b="1"/>
             </a:lvl4pPr>
-            <a:lvl5pPr marL="1585021" indent="0">
-              <a:buNone/>
-              <a:defRPr sz="1387" b="1"/>
+            <a:lvl5pPr marL="1463040" indent="0">
+              <a:buNone/>
+              <a:defRPr sz="1280" b="1"/>
             </a:lvl5pPr>
-            <a:lvl6pPr marL="1981276" indent="0">
-              <a:buNone/>
-              <a:defRPr sz="1387" b="1"/>
+            <a:lvl6pPr marL="1828800" indent="0">
+              <a:buNone/>
+              <a:defRPr sz="1280" b="1"/>
             </a:lvl6pPr>
-            <a:lvl7pPr marL="2377531" indent="0">
-              <a:buNone/>
-              <a:defRPr sz="1387" b="1"/>
+            <a:lvl7pPr marL="2194560" indent="0">
+              <a:buNone/>
+              <a:defRPr sz="1280" b="1"/>
             </a:lvl7pPr>
-            <a:lvl8pPr marL="2773787" indent="0">
-              <a:buNone/>
-              <a:defRPr sz="1387" b="1"/>
+            <a:lvl8pPr marL="2560320" indent="0">
+              <a:buNone/>
+              <a:defRPr sz="1280" b="1"/>
             </a:lvl8pPr>
-            <a:lvl9pPr marL="3170042" indent="0">
-              <a:buNone/>
-              <a:defRPr sz="1387" b="1"/>
+            <a:lvl9pPr marL="2926080" indent="0">
+              <a:buNone/>
+              <a:defRPr sz="1280" b="1"/>
             </a:lvl9pPr>
           </a:lstStyle>
           <a:p>
@@ -1865,8 +1865,8 @@
         </p:nvSpPr>
         <p:spPr>
           <a:xfrm>
-            <a:off x="839789" y="2171065"/>
-            <a:ext cx="5157787" cy="3193310"/>
+            <a:off x="839789" y="2004060"/>
+            <a:ext cx="5157787" cy="2947670"/>
           </a:xfrm>
         </p:spPr>
         <p:txBody>
@@ -1922,8 +1922,8 @@
         </p:nvSpPr>
         <p:spPr>
           <a:xfrm>
-            <a:off x="6172200" y="1457008"/>
-            <a:ext cx="5183188" cy="714057"/>
+            <a:off x="6172200" y="1344930"/>
+            <a:ext cx="5183188" cy="659130"/>
           </a:xfrm>
         </p:spPr>
         <p:txBody>
@@ -1931,39 +1931,39 @@
           <a:lstStyle>
             <a:lvl1pPr marL="0" indent="0">
               <a:buNone/>
-              <a:defRPr sz="2080" b="1"/>
+              <a:defRPr sz="1920" b="1"/>
             </a:lvl1pPr>
-            <a:lvl2pPr marL="396255" indent="0">
-              <a:buNone/>
-              <a:defRPr sz="1733" b="1"/>
+            <a:lvl2pPr marL="365760" indent="0">
+              <a:buNone/>
+              <a:defRPr sz="1600" b="1"/>
             </a:lvl2pPr>
-            <a:lvl3pPr marL="792510" indent="0">
-              <a:buNone/>
-              <a:defRPr sz="1560" b="1"/>
+            <a:lvl3pPr marL="731520" indent="0">
+              <a:buNone/>
+              <a:defRPr sz="1440" b="1"/>
             </a:lvl3pPr>
-            <a:lvl4pPr marL="1188766" indent="0">
-              <a:buNone/>
-              <a:defRPr sz="1387" b="1"/>
+            <a:lvl4pPr marL="1097280" indent="0">
+              <a:buNone/>
+              <a:defRPr sz="1280" b="1"/>
             </a:lvl4pPr>
-            <a:lvl5pPr marL="1585021" indent="0">
-              <a:buNone/>
-              <a:defRPr sz="1387" b="1"/>
+            <a:lvl5pPr marL="1463040" indent="0">
+              <a:buNone/>
+              <a:defRPr sz="1280" b="1"/>
             </a:lvl5pPr>
-            <a:lvl6pPr marL="1981276" indent="0">
-              <a:buNone/>
-              <a:defRPr sz="1387" b="1"/>
+            <a:lvl6pPr marL="1828800" indent="0">
+              <a:buNone/>
+              <a:defRPr sz="1280" b="1"/>
             </a:lvl6pPr>
-            <a:lvl7pPr marL="2377531" indent="0">
-              <a:buNone/>
-              <a:defRPr sz="1387" b="1"/>
+            <a:lvl7pPr marL="2194560" indent="0">
+              <a:buNone/>
+              <a:defRPr sz="1280" b="1"/>
             </a:lvl7pPr>
-            <a:lvl8pPr marL="2773787" indent="0">
-              <a:buNone/>
-              <a:defRPr sz="1387" b="1"/>
+            <a:lvl8pPr marL="2560320" indent="0">
+              <a:buNone/>
+              <a:defRPr sz="1280" b="1"/>
             </a:lvl8pPr>
-            <a:lvl9pPr marL="3170042" indent="0">
-              <a:buNone/>
-              <a:defRPr sz="1387" b="1"/>
+            <a:lvl9pPr marL="2926080" indent="0">
+              <a:buNone/>
+              <a:defRPr sz="1280" b="1"/>
             </a:lvl9pPr>
           </a:lstStyle>
           <a:p>
@@ -1987,8 +1987,8 @@
         </p:nvSpPr>
         <p:spPr>
           <a:xfrm>
-            <a:off x="6172200" y="2171065"/>
-            <a:ext cx="5183188" cy="3193310"/>
+            <a:off x="6172200" y="2004060"/>
+            <a:ext cx="5183188" cy="2947670"/>
           </a:xfrm>
         </p:spPr>
         <p:txBody>
@@ -2049,7 +2049,7 @@
           <a:p>
             <a:fld id="{4378CE3F-9175-C14F-A5C9-B16D7D6FD914}" type="datetimeFigureOut">
               <a:rPr lang="en-US" smtClean="0"/>
-              <a:t>5/30/18</a:t>
+              <a:t>12/7/18</a:t>
             </a:fld>
             <a:endParaRPr lang="en-US"/>
           </a:p>
@@ -2100,7 +2100,7 @@
     </p:spTree>
     <p:extLst>
       <p:ext uri="{BB962C8B-B14F-4D97-AF65-F5344CB8AC3E}">
-        <p14:creationId xmlns:p14="http://schemas.microsoft.com/office/powerpoint/2010/main" val="3930925382"/>
+        <p14:creationId xmlns:p14="http://schemas.microsoft.com/office/powerpoint/2010/main" val="3281014570"/>
       </p:ext>
     </p:extLst>
   </p:cSld>
@@ -2167,7 +2167,7 @@
           <a:p>
             <a:fld id="{4378CE3F-9175-C14F-A5C9-B16D7D6FD914}" type="datetimeFigureOut">
               <a:rPr lang="en-US" smtClean="0"/>
-              <a:t>5/30/18</a:t>
+              <a:t>12/7/18</a:t>
             </a:fld>
             <a:endParaRPr lang="en-US"/>
           </a:p>
@@ -2218,7 +2218,7 @@
     </p:spTree>
     <p:extLst>
       <p:ext uri="{BB962C8B-B14F-4D97-AF65-F5344CB8AC3E}">
-        <p14:creationId xmlns:p14="http://schemas.microsoft.com/office/powerpoint/2010/main" val="3982836310"/>
+        <p14:creationId xmlns:p14="http://schemas.microsoft.com/office/powerpoint/2010/main" val="3364412712"/>
       </p:ext>
     </p:extLst>
   </p:cSld>
@@ -2262,7 +2262,7 @@
           <a:p>
             <a:fld id="{4378CE3F-9175-C14F-A5C9-B16D7D6FD914}" type="datetimeFigureOut">
               <a:rPr lang="en-US" smtClean="0"/>
-              <a:t>5/30/18</a:t>
+              <a:t>12/7/18</a:t>
             </a:fld>
             <a:endParaRPr lang="en-US"/>
           </a:p>
@@ -2313,7 +2313,7 @@
     </p:spTree>
     <p:extLst>
       <p:ext uri="{BB962C8B-B14F-4D97-AF65-F5344CB8AC3E}">
-        <p14:creationId xmlns:p14="http://schemas.microsoft.com/office/powerpoint/2010/main" val="4111851014"/>
+        <p14:creationId xmlns:p14="http://schemas.microsoft.com/office/powerpoint/2010/main" val="2197536560"/>
       </p:ext>
     </p:extLst>
   </p:cSld>
@@ -2352,15 +2352,15 @@
         </p:nvSpPr>
         <p:spPr>
           <a:xfrm>
-            <a:off x="839789" y="396240"/>
-            <a:ext cx="3932237" cy="1386840"/>
+            <a:off x="839789" y="365760"/>
+            <a:ext cx="3932237" cy="1280160"/>
           </a:xfrm>
         </p:spPr>
         <p:txBody>
           <a:bodyPr anchor="b"/>
           <a:lstStyle>
             <a:lvl1pPr>
-              <a:defRPr sz="2773"/>
+              <a:defRPr sz="2560"/>
             </a:lvl1pPr>
           </a:lstStyle>
           <a:p>
@@ -2384,39 +2384,39 @@
         </p:nvSpPr>
         <p:spPr>
           <a:xfrm>
-            <a:off x="5183188" y="855769"/>
-            <a:ext cx="6172200" cy="4223808"/>
+            <a:off x="5183188" y="789940"/>
+            <a:ext cx="6172200" cy="3898900"/>
           </a:xfrm>
         </p:spPr>
         <p:txBody>
           <a:bodyPr/>
           <a:lstStyle>
             <a:lvl1pPr>
-              <a:defRPr sz="2773"/>
+              <a:defRPr sz="2560"/>
             </a:lvl1pPr>
             <a:lvl2pPr>
-              <a:defRPr sz="2427"/>
+              <a:defRPr sz="2240"/>
             </a:lvl2pPr>
             <a:lvl3pPr>
-              <a:defRPr sz="2080"/>
+              <a:defRPr sz="1920"/>
             </a:lvl3pPr>
             <a:lvl4pPr>
-              <a:defRPr sz="1733"/>
+              <a:defRPr sz="1600"/>
             </a:lvl4pPr>
             <a:lvl5pPr>
-              <a:defRPr sz="1733"/>
+              <a:defRPr sz="1600"/>
             </a:lvl5pPr>
             <a:lvl6pPr>
-              <a:defRPr sz="1733"/>
+              <a:defRPr sz="1600"/>
             </a:lvl6pPr>
             <a:lvl7pPr>
-              <a:defRPr sz="1733"/>
+              <a:defRPr sz="1600"/>
             </a:lvl7pPr>
             <a:lvl8pPr>
-              <a:defRPr sz="1733"/>
+              <a:defRPr sz="1600"/>
             </a:lvl8pPr>
             <a:lvl9pPr>
-              <a:defRPr sz="1733"/>
+              <a:defRPr sz="1600"/>
             </a:lvl9pPr>
           </a:lstStyle>
           <a:p>
@@ -2469,8 +2469,8 @@
         </p:nvSpPr>
         <p:spPr>
           <a:xfrm>
-            <a:off x="839789" y="1783080"/>
-            <a:ext cx="3932237" cy="3303376"/>
+            <a:off x="839789" y="1645920"/>
+            <a:ext cx="3932237" cy="3049270"/>
           </a:xfrm>
         </p:spPr>
         <p:txBody>
@@ -2478,39 +2478,39 @@
           <a:lstStyle>
             <a:lvl1pPr marL="0" indent="0">
               <a:buNone/>
-              <a:defRPr sz="1387"/>
+              <a:defRPr sz="1280"/>
             </a:lvl1pPr>
-            <a:lvl2pPr marL="396255" indent="0">
-              <a:buNone/>
-              <a:defRPr sz="1213"/>
+            <a:lvl2pPr marL="365760" indent="0">
+              <a:buNone/>
+              <a:defRPr sz="1120"/>
             </a:lvl2pPr>
-            <a:lvl3pPr marL="792510" indent="0">
-              <a:buNone/>
-              <a:defRPr sz="1040"/>
+            <a:lvl3pPr marL="731520" indent="0">
+              <a:buNone/>
+              <a:defRPr sz="960"/>
             </a:lvl3pPr>
-            <a:lvl4pPr marL="1188766" indent="0">
-              <a:buNone/>
-              <a:defRPr sz="867"/>
+            <a:lvl4pPr marL="1097280" indent="0">
+              <a:buNone/>
+              <a:defRPr sz="800"/>
             </a:lvl4pPr>
-            <a:lvl5pPr marL="1585021" indent="0">
-              <a:buNone/>
-              <a:defRPr sz="867"/>
+            <a:lvl5pPr marL="1463040" indent="0">
+              <a:buNone/>
+              <a:defRPr sz="800"/>
             </a:lvl5pPr>
-            <a:lvl6pPr marL="1981276" indent="0">
-              <a:buNone/>
-              <a:defRPr sz="867"/>
+            <a:lvl6pPr marL="1828800" indent="0">
+              <a:buNone/>
+              <a:defRPr sz="800"/>
             </a:lvl6pPr>
-            <a:lvl7pPr marL="2377531" indent="0">
-              <a:buNone/>
-              <a:defRPr sz="867"/>
+            <a:lvl7pPr marL="2194560" indent="0">
+              <a:buNone/>
+              <a:defRPr sz="800"/>
             </a:lvl7pPr>
-            <a:lvl8pPr marL="2773787" indent="0">
-              <a:buNone/>
-              <a:defRPr sz="867"/>
+            <a:lvl8pPr marL="2560320" indent="0">
+              <a:buNone/>
+              <a:defRPr sz="800"/>
             </a:lvl8pPr>
-            <a:lvl9pPr marL="3170042" indent="0">
-              <a:buNone/>
-              <a:defRPr sz="867"/>
+            <a:lvl9pPr marL="2926080" indent="0">
+              <a:buNone/>
+              <a:defRPr sz="800"/>
             </a:lvl9pPr>
           </a:lstStyle>
           <a:p>
@@ -2539,7 +2539,7 @@
           <a:p>
             <a:fld id="{4378CE3F-9175-C14F-A5C9-B16D7D6FD914}" type="datetimeFigureOut">
               <a:rPr lang="en-US" smtClean="0"/>
-              <a:t>5/30/18</a:t>
+              <a:t>12/7/18</a:t>
             </a:fld>
             <a:endParaRPr lang="en-US"/>
           </a:p>
@@ -2590,7 +2590,7 @@
     </p:spTree>
     <p:extLst>
       <p:ext uri="{BB962C8B-B14F-4D97-AF65-F5344CB8AC3E}">
-        <p14:creationId xmlns:p14="http://schemas.microsoft.com/office/powerpoint/2010/main" val="496286133"/>
+        <p14:creationId xmlns:p14="http://schemas.microsoft.com/office/powerpoint/2010/main" val="3642939006"/>
       </p:ext>
     </p:extLst>
   </p:cSld>
@@ -2629,15 +2629,15 @@
         </p:nvSpPr>
         <p:spPr>
           <a:xfrm>
-            <a:off x="839789" y="396240"/>
-            <a:ext cx="3932237" cy="1386840"/>
+            <a:off x="839789" y="365760"/>
+            <a:ext cx="3932237" cy="1280160"/>
           </a:xfrm>
         </p:spPr>
         <p:txBody>
           <a:bodyPr anchor="b"/>
           <a:lstStyle>
             <a:lvl1pPr>
-              <a:defRPr sz="2773"/>
+              <a:defRPr sz="2560"/>
             </a:lvl1pPr>
           </a:lstStyle>
           <a:p>
@@ -2661,8 +2661,8 @@
         </p:nvSpPr>
         <p:spPr>
           <a:xfrm>
-            <a:off x="5183188" y="855769"/>
-            <a:ext cx="6172200" cy="4223808"/>
+            <a:off x="5183188" y="789940"/>
+            <a:ext cx="6172200" cy="3898900"/>
           </a:xfrm>
         </p:spPr>
         <p:txBody>
@@ -2670,39 +2670,39 @@
           <a:lstStyle>
             <a:lvl1pPr marL="0" indent="0">
               <a:buNone/>
-              <a:defRPr sz="2773"/>
+              <a:defRPr sz="2560"/>
             </a:lvl1pPr>
-            <a:lvl2pPr marL="396255" indent="0">
-              <a:buNone/>
-              <a:defRPr sz="2427"/>
+            <a:lvl2pPr marL="365760" indent="0">
+              <a:buNone/>
+              <a:defRPr sz="2240"/>
             </a:lvl2pPr>
-            <a:lvl3pPr marL="792510" indent="0">
-              <a:buNone/>
-              <a:defRPr sz="2080"/>
+            <a:lvl3pPr marL="731520" indent="0">
+              <a:buNone/>
+              <a:defRPr sz="1920"/>
             </a:lvl3pPr>
-            <a:lvl4pPr marL="1188766" indent="0">
-              <a:buNone/>
-              <a:defRPr sz="1733"/>
+            <a:lvl4pPr marL="1097280" indent="0">
+              <a:buNone/>
+              <a:defRPr sz="1600"/>
             </a:lvl4pPr>
-            <a:lvl5pPr marL="1585021" indent="0">
-              <a:buNone/>
-              <a:defRPr sz="1733"/>
+            <a:lvl5pPr marL="1463040" indent="0">
+              <a:buNone/>
+              <a:defRPr sz="1600"/>
             </a:lvl5pPr>
-            <a:lvl6pPr marL="1981276" indent="0">
-              <a:buNone/>
-              <a:defRPr sz="1733"/>
+            <a:lvl6pPr marL="1828800" indent="0">
+              <a:buNone/>
+              <a:defRPr sz="1600"/>
             </a:lvl6pPr>
-            <a:lvl7pPr marL="2377531" indent="0">
-              <a:buNone/>
-              <a:defRPr sz="1733"/>
+            <a:lvl7pPr marL="2194560" indent="0">
+              <a:buNone/>
+              <a:defRPr sz="1600"/>
             </a:lvl7pPr>
-            <a:lvl8pPr marL="2773787" indent="0">
-              <a:buNone/>
-              <a:defRPr sz="1733"/>
+            <a:lvl8pPr marL="2560320" indent="0">
+              <a:buNone/>
+              <a:defRPr sz="1600"/>
             </a:lvl8pPr>
-            <a:lvl9pPr marL="3170042" indent="0">
-              <a:buNone/>
-              <a:defRPr sz="1733"/>
+            <a:lvl9pPr marL="2926080" indent="0">
+              <a:buNone/>
+              <a:defRPr sz="1600"/>
             </a:lvl9pPr>
           </a:lstStyle>
           <a:p>
@@ -2726,8 +2726,8 @@
         </p:nvSpPr>
         <p:spPr>
           <a:xfrm>
-            <a:off x="839789" y="1783080"/>
-            <a:ext cx="3932237" cy="3303376"/>
+            <a:off x="839789" y="1645920"/>
+            <a:ext cx="3932237" cy="3049270"/>
           </a:xfrm>
         </p:spPr>
         <p:txBody>
@@ -2735,39 +2735,39 @@
           <a:lstStyle>
             <a:lvl1pPr marL="0" indent="0">
               <a:buNone/>
-              <a:defRPr sz="1387"/>
+              <a:defRPr sz="1280"/>
             </a:lvl1pPr>
-            <a:lvl2pPr marL="396255" indent="0">
-              <a:buNone/>
-              <a:defRPr sz="1213"/>
+            <a:lvl2pPr marL="365760" indent="0">
+              <a:buNone/>
+              <a:defRPr sz="1120"/>
             </a:lvl2pPr>
-            <a:lvl3pPr marL="792510" indent="0">
-              <a:buNone/>
-              <a:defRPr sz="1040"/>
+            <a:lvl3pPr marL="731520" indent="0">
+              <a:buNone/>
+              <a:defRPr sz="960"/>
             </a:lvl3pPr>
-            <a:lvl4pPr marL="1188766" indent="0">
-              <a:buNone/>
-              <a:defRPr sz="867"/>
+            <a:lvl4pPr marL="1097280" indent="0">
+              <a:buNone/>
+              <a:defRPr sz="800"/>
             </a:lvl4pPr>
-            <a:lvl5pPr marL="1585021" indent="0">
-              <a:buNone/>
-              <a:defRPr sz="867"/>
+            <a:lvl5pPr marL="1463040" indent="0">
+              <a:buNone/>
+              <a:defRPr sz="800"/>
             </a:lvl5pPr>
-            <a:lvl6pPr marL="1981276" indent="0">
-              <a:buNone/>
-              <a:defRPr sz="867"/>
+            <a:lvl6pPr marL="1828800" indent="0">
+              <a:buNone/>
+              <a:defRPr sz="800"/>
             </a:lvl6pPr>
-            <a:lvl7pPr marL="2377531" indent="0">
-              <a:buNone/>
-              <a:defRPr sz="867"/>
+            <a:lvl7pPr marL="2194560" indent="0">
+              <a:buNone/>
+              <a:defRPr sz="800"/>
             </a:lvl7pPr>
-            <a:lvl8pPr marL="2773787" indent="0">
-              <a:buNone/>
-              <a:defRPr sz="867"/>
+            <a:lvl8pPr marL="2560320" indent="0">
+              <a:buNone/>
+              <a:defRPr sz="800"/>
             </a:lvl8pPr>
-            <a:lvl9pPr marL="3170042" indent="0">
-              <a:buNone/>
-              <a:defRPr sz="867"/>
+            <a:lvl9pPr marL="2926080" indent="0">
+              <a:buNone/>
+              <a:defRPr sz="800"/>
             </a:lvl9pPr>
           </a:lstStyle>
           <a:p>
@@ -2796,7 +2796,7 @@
           <a:p>
             <a:fld id="{4378CE3F-9175-C14F-A5C9-B16D7D6FD914}" type="datetimeFigureOut">
               <a:rPr lang="en-US" smtClean="0"/>
-              <a:t>5/30/18</a:t>
+              <a:t>12/7/18</a:t>
             </a:fld>
             <a:endParaRPr lang="en-US"/>
           </a:p>
@@ -2847,7 +2847,7 @@
     </p:spTree>
     <p:extLst>
       <p:ext uri="{BB962C8B-B14F-4D97-AF65-F5344CB8AC3E}">
-        <p14:creationId xmlns:p14="http://schemas.microsoft.com/office/powerpoint/2010/main" val="1647979901"/>
+        <p14:creationId xmlns:p14="http://schemas.microsoft.com/office/powerpoint/2010/main" val="143380749"/>
       </p:ext>
     </p:extLst>
   </p:cSld>
@@ -2891,8 +2891,8 @@
         </p:nvSpPr>
         <p:spPr>
           <a:xfrm>
-            <a:off x="838200" y="316442"/>
-            <a:ext cx="10515600" cy="1148821"/>
+            <a:off x="838200" y="292101"/>
+            <a:ext cx="10515600" cy="1060450"/>
           </a:xfrm>
           <a:prstGeom prst="rect">
             <a:avLst/>
@@ -2924,8 +2924,8 @@
         </p:nvSpPr>
         <p:spPr>
           <a:xfrm>
-            <a:off x="838200" y="1582208"/>
-            <a:ext cx="10515600" cy="3771160"/>
+            <a:off x="838200" y="1460500"/>
+            <a:ext cx="10515600" cy="3481070"/>
           </a:xfrm>
           <a:prstGeom prst="rect">
             <a:avLst/>
@@ -2986,8 +2986,8 @@
         </p:nvSpPr>
         <p:spPr>
           <a:xfrm>
-            <a:off x="838200" y="5508837"/>
-            <a:ext cx="2743200" cy="316442"/>
+            <a:off x="838200" y="5085080"/>
+            <a:ext cx="2743200" cy="292100"/>
           </a:xfrm>
           <a:prstGeom prst="rect">
             <a:avLst/>
@@ -2997,7 +2997,7 @@
           <a:bodyPr vert="horz" lIns="91440" tIns="45720" rIns="91440" bIns="45720" rtlCol="0" anchor="ctr"/>
           <a:lstStyle>
             <a:lvl1pPr algn="l">
-              <a:defRPr sz="1040">
+              <a:defRPr sz="960">
                 <a:solidFill>
                   <a:schemeClr val="tx1">
                     <a:tint val="75000"/>
@@ -3009,7 +3009,7 @@
           <a:p>
             <a:fld id="{4378CE3F-9175-C14F-A5C9-B16D7D6FD914}" type="datetimeFigureOut">
               <a:rPr lang="en-US" smtClean="0"/>
-              <a:t>5/30/18</a:t>
+              <a:t>12/7/18</a:t>
             </a:fld>
             <a:endParaRPr lang="en-US"/>
           </a:p>
@@ -3027,8 +3027,8 @@
         </p:nvSpPr>
         <p:spPr>
           <a:xfrm>
-            <a:off x="4038600" y="5508837"/>
-            <a:ext cx="4114800" cy="316442"/>
+            <a:off x="4038600" y="5085080"/>
+            <a:ext cx="4114800" cy="292100"/>
           </a:xfrm>
           <a:prstGeom prst="rect">
             <a:avLst/>
@@ -3038,7 +3038,7 @@
           <a:bodyPr vert="horz" lIns="91440" tIns="45720" rIns="91440" bIns="45720" rtlCol="0" anchor="ctr"/>
           <a:lstStyle>
             <a:lvl1pPr algn="ctr">
-              <a:defRPr sz="1040">
+              <a:defRPr sz="960">
                 <a:solidFill>
                   <a:schemeClr val="tx1">
                     <a:tint val="75000"/>
@@ -3064,8 +3064,8 @@
         </p:nvSpPr>
         <p:spPr>
           <a:xfrm>
-            <a:off x="8610600" y="5508837"/>
-            <a:ext cx="2743200" cy="316442"/>
+            <a:off x="8610600" y="5085080"/>
+            <a:ext cx="2743200" cy="292100"/>
           </a:xfrm>
           <a:prstGeom prst="rect">
             <a:avLst/>
@@ -3075,7 +3075,7 @@
           <a:bodyPr vert="horz" lIns="91440" tIns="45720" rIns="91440" bIns="45720" rtlCol="0" anchor="ctr"/>
           <a:lstStyle>
             <a:lvl1pPr algn="r">
-              <a:defRPr sz="1040">
+              <a:defRPr sz="960">
                 <a:solidFill>
                   <a:schemeClr val="tx1">
                     <a:tint val="75000"/>
@@ -3096,27 +3096,27 @@
     </p:spTree>
     <p:extLst>
       <p:ext uri="{BB962C8B-B14F-4D97-AF65-F5344CB8AC3E}">
-        <p14:creationId xmlns:p14="http://schemas.microsoft.com/office/powerpoint/2010/main" val="2172493298"/>
+        <p14:creationId xmlns:p14="http://schemas.microsoft.com/office/powerpoint/2010/main" val="584113928"/>
       </p:ext>
     </p:extLst>
   </p:cSld>
   <p:clrMap bg1="lt1" tx1="dk1" bg2="lt2" tx2="dk2" accent1="accent1" accent2="accent2" accent3="accent3" accent4="accent4" accent5="accent5" accent6="accent6" hlink="hlink" folHlink="folHlink"/>
   <p:sldLayoutIdLst>
-    <p:sldLayoutId id="2147483673" r:id="rId1"/>
-    <p:sldLayoutId id="2147483674" r:id="rId2"/>
-    <p:sldLayoutId id="2147483675" r:id="rId3"/>
-    <p:sldLayoutId id="2147483676" r:id="rId4"/>
-    <p:sldLayoutId id="2147483677" r:id="rId5"/>
-    <p:sldLayoutId id="2147483678" r:id="rId6"/>
-    <p:sldLayoutId id="2147483679" r:id="rId7"/>
-    <p:sldLayoutId id="2147483680" r:id="rId8"/>
-    <p:sldLayoutId id="2147483681" r:id="rId9"/>
-    <p:sldLayoutId id="2147483682" r:id="rId10"/>
-    <p:sldLayoutId id="2147483683" r:id="rId11"/>
+    <p:sldLayoutId id="2147483685" r:id="rId1"/>
+    <p:sldLayoutId id="2147483686" r:id="rId2"/>
+    <p:sldLayoutId id="2147483687" r:id="rId3"/>
+    <p:sldLayoutId id="2147483688" r:id="rId4"/>
+    <p:sldLayoutId id="2147483689" r:id="rId5"/>
+    <p:sldLayoutId id="2147483690" r:id="rId6"/>
+    <p:sldLayoutId id="2147483691" r:id="rId7"/>
+    <p:sldLayoutId id="2147483692" r:id="rId8"/>
+    <p:sldLayoutId id="2147483693" r:id="rId9"/>
+    <p:sldLayoutId id="2147483694" r:id="rId10"/>
+    <p:sldLayoutId id="2147483695" r:id="rId11"/>
   </p:sldLayoutIdLst>
   <p:txStyles>
     <p:titleStyle>
-      <a:lvl1pPr algn="l" defTabSz="792510" rtl="0" eaLnBrk="1" latinLnBrk="0" hangingPunct="1">
+      <a:lvl1pPr algn="l" defTabSz="731520" rtl="0" eaLnBrk="1" latinLnBrk="0" hangingPunct="1">
         <a:lnSpc>
           <a:spcPct val="90000"/>
         </a:lnSpc>
@@ -3124,7 +3124,7 @@
           <a:spcPct val="0"/>
         </a:spcBef>
         <a:buNone/>
-        <a:defRPr sz="3813" kern="1200">
+        <a:defRPr sz="3520" kern="1200">
           <a:solidFill>
             <a:schemeClr val="tx1"/>
           </a:solidFill>
@@ -3135,16 +3135,16 @@
       </a:lvl1pPr>
     </p:titleStyle>
     <p:bodyStyle>
-      <a:lvl1pPr marL="198128" indent="-198128" algn="l" defTabSz="792510" rtl="0" eaLnBrk="1" latinLnBrk="0" hangingPunct="1">
+      <a:lvl1pPr marL="182880" indent="-182880" algn="l" defTabSz="731520" rtl="0" eaLnBrk="1" latinLnBrk="0" hangingPunct="1">
         <a:lnSpc>
           <a:spcPct val="90000"/>
         </a:lnSpc>
         <a:spcBef>
-          <a:spcPts val="867"/>
+          <a:spcPts val="800"/>
         </a:spcBef>
         <a:buFont typeface="Arial" panose="020B0604020202020204" pitchFamily="34" charset="0"/>
         <a:buChar char="•"/>
-        <a:defRPr sz="2427" kern="1200">
+        <a:defRPr sz="2240" kern="1200">
           <a:solidFill>
             <a:schemeClr val="tx1"/>
           </a:solidFill>
@@ -3153,16 +3153,16 @@
           <a:cs typeface="+mn-cs"/>
         </a:defRPr>
       </a:lvl1pPr>
-      <a:lvl2pPr marL="594383" indent="-198128" algn="l" defTabSz="792510" rtl="0" eaLnBrk="1" latinLnBrk="0" hangingPunct="1">
+      <a:lvl2pPr marL="548640" indent="-182880" algn="l" defTabSz="731520" rtl="0" eaLnBrk="1" latinLnBrk="0" hangingPunct="1">
         <a:lnSpc>
           <a:spcPct val="90000"/>
         </a:lnSpc>
         <a:spcBef>
-          <a:spcPts val="433"/>
+          <a:spcPts val="400"/>
         </a:spcBef>
         <a:buFont typeface="Arial" panose="020B0604020202020204" pitchFamily="34" charset="0"/>
         <a:buChar char="•"/>
-        <a:defRPr sz="2080" kern="1200">
+        <a:defRPr sz="1920" kern="1200">
           <a:solidFill>
             <a:schemeClr val="tx1"/>
           </a:solidFill>
@@ -3171,16 +3171,16 @@
           <a:cs typeface="+mn-cs"/>
         </a:defRPr>
       </a:lvl2pPr>
-      <a:lvl3pPr marL="990638" indent="-198128" algn="l" defTabSz="792510" rtl="0" eaLnBrk="1" latinLnBrk="0" hangingPunct="1">
+      <a:lvl3pPr marL="914400" indent="-182880" algn="l" defTabSz="731520" rtl="0" eaLnBrk="1" latinLnBrk="0" hangingPunct="1">
         <a:lnSpc>
           <a:spcPct val="90000"/>
         </a:lnSpc>
         <a:spcBef>
-          <a:spcPts val="433"/>
+          <a:spcPts val="400"/>
         </a:spcBef>
         <a:buFont typeface="Arial" panose="020B0604020202020204" pitchFamily="34" charset="0"/>
         <a:buChar char="•"/>
-        <a:defRPr sz="1733" kern="1200">
+        <a:defRPr sz="1600" kern="1200">
           <a:solidFill>
             <a:schemeClr val="tx1"/>
           </a:solidFill>
@@ -3189,16 +3189,16 @@
           <a:cs typeface="+mn-cs"/>
         </a:defRPr>
       </a:lvl3pPr>
-      <a:lvl4pPr marL="1386893" indent="-198128" algn="l" defTabSz="792510" rtl="0" eaLnBrk="1" latinLnBrk="0" hangingPunct="1">
+      <a:lvl4pPr marL="1280160" indent="-182880" algn="l" defTabSz="731520" rtl="0" eaLnBrk="1" latinLnBrk="0" hangingPunct="1">
         <a:lnSpc>
           <a:spcPct val="90000"/>
         </a:lnSpc>
         <a:spcBef>
-          <a:spcPts val="433"/>
+          <a:spcPts val="400"/>
         </a:spcBef>
         <a:buFont typeface="Arial" panose="020B0604020202020204" pitchFamily="34" charset="0"/>
         <a:buChar char="•"/>
-        <a:defRPr sz="1560" kern="1200">
+        <a:defRPr sz="1440" kern="1200">
           <a:solidFill>
             <a:schemeClr val="tx1"/>
           </a:solidFill>
@@ -3207,16 +3207,16 @@
           <a:cs typeface="+mn-cs"/>
         </a:defRPr>
       </a:lvl4pPr>
-      <a:lvl5pPr marL="1783149" indent="-198128" algn="l" defTabSz="792510" rtl="0" eaLnBrk="1" latinLnBrk="0" hangingPunct="1">
+      <a:lvl5pPr marL="1645920" indent="-182880" algn="l" defTabSz="731520" rtl="0" eaLnBrk="1" latinLnBrk="0" hangingPunct="1">
         <a:lnSpc>
           <a:spcPct val="90000"/>
         </a:lnSpc>
         <a:spcBef>
-          <a:spcPts val="433"/>
+          <a:spcPts val="400"/>
         </a:spcBef>
         <a:buFont typeface="Arial" panose="020B0604020202020204" pitchFamily="34" charset="0"/>
         <a:buChar char="•"/>
-        <a:defRPr sz="1560" kern="1200">
+        <a:defRPr sz="1440" kern="1200">
           <a:solidFill>
             <a:schemeClr val="tx1"/>
           </a:solidFill>
@@ -3225,16 +3225,16 @@
           <a:cs typeface="+mn-cs"/>
         </a:defRPr>
       </a:lvl5pPr>
-      <a:lvl6pPr marL="2179404" indent="-198128" algn="l" defTabSz="792510" rtl="0" eaLnBrk="1" latinLnBrk="0" hangingPunct="1">
+      <a:lvl6pPr marL="2011680" indent="-182880" algn="l" defTabSz="731520" rtl="0" eaLnBrk="1" latinLnBrk="0" hangingPunct="1">
         <a:lnSpc>
           <a:spcPct val="90000"/>
         </a:lnSpc>
         <a:spcBef>
-          <a:spcPts val="433"/>
+          <a:spcPts val="400"/>
         </a:spcBef>
         <a:buFont typeface="Arial" panose="020B0604020202020204" pitchFamily="34" charset="0"/>
         <a:buChar char="•"/>
-        <a:defRPr sz="1560" kern="1200">
+        <a:defRPr sz="1440" kern="1200">
           <a:solidFill>
             <a:schemeClr val="tx1"/>
           </a:solidFill>
@@ -3243,16 +3243,16 @@
           <a:cs typeface="+mn-cs"/>
         </a:defRPr>
       </a:lvl6pPr>
-      <a:lvl7pPr marL="2575659" indent="-198128" algn="l" defTabSz="792510" rtl="0" eaLnBrk="1" latinLnBrk="0" hangingPunct="1">
+      <a:lvl7pPr marL="2377440" indent="-182880" algn="l" defTabSz="731520" rtl="0" eaLnBrk="1" latinLnBrk="0" hangingPunct="1">
         <a:lnSpc>
           <a:spcPct val="90000"/>
         </a:lnSpc>
         <a:spcBef>
-          <a:spcPts val="433"/>
+          <a:spcPts val="400"/>
         </a:spcBef>
         <a:buFont typeface="Arial" panose="020B0604020202020204" pitchFamily="34" charset="0"/>
         <a:buChar char="•"/>
-        <a:defRPr sz="1560" kern="1200">
+        <a:defRPr sz="1440" kern="1200">
           <a:solidFill>
             <a:schemeClr val="tx1"/>
           </a:solidFill>
@@ -3261,16 +3261,16 @@
           <a:cs typeface="+mn-cs"/>
         </a:defRPr>
       </a:lvl7pPr>
-      <a:lvl8pPr marL="2971914" indent="-198128" algn="l" defTabSz="792510" rtl="0" eaLnBrk="1" latinLnBrk="0" hangingPunct="1">
+      <a:lvl8pPr marL="2743200" indent="-182880" algn="l" defTabSz="731520" rtl="0" eaLnBrk="1" latinLnBrk="0" hangingPunct="1">
         <a:lnSpc>
           <a:spcPct val="90000"/>
         </a:lnSpc>
         <a:spcBef>
-          <a:spcPts val="433"/>
+          <a:spcPts val="400"/>
         </a:spcBef>
         <a:buFont typeface="Arial" panose="020B0604020202020204" pitchFamily="34" charset="0"/>
         <a:buChar char="•"/>
-        <a:defRPr sz="1560" kern="1200">
+        <a:defRPr sz="1440" kern="1200">
           <a:solidFill>
             <a:schemeClr val="tx1"/>
           </a:solidFill>
@@ -3279,16 +3279,16 @@
           <a:cs typeface="+mn-cs"/>
         </a:defRPr>
       </a:lvl8pPr>
-      <a:lvl9pPr marL="3368170" indent="-198128" algn="l" defTabSz="792510" rtl="0" eaLnBrk="1" latinLnBrk="0" hangingPunct="1">
+      <a:lvl9pPr marL="3108960" indent="-182880" algn="l" defTabSz="731520" rtl="0" eaLnBrk="1" latinLnBrk="0" hangingPunct="1">
         <a:lnSpc>
           <a:spcPct val="90000"/>
         </a:lnSpc>
         <a:spcBef>
-          <a:spcPts val="433"/>
+          <a:spcPts val="400"/>
         </a:spcBef>
         <a:buFont typeface="Arial" panose="020B0604020202020204" pitchFamily="34" charset="0"/>
         <a:buChar char="•"/>
-        <a:defRPr sz="1560" kern="1200">
+        <a:defRPr sz="1440" kern="1200">
           <a:solidFill>
             <a:schemeClr val="tx1"/>
           </a:solidFill>
@@ -3302,8 +3302,8 @@
       <a:defPPr>
         <a:defRPr lang="en-US"/>
       </a:defPPr>
-      <a:lvl1pPr marL="0" algn="l" defTabSz="792510" rtl="0" eaLnBrk="1" latinLnBrk="0" hangingPunct="1">
-        <a:defRPr sz="1560" kern="1200">
+      <a:lvl1pPr marL="0" algn="l" defTabSz="731520" rtl="0" eaLnBrk="1" latinLnBrk="0" hangingPunct="1">
+        <a:defRPr sz="1440" kern="1200">
           <a:solidFill>
             <a:schemeClr val="tx1"/>
           </a:solidFill>
@@ -3312,8 +3312,8 @@
           <a:cs typeface="+mn-cs"/>
         </a:defRPr>
       </a:lvl1pPr>
-      <a:lvl2pPr marL="396255" algn="l" defTabSz="792510" rtl="0" eaLnBrk="1" latinLnBrk="0" hangingPunct="1">
-        <a:defRPr sz="1560" kern="1200">
+      <a:lvl2pPr marL="365760" algn="l" defTabSz="731520" rtl="0" eaLnBrk="1" latinLnBrk="0" hangingPunct="1">
+        <a:defRPr sz="1440" kern="1200">
           <a:solidFill>
             <a:schemeClr val="tx1"/>
           </a:solidFill>
@@ -3322,8 +3322,8 @@
           <a:cs typeface="+mn-cs"/>
         </a:defRPr>
       </a:lvl2pPr>
-      <a:lvl3pPr marL="792510" algn="l" defTabSz="792510" rtl="0" eaLnBrk="1" latinLnBrk="0" hangingPunct="1">
-        <a:defRPr sz="1560" kern="1200">
+      <a:lvl3pPr marL="731520" algn="l" defTabSz="731520" rtl="0" eaLnBrk="1" latinLnBrk="0" hangingPunct="1">
+        <a:defRPr sz="1440" kern="1200">
           <a:solidFill>
             <a:schemeClr val="tx1"/>
           </a:solidFill>
@@ -3332,8 +3332,8 @@
           <a:cs typeface="+mn-cs"/>
         </a:defRPr>
       </a:lvl3pPr>
-      <a:lvl4pPr marL="1188766" algn="l" defTabSz="792510" rtl="0" eaLnBrk="1" latinLnBrk="0" hangingPunct="1">
-        <a:defRPr sz="1560" kern="1200">
+      <a:lvl4pPr marL="1097280" algn="l" defTabSz="731520" rtl="0" eaLnBrk="1" latinLnBrk="0" hangingPunct="1">
+        <a:defRPr sz="1440" kern="1200">
           <a:solidFill>
             <a:schemeClr val="tx1"/>
           </a:solidFill>
@@ -3342,8 +3342,8 @@
           <a:cs typeface="+mn-cs"/>
         </a:defRPr>
       </a:lvl4pPr>
-      <a:lvl5pPr marL="1585021" algn="l" defTabSz="792510" rtl="0" eaLnBrk="1" latinLnBrk="0" hangingPunct="1">
-        <a:defRPr sz="1560" kern="1200">
+      <a:lvl5pPr marL="1463040" algn="l" defTabSz="731520" rtl="0" eaLnBrk="1" latinLnBrk="0" hangingPunct="1">
+        <a:defRPr sz="1440" kern="1200">
           <a:solidFill>
             <a:schemeClr val="tx1"/>
           </a:solidFill>
@@ -3352,8 +3352,8 @@
           <a:cs typeface="+mn-cs"/>
         </a:defRPr>
       </a:lvl5pPr>
-      <a:lvl6pPr marL="1981276" algn="l" defTabSz="792510" rtl="0" eaLnBrk="1" latinLnBrk="0" hangingPunct="1">
-        <a:defRPr sz="1560" kern="1200">
+      <a:lvl6pPr marL="1828800" algn="l" defTabSz="731520" rtl="0" eaLnBrk="1" latinLnBrk="0" hangingPunct="1">
+        <a:defRPr sz="1440" kern="1200">
           <a:solidFill>
             <a:schemeClr val="tx1"/>
           </a:solidFill>
@@ -3362,8 +3362,8 @@
           <a:cs typeface="+mn-cs"/>
         </a:defRPr>
       </a:lvl6pPr>
-      <a:lvl7pPr marL="2377531" algn="l" defTabSz="792510" rtl="0" eaLnBrk="1" latinLnBrk="0" hangingPunct="1">
-        <a:defRPr sz="1560" kern="1200">
+      <a:lvl7pPr marL="2194560" algn="l" defTabSz="731520" rtl="0" eaLnBrk="1" latinLnBrk="0" hangingPunct="1">
+        <a:defRPr sz="1440" kern="1200">
           <a:solidFill>
             <a:schemeClr val="tx1"/>
           </a:solidFill>
@@ -3372,8 +3372,8 @@
           <a:cs typeface="+mn-cs"/>
         </a:defRPr>
       </a:lvl7pPr>
-      <a:lvl8pPr marL="2773787" algn="l" defTabSz="792510" rtl="0" eaLnBrk="1" latinLnBrk="0" hangingPunct="1">
-        <a:defRPr sz="1560" kern="1200">
+      <a:lvl8pPr marL="2560320" algn="l" defTabSz="731520" rtl="0" eaLnBrk="1" latinLnBrk="0" hangingPunct="1">
+        <a:defRPr sz="1440" kern="1200">
           <a:solidFill>
             <a:schemeClr val="tx1"/>
           </a:solidFill>
@@ -3382,8 +3382,8 @@
           <a:cs typeface="+mn-cs"/>
         </a:defRPr>
       </a:lvl8pPr>
-      <a:lvl9pPr marL="3170042" algn="l" defTabSz="792510" rtl="0" eaLnBrk="1" latinLnBrk="0" hangingPunct="1">
-        <a:defRPr sz="1560" kern="1200">
+      <a:lvl9pPr marL="2926080" algn="l" defTabSz="731520" rtl="0" eaLnBrk="1" latinLnBrk="0" hangingPunct="1">
+        <a:defRPr sz="1440" kern="1200">
           <a:solidFill>
             <a:schemeClr val="tx1"/>
           </a:solidFill>
@@ -3414,12 +3414,146 @@
           <a:chExt cx="0" cy="0"/>
         </a:xfrm>
       </p:grpSpPr>
+      <p:pic>
+        <p:nvPicPr>
+          <p:cNvPr id="57" name="Picture 56">
+            <a:extLst>
+              <a:ext uri="{FF2B5EF4-FFF2-40B4-BE49-F238E27FC236}">
+                <a16:creationId xmlns:a16="http://schemas.microsoft.com/office/drawing/2014/main" id="{CE0B67EB-705A-5A4C-9214-B3CBBFA0A550}"/>
+              </a:ext>
+            </a:extLst>
+          </p:cNvPr>
+          <p:cNvPicPr>
+            <a:picLocks noChangeAspect="1"/>
+          </p:cNvPicPr>
+          <p:nvPr/>
+        </p:nvPicPr>
+        <p:blipFill rotWithShape="1">
+          <a:blip r:embed="rId3"/>
+          <a:srcRect l="3858" t="21766" r="75639" b="28692"/>
+          <a:stretch/>
+        </p:blipFill>
+        <p:spPr>
+          <a:xfrm>
+            <a:off x="450507" y="602330"/>
+            <a:ext cx="2507113" cy="2826523"/>
+          </a:xfrm>
+          <a:prstGeom prst="rect">
+            <a:avLst/>
+          </a:prstGeom>
+        </p:spPr>
+      </p:pic>
+      <p:sp>
+        <p:nvSpPr>
+          <p:cNvPr id="63" name="TextBox 62">
+            <a:extLst>
+              <a:ext uri="{FF2B5EF4-FFF2-40B4-BE49-F238E27FC236}">
+                <a16:creationId xmlns:a16="http://schemas.microsoft.com/office/drawing/2014/main" id="{C07651D0-FBA5-B94B-BB8B-A0085D314B3C}"/>
+              </a:ext>
+            </a:extLst>
+          </p:cNvPr>
+          <p:cNvSpPr txBox="1"/>
+          <p:nvPr/>
+        </p:nvSpPr>
+        <p:spPr>
+          <a:xfrm>
+            <a:off x="142556" y="3217099"/>
+            <a:ext cx="5787216" cy="2246769"/>
+          </a:xfrm>
+          <a:prstGeom prst="rect">
+            <a:avLst/>
+          </a:prstGeom>
+          <a:noFill/>
+        </p:spPr>
+        <p:txBody>
+          <a:bodyPr wrap="square" rtlCol="0">
+            <a:spAutoFit/>
+          </a:bodyPr>
+          <a:lstStyle/>
+          <a:p>
+            <a:r>
+              <a:rPr lang="en-US" sz="2800" dirty="0" err="1">
+                <a:latin typeface="Times" pitchFamily="2" charset="0"/>
+              </a:rPr>
+              <a:t>Δ</a:t>
+            </a:r>
+            <a:r>
+              <a:rPr lang="en-US" sz="2800" i="1" dirty="0" err="1">
+                <a:latin typeface="Times" pitchFamily="2" charset="0"/>
+              </a:rPr>
+              <a:t>s</a:t>
+            </a:r>
+            <a:r>
+              <a:rPr lang="en-US" sz="2800" i="1" dirty="0">
+                <a:latin typeface="Times" pitchFamily="2" charset="0"/>
+              </a:rPr>
+              <a:t>	</a:t>
+            </a:r>
+            <a:r>
+              <a:rPr lang="en-US" sz="2800" dirty="0">
+                <a:latin typeface="Times" pitchFamily="2" charset="0"/>
+              </a:rPr>
+              <a:t>=    − </a:t>
+            </a:r>
+          </a:p>
+          <a:p>
+            <a:r>
+              <a:rPr lang="en-US" sz="2800" dirty="0" err="1">
+                <a:latin typeface="Times" pitchFamily="2" charset="0"/>
+              </a:rPr>
+              <a:t>Δ</a:t>
+            </a:r>
+            <a:r>
+              <a:rPr lang="en-US" sz="2800" i="1" dirty="0" err="1">
+                <a:latin typeface="Times" pitchFamily="2" charset="0"/>
+              </a:rPr>
+              <a:t>g</a:t>
+            </a:r>
+            <a:r>
+              <a:rPr lang="en-US" sz="2800" i="1" dirty="0">
+                <a:latin typeface="Times" pitchFamily="2" charset="0"/>
+              </a:rPr>
+              <a:t>	</a:t>
+            </a:r>
+            <a:r>
+              <a:rPr lang="en-US" sz="2800" dirty="0">
+                <a:latin typeface="Times" pitchFamily="2" charset="0"/>
+              </a:rPr>
+              <a:t>=    −  </a:t>
+            </a:r>
+          </a:p>
+          <a:p>
+            <a:r>
+              <a:rPr lang="en-US" sz="2800" dirty="0">
+                <a:latin typeface="Times" pitchFamily="2" charset="0"/>
+              </a:rPr>
+              <a:t>    2-move reachable set</a:t>
+            </a:r>
+          </a:p>
+          <a:p>
+            <a:r>
+              <a:rPr lang="en-US" sz="2800" dirty="0">
+                <a:latin typeface="Times" pitchFamily="2" charset="0"/>
+              </a:rPr>
+              <a:t>    4-move reachable set</a:t>
+            </a:r>
+          </a:p>
+          <a:p>
+            <a:r>
+              <a:rPr lang="en-US" sz="2800" dirty="0">
+                <a:latin typeface="Times" pitchFamily="2" charset="0"/>
+              </a:rPr>
+              <a:t>    6-move reachable set</a:t>
+            </a:r>
+          </a:p>
+        </p:txBody>
+      </p:sp>
       <p:grpSp>
         <p:nvGrpSpPr>
-          <p:cNvPr id="77" name="Group 76">
+          <p:cNvPr id="79" name="Group 78">
             <a:extLst>
               <a:ext uri="{FF2B5EF4-FFF2-40B4-BE49-F238E27FC236}">
-                <a16:creationId xmlns:a16="http://schemas.microsoft.com/office/drawing/2014/main" id="{D42752D0-570A-7B4A-B5CA-58B94E97B926}"/>
+                <a16:creationId xmlns:a16="http://schemas.microsoft.com/office/drawing/2014/main" id="{339A28F5-ABDA-7748-B530-45501C26AA79}"/>
               </a:ext>
             </a:extLst>
           </p:cNvPr>
@@ -3428,1369 +3562,1249 @@
         </p:nvGrpSpPr>
         <p:grpSpPr>
           <a:xfrm>
-            <a:off x="-23354" y="160242"/>
-            <a:ext cx="12228134" cy="5705394"/>
-            <a:chOff x="-23354" y="634374"/>
-            <a:chExt cx="12228134" cy="5705394"/>
+            <a:off x="3004399" y="729624"/>
+            <a:ext cx="4615511" cy="4710666"/>
+            <a:chOff x="3901956" y="1547755"/>
+            <a:chExt cx="3734336" cy="3918653"/>
           </a:xfrm>
         </p:grpSpPr>
-        <p:grpSp>
-          <p:nvGrpSpPr>
-            <p:cNvPr id="78" name="Group 77">
+        <p:sp>
+          <p:nvSpPr>
+            <p:cNvPr id="80" name="Oval 79">
               <a:extLst>
                 <a:ext uri="{FF2B5EF4-FFF2-40B4-BE49-F238E27FC236}">
-                  <a16:creationId xmlns:a16="http://schemas.microsoft.com/office/drawing/2014/main" id="{E85AFAE7-841E-1C4B-A610-5135D3458696}"/>
+                  <a16:creationId xmlns:a16="http://schemas.microsoft.com/office/drawing/2014/main" id="{B72B9474-4C21-8549-A90A-FF8F2E144255}"/>
                 </a:ext>
               </a:extLst>
             </p:cNvPr>
-            <p:cNvGrpSpPr/>
+            <p:cNvSpPr/>
             <p:nvPr/>
-          </p:nvGrpSpPr>
-          <p:grpSpPr>
+          </p:nvSpPr>
+          <p:spPr>
             <a:xfrm>
-              <a:off x="-23354" y="634374"/>
-              <a:ext cx="12228134" cy="5705394"/>
-              <a:chOff x="-158823" y="5889088"/>
-              <a:chExt cx="12228134" cy="5705394"/>
+              <a:off x="5636712" y="3369501"/>
+              <a:ext cx="100208" cy="100208"/>
             </a:xfrm>
-          </p:grpSpPr>
-          <p:pic>
-            <p:nvPicPr>
-              <p:cNvPr id="99" name="Picture 98">
-                <a:extLst>
-                  <a:ext uri="{FF2B5EF4-FFF2-40B4-BE49-F238E27FC236}">
-                    <a16:creationId xmlns:a16="http://schemas.microsoft.com/office/drawing/2014/main" id="{23ACF387-07FA-F048-AE1F-B5569A385F52}"/>
-                  </a:ext>
-                </a:extLst>
-              </p:cNvPr>
-              <p:cNvPicPr>
-                <a:picLocks noChangeAspect="1"/>
-              </p:cNvPicPr>
-              <p:nvPr/>
-            </p:nvPicPr>
-            <p:blipFill>
-              <a:blip r:embed="rId3"/>
-              <a:stretch>
-                <a:fillRect/>
-              </a:stretch>
-            </p:blipFill>
-            <p:spPr>
-              <a:xfrm>
-                <a:off x="-158823" y="5889088"/>
-                <a:ext cx="12228134" cy="5705394"/>
-              </a:xfrm>
-              <a:prstGeom prst="rect">
-                <a:avLst/>
-              </a:prstGeom>
-            </p:spPr>
-          </p:pic>
-          <p:sp>
-            <p:nvSpPr>
-              <p:cNvPr id="100" name="Freeform 99">
-                <a:extLst>
-                  <a:ext uri="{FF2B5EF4-FFF2-40B4-BE49-F238E27FC236}">
-                    <a16:creationId xmlns:a16="http://schemas.microsoft.com/office/drawing/2014/main" id="{7F483AE4-5236-FF49-9710-3C9D39746935}"/>
-                  </a:ext>
-                </a:extLst>
-              </p:cNvPr>
-              <p:cNvSpPr/>
-              <p:nvPr/>
-            </p:nvSpPr>
-            <p:spPr>
-              <a:xfrm>
-                <a:off x="2878667" y="6502400"/>
-                <a:ext cx="4724400" cy="4859867"/>
-              </a:xfrm>
-              <a:custGeom>
-                <a:avLst/>
-                <a:gdLst>
-                  <a:gd name="connsiteX0" fmla="*/ 0 w 4724400"/>
-                  <a:gd name="connsiteY0" fmla="*/ 829733 h 4859867"/>
-                  <a:gd name="connsiteX1" fmla="*/ 1473200 w 4724400"/>
-                  <a:gd name="connsiteY1" fmla="*/ 152400 h 4859867"/>
-                  <a:gd name="connsiteX2" fmla="*/ 2878666 w 4724400"/>
-                  <a:gd name="connsiteY2" fmla="*/ 0 h 4859867"/>
-                  <a:gd name="connsiteX3" fmla="*/ 4250266 w 4724400"/>
-                  <a:gd name="connsiteY3" fmla="*/ 1710267 h 4859867"/>
-                  <a:gd name="connsiteX4" fmla="*/ 4724400 w 4724400"/>
-                  <a:gd name="connsiteY4" fmla="*/ 4114800 h 4859867"/>
-                  <a:gd name="connsiteX5" fmla="*/ 2607733 w 4724400"/>
-                  <a:gd name="connsiteY5" fmla="*/ 4859867 h 4859867"/>
-                  <a:gd name="connsiteX6" fmla="*/ 778933 w 4724400"/>
-                  <a:gd name="connsiteY6" fmla="*/ 4656667 h 4859867"/>
-                  <a:gd name="connsiteX7" fmla="*/ 0 w 4724400"/>
-                  <a:gd name="connsiteY7" fmla="*/ 829733 h 4859867"/>
-                </a:gdLst>
-                <a:ahLst/>
-                <a:cxnLst>
-                  <a:cxn ang="0">
-                    <a:pos x="connsiteX0" y="connsiteY0"/>
-                  </a:cxn>
-                  <a:cxn ang="0">
-                    <a:pos x="connsiteX1" y="connsiteY1"/>
-                  </a:cxn>
-                  <a:cxn ang="0">
-                    <a:pos x="connsiteX2" y="connsiteY2"/>
-                  </a:cxn>
-                  <a:cxn ang="0">
-                    <a:pos x="connsiteX3" y="connsiteY3"/>
-                  </a:cxn>
-                  <a:cxn ang="0">
-                    <a:pos x="connsiteX4" y="connsiteY4"/>
-                  </a:cxn>
-                  <a:cxn ang="0">
-                    <a:pos x="connsiteX5" y="connsiteY5"/>
-                  </a:cxn>
-                  <a:cxn ang="0">
-                    <a:pos x="connsiteX6" y="connsiteY6"/>
-                  </a:cxn>
-                  <a:cxn ang="0">
-                    <a:pos x="connsiteX7" y="connsiteY7"/>
-                  </a:cxn>
-                </a:cxnLst>
-                <a:rect l="l" t="t" r="r" b="b"/>
-                <a:pathLst>
-                  <a:path w="4724400" h="4859867">
-                    <a:moveTo>
-                      <a:pt x="0" y="829733"/>
-                    </a:moveTo>
-                    <a:lnTo>
-                      <a:pt x="1473200" y="152400"/>
-                    </a:lnTo>
-                    <a:lnTo>
-                      <a:pt x="2878666" y="0"/>
-                    </a:lnTo>
-                    <a:lnTo>
-                      <a:pt x="4250266" y="1710267"/>
-                    </a:lnTo>
-                    <a:lnTo>
-                      <a:pt x="4724400" y="4114800"/>
-                    </a:lnTo>
-                    <a:lnTo>
-                      <a:pt x="2607733" y="4859867"/>
-                    </a:lnTo>
-                    <a:lnTo>
-                      <a:pt x="778933" y="4656667"/>
-                    </a:lnTo>
-                    <a:lnTo>
-                      <a:pt x="0" y="829733"/>
-                    </a:lnTo>
-                    <a:close/>
-                  </a:path>
-                </a:pathLst>
-              </a:custGeom>
-              <a:solidFill>
-                <a:schemeClr val="bg1"/>
-              </a:solidFill>
-              <a:ln>
-                <a:noFill/>
-              </a:ln>
-            </p:spPr>
-            <p:style>
-              <a:lnRef idx="2">
-                <a:schemeClr val="accent1">
-                  <a:shade val="50000"/>
-                </a:schemeClr>
-              </a:lnRef>
-              <a:fillRef idx="1">
-                <a:schemeClr val="accent1"/>
-              </a:fillRef>
-              <a:effectRef idx="0">
-                <a:schemeClr val="accent1"/>
-              </a:effectRef>
-              <a:fontRef idx="minor">
-                <a:schemeClr val="lt1"/>
-              </a:fontRef>
-            </p:style>
-            <p:txBody>
-              <a:bodyPr rtlCol="0" anchor="ctr"/>
-              <a:lstStyle/>
-              <a:p>
-                <a:pPr algn="ctr"/>
-                <a:endParaRPr lang="en-US"/>
-              </a:p>
-            </p:txBody>
-          </p:sp>
-        </p:grpSp>
-        <p:grpSp>
-          <p:nvGrpSpPr>
-            <p:cNvPr id="79" name="Group 78">
+            <a:prstGeom prst="ellipse">
+              <a:avLst/>
+            </a:prstGeom>
+            <a:solidFill>
+              <a:srgbClr val="FF0000"/>
+            </a:solidFill>
+          </p:spPr>
+          <p:style>
+            <a:lnRef idx="2">
+              <a:schemeClr val="accent1">
+                <a:shade val="50000"/>
+              </a:schemeClr>
+            </a:lnRef>
+            <a:fillRef idx="1">
+              <a:schemeClr val="accent1"/>
+            </a:fillRef>
+            <a:effectRef idx="0">
+              <a:schemeClr val="accent1"/>
+            </a:effectRef>
+            <a:fontRef idx="minor">
+              <a:schemeClr val="lt1"/>
+            </a:fontRef>
+          </p:style>
+          <p:txBody>
+            <a:bodyPr rtlCol="0" anchor="ctr"/>
+            <a:lstStyle/>
+            <a:p>
+              <a:pPr algn="ctr"/>
+              <a:endParaRPr lang="en-US"/>
+            </a:p>
+          </p:txBody>
+        </p:sp>
+        <p:cxnSp>
+          <p:nvCxnSpPr>
+            <p:cNvPr id="81" name="Straight Arrow Connector 80">
               <a:extLst>
                 <a:ext uri="{FF2B5EF4-FFF2-40B4-BE49-F238E27FC236}">
-                  <a16:creationId xmlns:a16="http://schemas.microsoft.com/office/drawing/2014/main" id="{339A28F5-ABDA-7748-B530-45501C26AA79}"/>
+                  <a16:creationId xmlns:a16="http://schemas.microsoft.com/office/drawing/2014/main" id="{06DBEC98-CC52-6742-B293-CD80962F4972}"/>
                 </a:ext>
               </a:extLst>
             </p:cNvPr>
-            <p:cNvGrpSpPr/>
+            <p:cNvCxnSpPr>
+              <a:cxnSpLocks/>
+            </p:cNvCxnSpPr>
             <p:nvPr/>
-          </p:nvGrpSpPr>
-          <p:grpSpPr>
+          </p:nvCxnSpPr>
+          <p:spPr>
             <a:xfrm>
-              <a:off x="3038360" y="1378423"/>
-              <a:ext cx="4615511" cy="4785312"/>
-              <a:chOff x="3901956" y="1547755"/>
-              <a:chExt cx="3734336" cy="3980749"/>
+              <a:off x="7088017" y="3417651"/>
+              <a:ext cx="206947" cy="615181"/>
             </a:xfrm>
-          </p:grpSpPr>
-          <p:sp>
-            <p:nvSpPr>
-              <p:cNvPr id="80" name="Oval 79">
-                <a:extLst>
-                  <a:ext uri="{FF2B5EF4-FFF2-40B4-BE49-F238E27FC236}">
-                    <a16:creationId xmlns:a16="http://schemas.microsoft.com/office/drawing/2014/main" id="{B72B9474-4C21-8549-A90A-FF8F2E144255}"/>
-                  </a:ext>
-                </a:extLst>
-              </p:cNvPr>
-              <p:cNvSpPr/>
-              <p:nvPr/>
-            </p:nvSpPr>
-            <p:spPr>
-              <a:xfrm>
-                <a:off x="5636712" y="3369501"/>
-                <a:ext cx="100208" cy="100208"/>
-              </a:xfrm>
-              <a:prstGeom prst="ellipse">
-                <a:avLst/>
-              </a:prstGeom>
+            <a:prstGeom prst="straightConnector1">
+              <a:avLst/>
+            </a:prstGeom>
+            <a:ln>
               <a:solidFill>
                 <a:srgbClr val="FF0000"/>
               </a:solidFill>
-            </p:spPr>
-            <p:style>
-              <a:lnRef idx="2">
-                <a:schemeClr val="accent1">
-                  <a:shade val="50000"/>
-                </a:schemeClr>
-              </a:lnRef>
-              <a:fillRef idx="1">
+              <a:tailEnd type="triangle"/>
+            </a:ln>
+          </p:spPr>
+          <p:style>
+            <a:lnRef idx="1">
+              <a:schemeClr val="accent1"/>
+            </a:lnRef>
+            <a:fillRef idx="0">
+              <a:schemeClr val="accent1"/>
+            </a:fillRef>
+            <a:effectRef idx="0">
+              <a:schemeClr val="accent1"/>
+            </a:effectRef>
+            <a:fontRef idx="minor">
+              <a:schemeClr val="tx1"/>
+            </a:fontRef>
+          </p:style>
+        </p:cxnSp>
+        <p:cxnSp>
+          <p:nvCxnSpPr>
+            <p:cNvPr id="82" name="Straight Arrow Connector 81">
+              <a:extLst>
+                <a:ext uri="{FF2B5EF4-FFF2-40B4-BE49-F238E27FC236}">
+                  <a16:creationId xmlns:a16="http://schemas.microsoft.com/office/drawing/2014/main" id="{05A9B1DC-44B8-2143-81D8-7A5ED4659F24}"/>
+                </a:ext>
+              </a:extLst>
+            </p:cNvPr>
+            <p:cNvCxnSpPr>
+              <a:cxnSpLocks/>
+            </p:cNvCxnSpPr>
+            <p:nvPr/>
+          </p:nvCxnSpPr>
+          <p:spPr>
+            <a:xfrm flipH="1">
+              <a:off x="5669111" y="5191428"/>
+              <a:ext cx="392746" cy="61472"/>
+            </a:xfrm>
+            <a:prstGeom prst="straightConnector1">
+              <a:avLst/>
+            </a:prstGeom>
+            <a:ln>
+              <a:solidFill>
+                <a:schemeClr val="accent6"/>
+              </a:solidFill>
+              <a:tailEnd type="triangle"/>
+            </a:ln>
+          </p:spPr>
+          <p:style>
+            <a:lnRef idx="1">
+              <a:schemeClr val="accent1"/>
+            </a:lnRef>
+            <a:fillRef idx="0">
+              <a:schemeClr val="accent1"/>
+            </a:fillRef>
+            <a:effectRef idx="0">
+              <a:schemeClr val="accent1"/>
+            </a:effectRef>
+            <a:fontRef idx="minor">
+              <a:schemeClr val="tx1"/>
+            </a:fontRef>
+          </p:style>
+        </p:cxnSp>
+        <p:cxnSp>
+          <p:nvCxnSpPr>
+            <p:cNvPr id="83" name="Straight Arrow Connector 82">
+              <a:extLst>
+                <a:ext uri="{FF2B5EF4-FFF2-40B4-BE49-F238E27FC236}">
+                  <a16:creationId xmlns:a16="http://schemas.microsoft.com/office/drawing/2014/main" id="{2311765C-69EC-C040-AB5B-1BF5310B1A34}"/>
+                </a:ext>
+              </a:extLst>
+            </p:cNvPr>
+            <p:cNvCxnSpPr>
+              <a:cxnSpLocks/>
+            </p:cNvCxnSpPr>
+            <p:nvPr/>
+          </p:nvCxnSpPr>
+          <p:spPr>
+            <a:xfrm flipH="1" flipV="1">
+              <a:off x="4717387" y="4395034"/>
+              <a:ext cx="251275" cy="340062"/>
+            </a:xfrm>
+            <a:prstGeom prst="straightConnector1">
+              <a:avLst/>
+            </a:prstGeom>
+            <a:ln>
+              <a:solidFill>
+                <a:schemeClr val="accent4"/>
+              </a:solidFill>
+              <a:tailEnd type="triangle"/>
+            </a:ln>
+          </p:spPr>
+          <p:style>
+            <a:lnRef idx="1">
+              <a:schemeClr val="accent1"/>
+            </a:lnRef>
+            <a:fillRef idx="0">
+              <a:schemeClr val="accent1"/>
+            </a:fillRef>
+            <a:effectRef idx="0">
+              <a:schemeClr val="accent1"/>
+            </a:effectRef>
+            <a:fontRef idx="minor">
+              <a:schemeClr val="tx1"/>
+            </a:fontRef>
+          </p:style>
+        </p:cxnSp>
+        <p:cxnSp>
+          <p:nvCxnSpPr>
+            <p:cNvPr id="84" name="Straight Arrow Connector 83">
+              <a:extLst>
+                <a:ext uri="{FF2B5EF4-FFF2-40B4-BE49-F238E27FC236}">
+                  <a16:creationId xmlns:a16="http://schemas.microsoft.com/office/drawing/2014/main" id="{9F4AB773-8754-E245-80A5-02E90CAB34B6}"/>
+                </a:ext>
+              </a:extLst>
+            </p:cNvPr>
+            <p:cNvCxnSpPr>
+              <a:cxnSpLocks/>
+            </p:cNvCxnSpPr>
+            <p:nvPr/>
+          </p:nvCxnSpPr>
+          <p:spPr>
+            <a:xfrm flipV="1">
+              <a:off x="4480924" y="1819375"/>
+              <a:ext cx="352344" cy="213435"/>
+            </a:xfrm>
+            <a:prstGeom prst="straightConnector1">
+              <a:avLst/>
+            </a:prstGeom>
+            <a:ln>
+              <a:solidFill>
                 <a:schemeClr val="accent1"/>
-              </a:fillRef>
-              <a:effectRef idx="0">
+              </a:solidFill>
+              <a:tailEnd type="triangle"/>
+            </a:ln>
+          </p:spPr>
+          <p:style>
+            <a:lnRef idx="1">
+              <a:schemeClr val="accent1"/>
+            </a:lnRef>
+            <a:fillRef idx="0">
+              <a:schemeClr val="accent1"/>
+            </a:fillRef>
+            <a:effectRef idx="0">
+              <a:schemeClr val="accent1"/>
+            </a:effectRef>
+            <a:fontRef idx="minor">
+              <a:schemeClr val="tx1"/>
+            </a:fontRef>
+          </p:style>
+        </p:cxnSp>
+        <p:sp>
+          <p:nvSpPr>
+            <p:cNvPr id="85" name="TextBox 84">
+              <a:extLst>
+                <a:ext uri="{FF2B5EF4-FFF2-40B4-BE49-F238E27FC236}">
+                  <a16:creationId xmlns:a16="http://schemas.microsoft.com/office/drawing/2014/main" id="{70256FD7-6083-0D43-8525-213354FC3B66}"/>
+                </a:ext>
+              </a:extLst>
+            </p:cNvPr>
+            <p:cNvSpPr txBox="1"/>
+            <p:nvPr/>
+          </p:nvSpPr>
+          <p:spPr>
+            <a:xfrm>
+              <a:off x="7349398" y="3475225"/>
+              <a:ext cx="286894" cy="307236"/>
+            </a:xfrm>
+            <a:prstGeom prst="rect">
+              <a:avLst/>
+            </a:prstGeom>
+            <a:noFill/>
+          </p:spPr>
+          <p:txBody>
+            <a:bodyPr wrap="square" rtlCol="0">
+              <a:spAutoFit/>
+            </a:bodyPr>
+            <a:lstStyle/>
+            <a:p>
+              <a:r>
+                <a:rPr lang="en-US" dirty="0">
+                  <a:solidFill>
+                    <a:srgbClr val="FF0000"/>
+                  </a:solidFill>
+                  <a:latin typeface="CMU Serif Roman" panose="02000603000000000000" pitchFamily="2" charset="0"/>
+                  <a:ea typeface="CMU Serif Roman" panose="02000603000000000000" pitchFamily="2" charset="0"/>
+                  <a:cs typeface="CMU Serif Roman" panose="02000603000000000000" pitchFamily="2" charset="0"/>
+                </a:rPr>
+                <a:t>1</a:t>
+              </a:r>
+            </a:p>
+          </p:txBody>
+        </p:sp>
+        <p:sp>
+          <p:nvSpPr>
+            <p:cNvPr id="86" name="TextBox 85">
+              <a:extLst>
+                <a:ext uri="{FF2B5EF4-FFF2-40B4-BE49-F238E27FC236}">
+                  <a16:creationId xmlns:a16="http://schemas.microsoft.com/office/drawing/2014/main" id="{49C9A43A-065A-8D40-A486-A5299F94D8B5}"/>
+                </a:ext>
+              </a:extLst>
+            </p:cNvPr>
+            <p:cNvSpPr txBox="1"/>
+            <p:nvPr/>
+          </p:nvSpPr>
+          <p:spPr>
+            <a:xfrm>
+              <a:off x="5761973" y="5159172"/>
+              <a:ext cx="286894" cy="307236"/>
+            </a:xfrm>
+            <a:prstGeom prst="rect">
+              <a:avLst/>
+            </a:prstGeom>
+            <a:noFill/>
+          </p:spPr>
+          <p:txBody>
+            <a:bodyPr wrap="square" rtlCol="0">
+              <a:spAutoFit/>
+            </a:bodyPr>
+            <a:lstStyle/>
+            <a:p>
+              <a:r>
+                <a:rPr lang="en-US" dirty="0">
+                  <a:solidFill>
+                    <a:schemeClr val="accent6"/>
+                  </a:solidFill>
+                  <a:latin typeface="CMU Serif Roman" panose="02000603000000000000" pitchFamily="2" charset="0"/>
+                  <a:ea typeface="CMU Serif Roman" panose="02000603000000000000" pitchFamily="2" charset="0"/>
+                  <a:cs typeface="CMU Serif Roman" panose="02000603000000000000" pitchFamily="2" charset="0"/>
+                </a:rPr>
+                <a:t>2</a:t>
+              </a:r>
+            </a:p>
+          </p:txBody>
+        </p:sp>
+        <p:sp>
+          <p:nvSpPr>
+            <p:cNvPr id="87" name="TextBox 86">
+              <a:extLst>
+                <a:ext uri="{FF2B5EF4-FFF2-40B4-BE49-F238E27FC236}">
+                  <a16:creationId xmlns:a16="http://schemas.microsoft.com/office/drawing/2014/main" id="{08B56AF7-7044-4845-96DE-EDFAAFC0D928}"/>
+                </a:ext>
+              </a:extLst>
+            </p:cNvPr>
+            <p:cNvSpPr txBox="1"/>
+            <p:nvPr/>
+          </p:nvSpPr>
+          <p:spPr>
+            <a:xfrm>
+              <a:off x="4795008" y="4301945"/>
+              <a:ext cx="286894" cy="307236"/>
+            </a:xfrm>
+            <a:prstGeom prst="rect">
+              <a:avLst/>
+            </a:prstGeom>
+            <a:noFill/>
+          </p:spPr>
+          <p:txBody>
+            <a:bodyPr wrap="square" rtlCol="0">
+              <a:spAutoFit/>
+            </a:bodyPr>
+            <a:lstStyle/>
+            <a:p>
+              <a:r>
+                <a:rPr lang="en-US" dirty="0">
+                  <a:solidFill>
+                    <a:schemeClr val="accent4"/>
+                  </a:solidFill>
+                  <a:latin typeface="CMU Serif Roman" panose="02000603000000000000" pitchFamily="2" charset="0"/>
+                  <a:ea typeface="CMU Serif Roman" panose="02000603000000000000" pitchFamily="2" charset="0"/>
+                  <a:cs typeface="CMU Serif Roman" panose="02000603000000000000" pitchFamily="2" charset="0"/>
+                </a:rPr>
+                <a:t>3</a:t>
+              </a:r>
+            </a:p>
+          </p:txBody>
+        </p:sp>
+        <p:sp>
+          <p:nvSpPr>
+            <p:cNvPr id="88" name="TextBox 87">
+              <a:extLst>
+                <a:ext uri="{FF2B5EF4-FFF2-40B4-BE49-F238E27FC236}">
+                  <a16:creationId xmlns:a16="http://schemas.microsoft.com/office/drawing/2014/main" id="{DC81F505-9704-0F45-9FCF-DF4789C3478E}"/>
+                </a:ext>
+              </a:extLst>
+            </p:cNvPr>
+            <p:cNvSpPr txBox="1"/>
+            <p:nvPr/>
+          </p:nvSpPr>
+          <p:spPr>
+            <a:xfrm>
+              <a:off x="4417089" y="1674407"/>
+              <a:ext cx="286894" cy="307236"/>
+            </a:xfrm>
+            <a:prstGeom prst="rect">
+              <a:avLst/>
+            </a:prstGeom>
+            <a:noFill/>
+          </p:spPr>
+          <p:txBody>
+            <a:bodyPr wrap="square" rtlCol="0">
+              <a:spAutoFit/>
+            </a:bodyPr>
+            <a:lstStyle/>
+            <a:p>
+              <a:r>
+                <a:rPr lang="en-US" dirty="0">
+                  <a:solidFill>
+                    <a:schemeClr val="accent1"/>
+                  </a:solidFill>
+                  <a:latin typeface="CMU Serif Roman" panose="02000603000000000000" pitchFamily="2" charset="0"/>
+                  <a:ea typeface="CMU Serif Roman" panose="02000603000000000000" pitchFamily="2" charset="0"/>
+                  <a:cs typeface="CMU Serif Roman" panose="02000603000000000000" pitchFamily="2" charset="0"/>
+                </a:rPr>
+                <a:t>4</a:t>
+              </a:r>
+            </a:p>
+          </p:txBody>
+        </p:sp>
+        <p:sp>
+          <p:nvSpPr>
+            <p:cNvPr id="89" name="TextBox 88">
+              <a:extLst>
+                <a:ext uri="{FF2B5EF4-FFF2-40B4-BE49-F238E27FC236}">
+                  <a16:creationId xmlns:a16="http://schemas.microsoft.com/office/drawing/2014/main" id="{4D8D51FE-E35C-994E-82EB-BA43D87C3C9D}"/>
+                </a:ext>
+              </a:extLst>
+            </p:cNvPr>
+            <p:cNvSpPr txBox="1"/>
+            <p:nvPr/>
+          </p:nvSpPr>
+          <p:spPr>
+            <a:xfrm>
+              <a:off x="5563239" y="2952291"/>
+              <a:ext cx="785774" cy="307236"/>
+            </a:xfrm>
+            <a:prstGeom prst="rect">
+              <a:avLst/>
+            </a:prstGeom>
+            <a:noFill/>
+          </p:spPr>
+          <p:txBody>
+            <a:bodyPr wrap="square" rtlCol="0">
+              <a:spAutoFit/>
+            </a:bodyPr>
+            <a:lstStyle/>
+            <a:p>
+              <a:r>
+                <a:rPr lang="en-US" dirty="0">
+                  <a:solidFill>
+                    <a:schemeClr val="accent1"/>
+                  </a:solidFill>
+                  <a:latin typeface="CMU Serif Roman" panose="02000603000000000000" pitchFamily="2" charset="0"/>
+                  <a:ea typeface="CMU Serif Roman" panose="02000603000000000000" pitchFamily="2" charset="0"/>
+                  <a:cs typeface="CMU Serif Roman" panose="02000603000000000000" pitchFamily="2" charset="0"/>
+                </a:rPr>
+                <a:t>(0,0)</a:t>
+              </a:r>
+            </a:p>
+          </p:txBody>
+        </p:sp>
+        <p:sp>
+          <p:nvSpPr>
+            <p:cNvPr id="90" name="Freeform 89">
+              <a:extLst>
+                <a:ext uri="{FF2B5EF4-FFF2-40B4-BE49-F238E27FC236}">
+                  <a16:creationId xmlns:a16="http://schemas.microsoft.com/office/drawing/2014/main" id="{7BC174C5-DBBC-3241-8800-C935A26B20F4}"/>
+                </a:ext>
+              </a:extLst>
+            </p:cNvPr>
+            <p:cNvSpPr/>
+            <p:nvPr/>
+          </p:nvSpPr>
+          <p:spPr>
+            <a:xfrm>
+              <a:off x="5115896" y="1551431"/>
+              <a:ext cx="1767155" cy="1880170"/>
+            </a:xfrm>
+            <a:custGeom>
+              <a:avLst/>
+              <a:gdLst>
+                <a:gd name="connsiteX0" fmla="*/ 0 w 1767155"/>
+                <a:gd name="connsiteY0" fmla="*/ 123290 h 1880170"/>
+                <a:gd name="connsiteX1" fmla="*/ 842481 w 1767155"/>
+                <a:gd name="connsiteY1" fmla="*/ 0 h 1880170"/>
+                <a:gd name="connsiteX2" fmla="*/ 1767155 w 1767155"/>
+                <a:gd name="connsiteY2" fmla="*/ 1202076 h 1880170"/>
+                <a:gd name="connsiteX3" fmla="*/ 575353 w 1767155"/>
+                <a:gd name="connsiteY3" fmla="*/ 1880170 h 1880170"/>
+                <a:gd name="connsiteX4" fmla="*/ 0 w 1767155"/>
+                <a:gd name="connsiteY4" fmla="*/ 123290 h 1880170"/>
+              </a:gdLst>
+              <a:ahLst/>
+              <a:cxnLst>
+                <a:cxn ang="0">
+                  <a:pos x="connsiteX0" y="connsiteY0"/>
+                </a:cxn>
+                <a:cxn ang="0">
+                  <a:pos x="connsiteX1" y="connsiteY1"/>
+                </a:cxn>
+                <a:cxn ang="0">
+                  <a:pos x="connsiteX2" y="connsiteY2"/>
+                </a:cxn>
+                <a:cxn ang="0">
+                  <a:pos x="connsiteX3" y="connsiteY3"/>
+                </a:cxn>
+                <a:cxn ang="0">
+                  <a:pos x="connsiteX4" y="connsiteY4"/>
+                </a:cxn>
+              </a:cxnLst>
+              <a:rect l="l" t="t" r="r" b="b"/>
+              <a:pathLst>
+                <a:path w="1767155" h="1880170">
+                  <a:moveTo>
+                    <a:pt x="0" y="123290"/>
+                  </a:moveTo>
+                  <a:lnTo>
+                    <a:pt x="842481" y="0"/>
+                  </a:lnTo>
+                  <a:lnTo>
+                    <a:pt x="1767155" y="1202076"/>
+                  </a:lnTo>
+                  <a:lnTo>
+                    <a:pt x="575353" y="1880170"/>
+                  </a:lnTo>
+                  <a:lnTo>
+                    <a:pt x="0" y="123290"/>
+                  </a:lnTo>
+                  <a:close/>
+                </a:path>
+              </a:pathLst>
+            </a:custGeom>
+            <a:noFill/>
+          </p:spPr>
+          <p:style>
+            <a:lnRef idx="2">
+              <a:schemeClr val="accent1">
+                <a:shade val="50000"/>
+              </a:schemeClr>
+            </a:lnRef>
+            <a:fillRef idx="1">
+              <a:schemeClr val="accent1"/>
+            </a:fillRef>
+            <a:effectRef idx="0">
+              <a:schemeClr val="accent1"/>
+            </a:effectRef>
+            <a:fontRef idx="minor">
+              <a:schemeClr val="lt1"/>
+            </a:fontRef>
+          </p:style>
+          <p:txBody>
+            <a:bodyPr rtlCol="0" anchor="ctr"/>
+            <a:lstStyle/>
+            <a:p>
+              <a:pPr algn="ctr"/>
+              <a:endParaRPr lang="en-US"/>
+            </a:p>
+          </p:txBody>
+        </p:sp>
+        <p:sp>
+          <p:nvSpPr>
+            <p:cNvPr id="91" name="Freeform 90">
+              <a:extLst>
+                <a:ext uri="{FF2B5EF4-FFF2-40B4-BE49-F238E27FC236}">
+                  <a16:creationId xmlns:a16="http://schemas.microsoft.com/office/drawing/2014/main" id="{E121B036-8606-1649-B1DE-8C807B855F3C}"/>
+                </a:ext>
+              </a:extLst>
+            </p:cNvPr>
+            <p:cNvSpPr/>
+            <p:nvPr/>
+          </p:nvSpPr>
+          <p:spPr>
+            <a:xfrm>
+              <a:off x="5681131" y="3294799"/>
+              <a:ext cx="1767155" cy="1880170"/>
+            </a:xfrm>
+            <a:custGeom>
+              <a:avLst/>
+              <a:gdLst>
+                <a:gd name="connsiteX0" fmla="*/ 0 w 1767155"/>
+                <a:gd name="connsiteY0" fmla="*/ 123290 h 1880170"/>
+                <a:gd name="connsiteX1" fmla="*/ 842481 w 1767155"/>
+                <a:gd name="connsiteY1" fmla="*/ 0 h 1880170"/>
+                <a:gd name="connsiteX2" fmla="*/ 1767155 w 1767155"/>
+                <a:gd name="connsiteY2" fmla="*/ 1202076 h 1880170"/>
+                <a:gd name="connsiteX3" fmla="*/ 575353 w 1767155"/>
+                <a:gd name="connsiteY3" fmla="*/ 1880170 h 1880170"/>
+                <a:gd name="connsiteX4" fmla="*/ 0 w 1767155"/>
+                <a:gd name="connsiteY4" fmla="*/ 123290 h 1880170"/>
+              </a:gdLst>
+              <a:ahLst/>
+              <a:cxnLst>
+                <a:cxn ang="0">
+                  <a:pos x="connsiteX0" y="connsiteY0"/>
+                </a:cxn>
+                <a:cxn ang="0">
+                  <a:pos x="connsiteX1" y="connsiteY1"/>
+                </a:cxn>
+                <a:cxn ang="0">
+                  <a:pos x="connsiteX2" y="connsiteY2"/>
+                </a:cxn>
+                <a:cxn ang="0">
+                  <a:pos x="connsiteX3" y="connsiteY3"/>
+                </a:cxn>
+                <a:cxn ang="0">
+                  <a:pos x="connsiteX4" y="connsiteY4"/>
+                </a:cxn>
+              </a:cxnLst>
+              <a:rect l="l" t="t" r="r" b="b"/>
+              <a:pathLst>
+                <a:path w="1767155" h="1880170">
+                  <a:moveTo>
+                    <a:pt x="0" y="123290"/>
+                  </a:moveTo>
+                  <a:lnTo>
+                    <a:pt x="842481" y="0"/>
+                  </a:lnTo>
+                  <a:lnTo>
+                    <a:pt x="1767155" y="1202076"/>
+                  </a:lnTo>
+                  <a:lnTo>
+                    <a:pt x="575353" y="1880170"/>
+                  </a:lnTo>
+                  <a:lnTo>
+                    <a:pt x="0" y="123290"/>
+                  </a:lnTo>
+                  <a:close/>
+                </a:path>
+              </a:pathLst>
+            </a:custGeom>
+            <a:noFill/>
+            <a:ln>
+              <a:solidFill>
+                <a:srgbClr val="FF0000"/>
+              </a:solidFill>
+            </a:ln>
+          </p:spPr>
+          <p:style>
+            <a:lnRef idx="2">
+              <a:schemeClr val="accent1">
+                <a:shade val="50000"/>
+              </a:schemeClr>
+            </a:lnRef>
+            <a:fillRef idx="1">
+              <a:schemeClr val="accent1"/>
+            </a:fillRef>
+            <a:effectRef idx="0">
+              <a:schemeClr val="accent1"/>
+            </a:effectRef>
+            <a:fontRef idx="minor">
+              <a:schemeClr val="lt1"/>
+            </a:fontRef>
+          </p:style>
+          <p:txBody>
+            <a:bodyPr rtlCol="0" anchor="ctr"/>
+            <a:lstStyle/>
+            <a:p>
+              <a:pPr algn="ctr"/>
+              <a:endParaRPr lang="en-US"/>
+            </a:p>
+          </p:txBody>
+        </p:sp>
+        <p:sp>
+          <p:nvSpPr>
+            <p:cNvPr id="92" name="Freeform 91">
+              <a:extLst>
+                <a:ext uri="{FF2B5EF4-FFF2-40B4-BE49-F238E27FC236}">
+                  <a16:creationId xmlns:a16="http://schemas.microsoft.com/office/drawing/2014/main" id="{552628C8-4A9B-084A-B511-8F1BADE31BF7}"/>
+                </a:ext>
+              </a:extLst>
+            </p:cNvPr>
+            <p:cNvSpPr/>
+            <p:nvPr/>
+          </p:nvSpPr>
+          <p:spPr>
+            <a:xfrm>
+              <a:off x="4833268" y="3419605"/>
+              <a:ext cx="1767155" cy="1880170"/>
+            </a:xfrm>
+            <a:custGeom>
+              <a:avLst/>
+              <a:gdLst>
+                <a:gd name="connsiteX0" fmla="*/ 0 w 1767155"/>
+                <a:gd name="connsiteY0" fmla="*/ 123290 h 1880170"/>
+                <a:gd name="connsiteX1" fmla="*/ 842481 w 1767155"/>
+                <a:gd name="connsiteY1" fmla="*/ 0 h 1880170"/>
+                <a:gd name="connsiteX2" fmla="*/ 1767155 w 1767155"/>
+                <a:gd name="connsiteY2" fmla="*/ 1202076 h 1880170"/>
+                <a:gd name="connsiteX3" fmla="*/ 575353 w 1767155"/>
+                <a:gd name="connsiteY3" fmla="*/ 1880170 h 1880170"/>
+                <a:gd name="connsiteX4" fmla="*/ 0 w 1767155"/>
+                <a:gd name="connsiteY4" fmla="*/ 123290 h 1880170"/>
+              </a:gdLst>
+              <a:ahLst/>
+              <a:cxnLst>
+                <a:cxn ang="0">
+                  <a:pos x="connsiteX0" y="connsiteY0"/>
+                </a:cxn>
+                <a:cxn ang="0">
+                  <a:pos x="connsiteX1" y="connsiteY1"/>
+                </a:cxn>
+                <a:cxn ang="0">
+                  <a:pos x="connsiteX2" y="connsiteY2"/>
+                </a:cxn>
+                <a:cxn ang="0">
+                  <a:pos x="connsiteX3" y="connsiteY3"/>
+                </a:cxn>
+                <a:cxn ang="0">
+                  <a:pos x="connsiteX4" y="connsiteY4"/>
+                </a:cxn>
+              </a:cxnLst>
+              <a:rect l="l" t="t" r="r" b="b"/>
+              <a:pathLst>
+                <a:path w="1767155" h="1880170">
+                  <a:moveTo>
+                    <a:pt x="0" y="123290"/>
+                  </a:moveTo>
+                  <a:lnTo>
+                    <a:pt x="842481" y="0"/>
+                  </a:lnTo>
+                  <a:lnTo>
+                    <a:pt x="1767155" y="1202076"/>
+                  </a:lnTo>
+                  <a:lnTo>
+                    <a:pt x="575353" y="1880170"/>
+                  </a:lnTo>
+                  <a:lnTo>
+                    <a:pt x="0" y="123290"/>
+                  </a:lnTo>
+                  <a:close/>
+                </a:path>
+              </a:pathLst>
+            </a:custGeom>
+            <a:noFill/>
+            <a:ln>
+              <a:solidFill>
+                <a:srgbClr val="92D050"/>
+              </a:solidFill>
+            </a:ln>
+          </p:spPr>
+          <p:style>
+            <a:lnRef idx="2">
+              <a:schemeClr val="accent1">
+                <a:shade val="50000"/>
+              </a:schemeClr>
+            </a:lnRef>
+            <a:fillRef idx="1">
+              <a:schemeClr val="accent1"/>
+            </a:fillRef>
+            <a:effectRef idx="0">
+              <a:schemeClr val="accent1"/>
+            </a:effectRef>
+            <a:fontRef idx="minor">
+              <a:schemeClr val="lt1"/>
+            </a:fontRef>
+          </p:style>
+          <p:txBody>
+            <a:bodyPr rtlCol="0" anchor="ctr"/>
+            <a:lstStyle/>
+            <a:p>
+              <a:pPr algn="ctr"/>
+              <a:endParaRPr lang="en-US"/>
+            </a:p>
+          </p:txBody>
+        </p:sp>
+        <p:sp>
+          <p:nvSpPr>
+            <p:cNvPr id="93" name="Freeform 92">
+              <a:extLst>
+                <a:ext uri="{FF2B5EF4-FFF2-40B4-BE49-F238E27FC236}">
+                  <a16:creationId xmlns:a16="http://schemas.microsoft.com/office/drawing/2014/main" id="{AB104962-2946-F94C-BA79-7D1EDA1EFE44}"/>
+                </a:ext>
+              </a:extLst>
+            </p:cNvPr>
+            <p:cNvSpPr/>
+            <p:nvPr/>
+          </p:nvSpPr>
+          <p:spPr>
+            <a:xfrm>
+              <a:off x="3901956" y="2220925"/>
+              <a:ext cx="1767155" cy="1880170"/>
+            </a:xfrm>
+            <a:custGeom>
+              <a:avLst/>
+              <a:gdLst>
+                <a:gd name="connsiteX0" fmla="*/ 0 w 1767155"/>
+                <a:gd name="connsiteY0" fmla="*/ 123290 h 1880170"/>
+                <a:gd name="connsiteX1" fmla="*/ 842481 w 1767155"/>
+                <a:gd name="connsiteY1" fmla="*/ 0 h 1880170"/>
+                <a:gd name="connsiteX2" fmla="*/ 1767155 w 1767155"/>
+                <a:gd name="connsiteY2" fmla="*/ 1202076 h 1880170"/>
+                <a:gd name="connsiteX3" fmla="*/ 575353 w 1767155"/>
+                <a:gd name="connsiteY3" fmla="*/ 1880170 h 1880170"/>
+                <a:gd name="connsiteX4" fmla="*/ 0 w 1767155"/>
+                <a:gd name="connsiteY4" fmla="*/ 123290 h 1880170"/>
+              </a:gdLst>
+              <a:ahLst/>
+              <a:cxnLst>
+                <a:cxn ang="0">
+                  <a:pos x="connsiteX0" y="connsiteY0"/>
+                </a:cxn>
+                <a:cxn ang="0">
+                  <a:pos x="connsiteX1" y="connsiteY1"/>
+                </a:cxn>
+                <a:cxn ang="0">
+                  <a:pos x="connsiteX2" y="connsiteY2"/>
+                </a:cxn>
+                <a:cxn ang="0">
+                  <a:pos x="connsiteX3" y="connsiteY3"/>
+                </a:cxn>
+                <a:cxn ang="0">
+                  <a:pos x="connsiteX4" y="connsiteY4"/>
+                </a:cxn>
+              </a:cxnLst>
+              <a:rect l="l" t="t" r="r" b="b"/>
+              <a:pathLst>
+                <a:path w="1767155" h="1880170">
+                  <a:moveTo>
+                    <a:pt x="0" y="123290"/>
+                  </a:moveTo>
+                  <a:lnTo>
+                    <a:pt x="842481" y="0"/>
+                  </a:lnTo>
+                  <a:lnTo>
+                    <a:pt x="1767155" y="1202076"/>
+                  </a:lnTo>
+                  <a:lnTo>
+                    <a:pt x="575353" y="1880170"/>
+                  </a:lnTo>
+                  <a:lnTo>
+                    <a:pt x="0" y="123290"/>
+                  </a:lnTo>
+                  <a:close/>
+                </a:path>
+              </a:pathLst>
+            </a:custGeom>
+            <a:noFill/>
+            <a:ln>
+              <a:solidFill>
+                <a:srgbClr val="FFC000"/>
+              </a:solidFill>
+            </a:ln>
+          </p:spPr>
+          <p:style>
+            <a:lnRef idx="2">
+              <a:schemeClr val="accent1">
+                <a:shade val="50000"/>
+              </a:schemeClr>
+            </a:lnRef>
+            <a:fillRef idx="1">
+              <a:schemeClr val="accent1"/>
+            </a:fillRef>
+            <a:effectRef idx="0">
+              <a:schemeClr val="accent1"/>
+            </a:effectRef>
+            <a:fontRef idx="minor">
+              <a:schemeClr val="lt1"/>
+            </a:fontRef>
+          </p:style>
+          <p:txBody>
+            <a:bodyPr rtlCol="0" anchor="ctr"/>
+            <a:lstStyle/>
+            <a:p>
+              <a:pPr algn="ctr"/>
+              <a:endParaRPr lang="en-US"/>
+            </a:p>
+          </p:txBody>
+        </p:sp>
+        <p:sp>
+          <p:nvSpPr>
+            <p:cNvPr id="94" name="Freeform 93">
+              <a:extLst>
+                <a:ext uri="{FF2B5EF4-FFF2-40B4-BE49-F238E27FC236}">
+                  <a16:creationId xmlns:a16="http://schemas.microsoft.com/office/drawing/2014/main" id="{DF78B9D8-BC1B-1C4D-933E-5210B8F5E63B}"/>
+                </a:ext>
+              </a:extLst>
+            </p:cNvPr>
+            <p:cNvSpPr/>
+            <p:nvPr/>
+          </p:nvSpPr>
+          <p:spPr>
+            <a:xfrm>
+              <a:off x="3910156" y="1547755"/>
+              <a:ext cx="3534310" cy="3739793"/>
+            </a:xfrm>
+            <a:custGeom>
+              <a:avLst/>
+              <a:gdLst>
+                <a:gd name="connsiteX0" fmla="*/ 0 w 3534310"/>
+                <a:gd name="connsiteY0" fmla="*/ 801384 h 3739793"/>
+                <a:gd name="connsiteX1" fmla="*/ 1191802 w 3534310"/>
+                <a:gd name="connsiteY1" fmla="*/ 123290 h 3739793"/>
+                <a:gd name="connsiteX2" fmla="*/ 2044557 w 3534310"/>
+                <a:gd name="connsiteY2" fmla="*/ 0 h 3739793"/>
+                <a:gd name="connsiteX3" fmla="*/ 2969232 w 3534310"/>
+                <a:gd name="connsiteY3" fmla="*/ 1202076 h 3739793"/>
+                <a:gd name="connsiteX4" fmla="*/ 3534310 w 3534310"/>
+                <a:gd name="connsiteY4" fmla="*/ 2958957 h 3739793"/>
+                <a:gd name="connsiteX5" fmla="*/ 2342508 w 3534310"/>
+                <a:gd name="connsiteY5" fmla="*/ 3626777 h 3739793"/>
+                <a:gd name="connsiteX6" fmla="*/ 1489753 w 3534310"/>
+                <a:gd name="connsiteY6" fmla="*/ 3739793 h 3739793"/>
+                <a:gd name="connsiteX7" fmla="*/ 565079 w 3534310"/>
+                <a:gd name="connsiteY7" fmla="*/ 2547991 h 3739793"/>
+                <a:gd name="connsiteX8" fmla="*/ 0 w 3534310"/>
+                <a:gd name="connsiteY8" fmla="*/ 801384 h 3739793"/>
+              </a:gdLst>
+              <a:ahLst/>
+              <a:cxnLst>
+                <a:cxn ang="0">
+                  <a:pos x="connsiteX0" y="connsiteY0"/>
+                </a:cxn>
+                <a:cxn ang="0">
+                  <a:pos x="connsiteX1" y="connsiteY1"/>
+                </a:cxn>
+                <a:cxn ang="0">
+                  <a:pos x="connsiteX2" y="connsiteY2"/>
+                </a:cxn>
+                <a:cxn ang="0">
+                  <a:pos x="connsiteX3" y="connsiteY3"/>
+                </a:cxn>
+                <a:cxn ang="0">
+                  <a:pos x="connsiteX4" y="connsiteY4"/>
+                </a:cxn>
+                <a:cxn ang="0">
+                  <a:pos x="connsiteX5" y="connsiteY5"/>
+                </a:cxn>
+                <a:cxn ang="0">
+                  <a:pos x="connsiteX6" y="connsiteY6"/>
+                </a:cxn>
+                <a:cxn ang="0">
+                  <a:pos x="connsiteX7" y="connsiteY7"/>
+                </a:cxn>
+                <a:cxn ang="0">
+                  <a:pos x="connsiteX8" y="connsiteY8"/>
+                </a:cxn>
+              </a:cxnLst>
+              <a:rect l="l" t="t" r="r" b="b"/>
+              <a:pathLst>
+                <a:path w="3534310" h="3739793">
+                  <a:moveTo>
+                    <a:pt x="0" y="801384"/>
+                  </a:moveTo>
+                  <a:lnTo>
+                    <a:pt x="1191802" y="123290"/>
+                  </a:lnTo>
+                  <a:lnTo>
+                    <a:pt x="2044557" y="0"/>
+                  </a:lnTo>
+                  <a:lnTo>
+                    <a:pt x="2969232" y="1202076"/>
+                  </a:lnTo>
+                  <a:lnTo>
+                    <a:pt x="3534310" y="2958957"/>
+                  </a:lnTo>
+                  <a:lnTo>
+                    <a:pt x="2342508" y="3626777"/>
+                  </a:lnTo>
+                  <a:lnTo>
+                    <a:pt x="1489753" y="3739793"/>
+                  </a:lnTo>
+                  <a:lnTo>
+                    <a:pt x="565079" y="2547991"/>
+                  </a:lnTo>
+                  <a:lnTo>
+                    <a:pt x="0" y="801384"/>
+                  </a:lnTo>
+                  <a:close/>
+                </a:path>
+              </a:pathLst>
+            </a:custGeom>
+            <a:noFill/>
+            <a:ln>
+              <a:prstDash val="dash"/>
+            </a:ln>
+          </p:spPr>
+          <p:style>
+            <a:lnRef idx="2">
+              <a:schemeClr val="accent1">
+                <a:shade val="50000"/>
+              </a:schemeClr>
+            </a:lnRef>
+            <a:fillRef idx="1">
+              <a:schemeClr val="accent1"/>
+            </a:fillRef>
+            <a:effectRef idx="0">
+              <a:schemeClr val="accent1"/>
+            </a:effectRef>
+            <a:fontRef idx="minor">
+              <a:schemeClr val="lt1"/>
+            </a:fontRef>
+          </p:style>
+          <p:txBody>
+            <a:bodyPr rtlCol="0" anchor="ctr"/>
+            <a:lstStyle/>
+            <a:p>
+              <a:pPr algn="ctr"/>
+              <a:endParaRPr lang="en-US"/>
+            </a:p>
+          </p:txBody>
+        </p:sp>
+        <p:cxnSp>
+          <p:nvCxnSpPr>
+            <p:cNvPr id="95" name="Straight Arrow Connector 94">
+              <a:extLst>
+                <a:ext uri="{FF2B5EF4-FFF2-40B4-BE49-F238E27FC236}">
+                  <a16:creationId xmlns:a16="http://schemas.microsoft.com/office/drawing/2014/main" id="{FBC1AA6E-FD0E-3141-AEEA-B8C5309592DD}"/>
+                </a:ext>
+              </a:extLst>
+            </p:cNvPr>
+            <p:cNvCxnSpPr>
+              <a:cxnSpLocks/>
+            </p:cNvCxnSpPr>
+            <p:nvPr/>
+          </p:nvCxnSpPr>
+          <p:spPr>
+            <a:xfrm flipV="1">
+              <a:off x="5160811" y="3511644"/>
+              <a:ext cx="352344" cy="213435"/>
+            </a:xfrm>
+            <a:prstGeom prst="straightConnector1">
+              <a:avLst/>
+            </a:prstGeom>
+            <a:ln>
+              <a:solidFill>
                 <a:schemeClr val="accent1"/>
-              </a:effectRef>
-              <a:fontRef idx="minor">
-                <a:schemeClr val="lt1"/>
-              </a:fontRef>
-            </p:style>
-            <p:txBody>
-              <a:bodyPr rtlCol="0" anchor="ctr"/>
-              <a:lstStyle/>
-              <a:p>
-                <a:pPr algn="ctr"/>
-                <a:endParaRPr lang="en-US"/>
-              </a:p>
-            </p:txBody>
-          </p:sp>
-          <p:cxnSp>
-            <p:nvCxnSpPr>
-              <p:cNvPr id="81" name="Straight Arrow Connector 80">
-                <a:extLst>
-                  <a:ext uri="{FF2B5EF4-FFF2-40B4-BE49-F238E27FC236}">
-                    <a16:creationId xmlns:a16="http://schemas.microsoft.com/office/drawing/2014/main" id="{06DBEC98-CC52-6742-B293-CD80962F4972}"/>
-                  </a:ext>
-                </a:extLst>
-              </p:cNvPr>
-              <p:cNvCxnSpPr>
-                <a:cxnSpLocks/>
-              </p:cNvCxnSpPr>
-              <p:nvPr/>
-            </p:nvCxnSpPr>
-            <p:spPr>
-              <a:xfrm>
-                <a:off x="7088017" y="3417651"/>
-                <a:ext cx="206947" cy="615181"/>
-              </a:xfrm>
-              <a:prstGeom prst="straightConnector1">
-                <a:avLst/>
-              </a:prstGeom>
-              <a:ln>
-                <a:solidFill>
-                  <a:srgbClr val="FF0000"/>
-                </a:solidFill>
-                <a:tailEnd type="triangle"/>
-              </a:ln>
-            </p:spPr>
-            <p:style>
-              <a:lnRef idx="1">
-                <a:schemeClr val="accent1"/>
-              </a:lnRef>
-              <a:fillRef idx="0">
-                <a:schemeClr val="accent1"/>
-              </a:fillRef>
-              <a:effectRef idx="0">
-                <a:schemeClr val="accent1"/>
-              </a:effectRef>
-              <a:fontRef idx="minor">
-                <a:schemeClr val="tx1"/>
-              </a:fontRef>
-            </p:style>
-          </p:cxnSp>
-          <p:cxnSp>
-            <p:nvCxnSpPr>
-              <p:cNvPr id="82" name="Straight Arrow Connector 81">
-                <a:extLst>
-                  <a:ext uri="{FF2B5EF4-FFF2-40B4-BE49-F238E27FC236}">
-                    <a16:creationId xmlns:a16="http://schemas.microsoft.com/office/drawing/2014/main" id="{05A9B1DC-44B8-2143-81D8-7A5ED4659F24}"/>
-                  </a:ext>
-                </a:extLst>
-              </p:cNvPr>
-              <p:cNvCxnSpPr>
-                <a:cxnSpLocks/>
-              </p:cNvCxnSpPr>
-              <p:nvPr/>
-            </p:nvCxnSpPr>
-            <p:spPr>
-              <a:xfrm flipH="1">
-                <a:off x="5669111" y="5191428"/>
-                <a:ext cx="392746" cy="61472"/>
-              </a:xfrm>
-              <a:prstGeom prst="straightConnector1">
-                <a:avLst/>
-              </a:prstGeom>
-              <a:ln>
-                <a:solidFill>
-                  <a:schemeClr val="accent6"/>
-                </a:solidFill>
-                <a:tailEnd type="triangle"/>
-              </a:ln>
-            </p:spPr>
-            <p:style>
-              <a:lnRef idx="1">
-                <a:schemeClr val="accent1"/>
-              </a:lnRef>
-              <a:fillRef idx="0">
-                <a:schemeClr val="accent1"/>
-              </a:fillRef>
-              <a:effectRef idx="0">
-                <a:schemeClr val="accent1"/>
-              </a:effectRef>
-              <a:fontRef idx="minor">
-                <a:schemeClr val="tx1"/>
-              </a:fontRef>
-            </p:style>
-          </p:cxnSp>
-          <p:cxnSp>
-            <p:nvCxnSpPr>
-              <p:cNvPr id="83" name="Straight Arrow Connector 82">
-                <a:extLst>
-                  <a:ext uri="{FF2B5EF4-FFF2-40B4-BE49-F238E27FC236}">
-                    <a16:creationId xmlns:a16="http://schemas.microsoft.com/office/drawing/2014/main" id="{2311765C-69EC-C040-AB5B-1BF5310B1A34}"/>
-                  </a:ext>
-                </a:extLst>
-              </p:cNvPr>
-              <p:cNvCxnSpPr>
-                <a:cxnSpLocks/>
-              </p:cNvCxnSpPr>
-              <p:nvPr/>
-            </p:nvCxnSpPr>
-            <p:spPr>
-              <a:xfrm flipH="1" flipV="1">
-                <a:off x="4717387" y="4395034"/>
-                <a:ext cx="251275" cy="340062"/>
-              </a:xfrm>
-              <a:prstGeom prst="straightConnector1">
-                <a:avLst/>
-              </a:prstGeom>
-              <a:ln>
-                <a:solidFill>
-                  <a:schemeClr val="accent4"/>
-                </a:solidFill>
-                <a:tailEnd type="triangle"/>
-              </a:ln>
-            </p:spPr>
-            <p:style>
-              <a:lnRef idx="1">
-                <a:schemeClr val="accent1"/>
-              </a:lnRef>
-              <a:fillRef idx="0">
-                <a:schemeClr val="accent1"/>
-              </a:fillRef>
-              <a:effectRef idx="0">
-                <a:schemeClr val="accent1"/>
-              </a:effectRef>
-              <a:fontRef idx="minor">
-                <a:schemeClr val="tx1"/>
-              </a:fontRef>
-            </p:style>
-          </p:cxnSp>
-          <p:cxnSp>
-            <p:nvCxnSpPr>
-              <p:cNvPr id="84" name="Straight Arrow Connector 83">
-                <a:extLst>
-                  <a:ext uri="{FF2B5EF4-FFF2-40B4-BE49-F238E27FC236}">
-                    <a16:creationId xmlns:a16="http://schemas.microsoft.com/office/drawing/2014/main" id="{9F4AB773-8754-E245-80A5-02E90CAB34B6}"/>
-                  </a:ext>
-                </a:extLst>
-              </p:cNvPr>
-              <p:cNvCxnSpPr>
-                <a:cxnSpLocks/>
-              </p:cNvCxnSpPr>
-              <p:nvPr/>
-            </p:nvCxnSpPr>
-            <p:spPr>
-              <a:xfrm flipV="1">
-                <a:off x="4480924" y="1819375"/>
-                <a:ext cx="352344" cy="213435"/>
-              </a:xfrm>
-              <a:prstGeom prst="straightConnector1">
-                <a:avLst/>
-              </a:prstGeom>
-              <a:ln>
-                <a:solidFill>
-                  <a:schemeClr val="accent1"/>
-                </a:solidFill>
-                <a:tailEnd type="triangle"/>
-              </a:ln>
-            </p:spPr>
-            <p:style>
-              <a:lnRef idx="1">
-                <a:schemeClr val="accent1"/>
-              </a:lnRef>
-              <a:fillRef idx="0">
-                <a:schemeClr val="accent1"/>
-              </a:fillRef>
-              <a:effectRef idx="0">
-                <a:schemeClr val="accent1"/>
-              </a:effectRef>
-              <a:fontRef idx="minor">
-                <a:schemeClr val="tx1"/>
-              </a:fontRef>
-            </p:style>
-          </p:cxnSp>
-          <p:sp>
-            <p:nvSpPr>
-              <p:cNvPr id="85" name="TextBox 84">
-                <a:extLst>
-                  <a:ext uri="{FF2B5EF4-FFF2-40B4-BE49-F238E27FC236}">
-                    <a16:creationId xmlns:a16="http://schemas.microsoft.com/office/drawing/2014/main" id="{70256FD7-6083-0D43-8525-213354FC3B66}"/>
-                  </a:ext>
-                </a:extLst>
-              </p:cNvPr>
-              <p:cNvSpPr txBox="1"/>
-              <p:nvPr/>
-            </p:nvSpPr>
-            <p:spPr>
-              <a:xfrm>
-                <a:off x="7349398" y="3475225"/>
-                <a:ext cx="286894" cy="369332"/>
-              </a:xfrm>
-              <a:prstGeom prst="rect">
-                <a:avLst/>
-              </a:prstGeom>
-              <a:noFill/>
-            </p:spPr>
-            <p:txBody>
-              <a:bodyPr wrap="square" rtlCol="0">
-                <a:spAutoFit/>
-              </a:bodyPr>
-              <a:lstStyle/>
-              <a:p>
-                <a:r>
-                  <a:rPr lang="en-US" dirty="0">
-                    <a:solidFill>
-                      <a:srgbClr val="FF0000"/>
-                    </a:solidFill>
-                    <a:latin typeface="CMU Serif Roman" panose="02000603000000000000" pitchFamily="2" charset="0"/>
-                    <a:ea typeface="CMU Serif Roman" panose="02000603000000000000" pitchFamily="2" charset="0"/>
-                    <a:cs typeface="CMU Serif Roman" panose="02000603000000000000" pitchFamily="2" charset="0"/>
-                  </a:rPr>
-                  <a:t>1</a:t>
-                </a:r>
-              </a:p>
-            </p:txBody>
-          </p:sp>
-          <p:sp>
-            <p:nvSpPr>
-              <p:cNvPr id="86" name="TextBox 85">
-                <a:extLst>
-                  <a:ext uri="{FF2B5EF4-FFF2-40B4-BE49-F238E27FC236}">
-                    <a16:creationId xmlns:a16="http://schemas.microsoft.com/office/drawing/2014/main" id="{49C9A43A-065A-8D40-A486-A5299F94D8B5}"/>
-                  </a:ext>
-                </a:extLst>
-              </p:cNvPr>
-              <p:cNvSpPr txBox="1"/>
-              <p:nvPr/>
-            </p:nvSpPr>
-            <p:spPr>
-              <a:xfrm>
-                <a:off x="5761973" y="5159172"/>
-                <a:ext cx="286894" cy="369332"/>
-              </a:xfrm>
-              <a:prstGeom prst="rect">
-                <a:avLst/>
-              </a:prstGeom>
-              <a:noFill/>
-            </p:spPr>
-            <p:txBody>
-              <a:bodyPr wrap="square" rtlCol="0">
-                <a:spAutoFit/>
-              </a:bodyPr>
-              <a:lstStyle/>
-              <a:p>
-                <a:r>
-                  <a:rPr lang="en-US" dirty="0">
-                    <a:solidFill>
-                      <a:schemeClr val="accent6"/>
-                    </a:solidFill>
-                    <a:latin typeface="CMU Serif Roman" panose="02000603000000000000" pitchFamily="2" charset="0"/>
-                    <a:ea typeface="CMU Serif Roman" panose="02000603000000000000" pitchFamily="2" charset="0"/>
-                    <a:cs typeface="CMU Serif Roman" panose="02000603000000000000" pitchFamily="2" charset="0"/>
-                  </a:rPr>
-                  <a:t>2</a:t>
-                </a:r>
-              </a:p>
-            </p:txBody>
-          </p:sp>
-          <p:sp>
-            <p:nvSpPr>
-              <p:cNvPr id="87" name="TextBox 86">
-                <a:extLst>
-                  <a:ext uri="{FF2B5EF4-FFF2-40B4-BE49-F238E27FC236}">
-                    <a16:creationId xmlns:a16="http://schemas.microsoft.com/office/drawing/2014/main" id="{08B56AF7-7044-4845-96DE-EDFAAFC0D928}"/>
-                  </a:ext>
-                </a:extLst>
-              </p:cNvPr>
-              <p:cNvSpPr txBox="1"/>
-              <p:nvPr/>
-            </p:nvSpPr>
-            <p:spPr>
-              <a:xfrm>
-                <a:off x="4795008" y="4301945"/>
-                <a:ext cx="286894" cy="369332"/>
-              </a:xfrm>
-              <a:prstGeom prst="rect">
-                <a:avLst/>
-              </a:prstGeom>
-              <a:noFill/>
-            </p:spPr>
-            <p:txBody>
-              <a:bodyPr wrap="square" rtlCol="0">
-                <a:spAutoFit/>
-              </a:bodyPr>
-              <a:lstStyle/>
-              <a:p>
-                <a:r>
-                  <a:rPr lang="en-US" dirty="0">
-                    <a:solidFill>
-                      <a:schemeClr val="accent4"/>
-                    </a:solidFill>
-                    <a:latin typeface="CMU Serif Roman" panose="02000603000000000000" pitchFamily="2" charset="0"/>
-                    <a:ea typeface="CMU Serif Roman" panose="02000603000000000000" pitchFamily="2" charset="0"/>
-                    <a:cs typeface="CMU Serif Roman" panose="02000603000000000000" pitchFamily="2" charset="0"/>
-                  </a:rPr>
-                  <a:t>3</a:t>
-                </a:r>
-              </a:p>
-            </p:txBody>
-          </p:sp>
-          <p:sp>
-            <p:nvSpPr>
-              <p:cNvPr id="88" name="TextBox 87">
-                <a:extLst>
-                  <a:ext uri="{FF2B5EF4-FFF2-40B4-BE49-F238E27FC236}">
-                    <a16:creationId xmlns:a16="http://schemas.microsoft.com/office/drawing/2014/main" id="{DC81F505-9704-0F45-9FCF-DF4789C3478E}"/>
-                  </a:ext>
-                </a:extLst>
-              </p:cNvPr>
-              <p:cNvSpPr txBox="1"/>
-              <p:nvPr/>
-            </p:nvSpPr>
-            <p:spPr>
-              <a:xfrm>
-                <a:off x="4417089" y="1674407"/>
-                <a:ext cx="286894" cy="369332"/>
-              </a:xfrm>
-              <a:prstGeom prst="rect">
-                <a:avLst/>
-              </a:prstGeom>
-              <a:noFill/>
-            </p:spPr>
-            <p:txBody>
-              <a:bodyPr wrap="square" rtlCol="0">
-                <a:spAutoFit/>
-              </a:bodyPr>
-              <a:lstStyle/>
-              <a:p>
-                <a:r>
-                  <a:rPr lang="en-US" dirty="0">
-                    <a:solidFill>
-                      <a:schemeClr val="accent1"/>
-                    </a:solidFill>
-                    <a:latin typeface="CMU Serif Roman" panose="02000603000000000000" pitchFamily="2" charset="0"/>
-                    <a:ea typeface="CMU Serif Roman" panose="02000603000000000000" pitchFamily="2" charset="0"/>
-                    <a:cs typeface="CMU Serif Roman" panose="02000603000000000000" pitchFamily="2" charset="0"/>
-                  </a:rPr>
-                  <a:t>4</a:t>
-                </a:r>
-              </a:p>
-            </p:txBody>
-          </p:sp>
-          <p:sp>
-            <p:nvSpPr>
-              <p:cNvPr id="89" name="TextBox 88">
-                <a:extLst>
-                  <a:ext uri="{FF2B5EF4-FFF2-40B4-BE49-F238E27FC236}">
-                    <a16:creationId xmlns:a16="http://schemas.microsoft.com/office/drawing/2014/main" id="{4D8D51FE-E35C-994E-82EB-BA43D87C3C9D}"/>
-                  </a:ext>
-                </a:extLst>
-              </p:cNvPr>
-              <p:cNvSpPr txBox="1"/>
-              <p:nvPr/>
-            </p:nvSpPr>
-            <p:spPr>
-              <a:xfrm>
-                <a:off x="5563239" y="2952291"/>
-                <a:ext cx="785774" cy="369332"/>
-              </a:xfrm>
-              <a:prstGeom prst="rect">
-                <a:avLst/>
-              </a:prstGeom>
-              <a:noFill/>
-            </p:spPr>
-            <p:txBody>
-              <a:bodyPr wrap="square" rtlCol="0">
-                <a:spAutoFit/>
-              </a:bodyPr>
-              <a:lstStyle/>
-              <a:p>
-                <a:r>
-                  <a:rPr lang="en-US" dirty="0">
-                    <a:solidFill>
-                      <a:schemeClr val="accent1"/>
-                    </a:solidFill>
-                    <a:latin typeface="CMU Serif Roman" panose="02000603000000000000" pitchFamily="2" charset="0"/>
-                    <a:ea typeface="CMU Serif Roman" panose="02000603000000000000" pitchFamily="2" charset="0"/>
-                    <a:cs typeface="CMU Serif Roman" panose="02000603000000000000" pitchFamily="2" charset="0"/>
-                  </a:rPr>
-                  <a:t>(0,0)</a:t>
-                </a:r>
-              </a:p>
-            </p:txBody>
-          </p:sp>
-          <p:sp>
-            <p:nvSpPr>
-              <p:cNvPr id="90" name="Freeform 89">
-                <a:extLst>
-                  <a:ext uri="{FF2B5EF4-FFF2-40B4-BE49-F238E27FC236}">
-                    <a16:creationId xmlns:a16="http://schemas.microsoft.com/office/drawing/2014/main" id="{7BC174C5-DBBC-3241-8800-C935A26B20F4}"/>
-                  </a:ext>
-                </a:extLst>
-              </p:cNvPr>
-              <p:cNvSpPr/>
-              <p:nvPr/>
-            </p:nvSpPr>
-            <p:spPr>
-              <a:xfrm>
-                <a:off x="5115896" y="1551431"/>
-                <a:ext cx="1767155" cy="1880170"/>
-              </a:xfrm>
-              <a:custGeom>
-                <a:avLst/>
-                <a:gdLst>
-                  <a:gd name="connsiteX0" fmla="*/ 0 w 1767155"/>
-                  <a:gd name="connsiteY0" fmla="*/ 123290 h 1880170"/>
-                  <a:gd name="connsiteX1" fmla="*/ 842481 w 1767155"/>
-                  <a:gd name="connsiteY1" fmla="*/ 0 h 1880170"/>
-                  <a:gd name="connsiteX2" fmla="*/ 1767155 w 1767155"/>
-                  <a:gd name="connsiteY2" fmla="*/ 1202076 h 1880170"/>
-                  <a:gd name="connsiteX3" fmla="*/ 575353 w 1767155"/>
-                  <a:gd name="connsiteY3" fmla="*/ 1880170 h 1880170"/>
-                  <a:gd name="connsiteX4" fmla="*/ 0 w 1767155"/>
-                  <a:gd name="connsiteY4" fmla="*/ 123290 h 1880170"/>
-                </a:gdLst>
-                <a:ahLst/>
-                <a:cxnLst>
-                  <a:cxn ang="0">
-                    <a:pos x="connsiteX0" y="connsiteY0"/>
-                  </a:cxn>
-                  <a:cxn ang="0">
-                    <a:pos x="connsiteX1" y="connsiteY1"/>
-                  </a:cxn>
-                  <a:cxn ang="0">
-                    <a:pos x="connsiteX2" y="connsiteY2"/>
-                  </a:cxn>
-                  <a:cxn ang="0">
-                    <a:pos x="connsiteX3" y="connsiteY3"/>
-                  </a:cxn>
-                  <a:cxn ang="0">
-                    <a:pos x="connsiteX4" y="connsiteY4"/>
-                  </a:cxn>
-                </a:cxnLst>
-                <a:rect l="l" t="t" r="r" b="b"/>
-                <a:pathLst>
-                  <a:path w="1767155" h="1880170">
-                    <a:moveTo>
-                      <a:pt x="0" y="123290"/>
-                    </a:moveTo>
-                    <a:lnTo>
-                      <a:pt x="842481" y="0"/>
-                    </a:lnTo>
-                    <a:lnTo>
-                      <a:pt x="1767155" y="1202076"/>
-                    </a:lnTo>
-                    <a:lnTo>
-                      <a:pt x="575353" y="1880170"/>
-                    </a:lnTo>
-                    <a:lnTo>
-                      <a:pt x="0" y="123290"/>
-                    </a:lnTo>
-                    <a:close/>
-                  </a:path>
-                </a:pathLst>
-              </a:custGeom>
-              <a:noFill/>
-            </p:spPr>
-            <p:style>
-              <a:lnRef idx="2">
-                <a:schemeClr val="accent1">
-                  <a:shade val="50000"/>
-                </a:schemeClr>
-              </a:lnRef>
-              <a:fillRef idx="1">
-                <a:schemeClr val="accent1"/>
-              </a:fillRef>
-              <a:effectRef idx="0">
-                <a:schemeClr val="accent1"/>
-              </a:effectRef>
-              <a:fontRef idx="minor">
-                <a:schemeClr val="lt1"/>
-              </a:fontRef>
-            </p:style>
-            <p:txBody>
-              <a:bodyPr rtlCol="0" anchor="ctr"/>
-              <a:lstStyle/>
-              <a:p>
-                <a:pPr algn="ctr"/>
-                <a:endParaRPr lang="en-US"/>
-              </a:p>
-            </p:txBody>
-          </p:sp>
-          <p:sp>
-            <p:nvSpPr>
-              <p:cNvPr id="91" name="Freeform 90">
-                <a:extLst>
-                  <a:ext uri="{FF2B5EF4-FFF2-40B4-BE49-F238E27FC236}">
-                    <a16:creationId xmlns:a16="http://schemas.microsoft.com/office/drawing/2014/main" id="{E121B036-8606-1649-B1DE-8C807B855F3C}"/>
-                  </a:ext>
-                </a:extLst>
-              </p:cNvPr>
-              <p:cNvSpPr/>
-              <p:nvPr/>
-            </p:nvSpPr>
-            <p:spPr>
-              <a:xfrm>
-                <a:off x="5681131" y="3294799"/>
-                <a:ext cx="1767155" cy="1880170"/>
-              </a:xfrm>
-              <a:custGeom>
-                <a:avLst/>
-                <a:gdLst>
-                  <a:gd name="connsiteX0" fmla="*/ 0 w 1767155"/>
-                  <a:gd name="connsiteY0" fmla="*/ 123290 h 1880170"/>
-                  <a:gd name="connsiteX1" fmla="*/ 842481 w 1767155"/>
-                  <a:gd name="connsiteY1" fmla="*/ 0 h 1880170"/>
-                  <a:gd name="connsiteX2" fmla="*/ 1767155 w 1767155"/>
-                  <a:gd name="connsiteY2" fmla="*/ 1202076 h 1880170"/>
-                  <a:gd name="connsiteX3" fmla="*/ 575353 w 1767155"/>
-                  <a:gd name="connsiteY3" fmla="*/ 1880170 h 1880170"/>
-                  <a:gd name="connsiteX4" fmla="*/ 0 w 1767155"/>
-                  <a:gd name="connsiteY4" fmla="*/ 123290 h 1880170"/>
-                </a:gdLst>
-                <a:ahLst/>
-                <a:cxnLst>
-                  <a:cxn ang="0">
-                    <a:pos x="connsiteX0" y="connsiteY0"/>
-                  </a:cxn>
-                  <a:cxn ang="0">
-                    <a:pos x="connsiteX1" y="connsiteY1"/>
-                  </a:cxn>
-                  <a:cxn ang="0">
-                    <a:pos x="connsiteX2" y="connsiteY2"/>
-                  </a:cxn>
-                  <a:cxn ang="0">
-                    <a:pos x="connsiteX3" y="connsiteY3"/>
-                  </a:cxn>
-                  <a:cxn ang="0">
-                    <a:pos x="connsiteX4" y="connsiteY4"/>
-                  </a:cxn>
-                </a:cxnLst>
-                <a:rect l="l" t="t" r="r" b="b"/>
-                <a:pathLst>
-                  <a:path w="1767155" h="1880170">
-                    <a:moveTo>
-                      <a:pt x="0" y="123290"/>
-                    </a:moveTo>
-                    <a:lnTo>
-                      <a:pt x="842481" y="0"/>
-                    </a:lnTo>
-                    <a:lnTo>
-                      <a:pt x="1767155" y="1202076"/>
-                    </a:lnTo>
-                    <a:lnTo>
-                      <a:pt x="575353" y="1880170"/>
-                    </a:lnTo>
-                    <a:lnTo>
-                      <a:pt x="0" y="123290"/>
-                    </a:lnTo>
-                    <a:close/>
-                  </a:path>
-                </a:pathLst>
-              </a:custGeom>
-              <a:noFill/>
-              <a:ln>
-                <a:solidFill>
-                  <a:srgbClr val="FF0000"/>
-                </a:solidFill>
-              </a:ln>
-            </p:spPr>
-            <p:style>
-              <a:lnRef idx="2">
-                <a:schemeClr val="accent1">
-                  <a:shade val="50000"/>
-                </a:schemeClr>
-              </a:lnRef>
-              <a:fillRef idx="1">
-                <a:schemeClr val="accent1"/>
-              </a:fillRef>
-              <a:effectRef idx="0">
-                <a:schemeClr val="accent1"/>
-              </a:effectRef>
-              <a:fontRef idx="minor">
-                <a:schemeClr val="lt1"/>
-              </a:fontRef>
-            </p:style>
-            <p:txBody>
-              <a:bodyPr rtlCol="0" anchor="ctr"/>
-              <a:lstStyle/>
-              <a:p>
-                <a:pPr algn="ctr"/>
-                <a:endParaRPr lang="en-US"/>
-              </a:p>
-            </p:txBody>
-          </p:sp>
-          <p:sp>
-            <p:nvSpPr>
-              <p:cNvPr id="92" name="Freeform 91">
-                <a:extLst>
-                  <a:ext uri="{FF2B5EF4-FFF2-40B4-BE49-F238E27FC236}">
-                    <a16:creationId xmlns:a16="http://schemas.microsoft.com/office/drawing/2014/main" id="{552628C8-4A9B-084A-B511-8F1BADE31BF7}"/>
-                  </a:ext>
-                </a:extLst>
-              </p:cNvPr>
-              <p:cNvSpPr/>
-              <p:nvPr/>
-            </p:nvSpPr>
-            <p:spPr>
-              <a:xfrm>
-                <a:off x="4833268" y="3419605"/>
-                <a:ext cx="1767155" cy="1880170"/>
-              </a:xfrm>
-              <a:custGeom>
-                <a:avLst/>
-                <a:gdLst>
-                  <a:gd name="connsiteX0" fmla="*/ 0 w 1767155"/>
-                  <a:gd name="connsiteY0" fmla="*/ 123290 h 1880170"/>
-                  <a:gd name="connsiteX1" fmla="*/ 842481 w 1767155"/>
-                  <a:gd name="connsiteY1" fmla="*/ 0 h 1880170"/>
-                  <a:gd name="connsiteX2" fmla="*/ 1767155 w 1767155"/>
-                  <a:gd name="connsiteY2" fmla="*/ 1202076 h 1880170"/>
-                  <a:gd name="connsiteX3" fmla="*/ 575353 w 1767155"/>
-                  <a:gd name="connsiteY3" fmla="*/ 1880170 h 1880170"/>
-                  <a:gd name="connsiteX4" fmla="*/ 0 w 1767155"/>
-                  <a:gd name="connsiteY4" fmla="*/ 123290 h 1880170"/>
-                </a:gdLst>
-                <a:ahLst/>
-                <a:cxnLst>
-                  <a:cxn ang="0">
-                    <a:pos x="connsiteX0" y="connsiteY0"/>
-                  </a:cxn>
-                  <a:cxn ang="0">
-                    <a:pos x="connsiteX1" y="connsiteY1"/>
-                  </a:cxn>
-                  <a:cxn ang="0">
-                    <a:pos x="connsiteX2" y="connsiteY2"/>
-                  </a:cxn>
-                  <a:cxn ang="0">
-                    <a:pos x="connsiteX3" y="connsiteY3"/>
-                  </a:cxn>
-                  <a:cxn ang="0">
-                    <a:pos x="connsiteX4" y="connsiteY4"/>
-                  </a:cxn>
-                </a:cxnLst>
-                <a:rect l="l" t="t" r="r" b="b"/>
-                <a:pathLst>
-                  <a:path w="1767155" h="1880170">
-                    <a:moveTo>
-                      <a:pt x="0" y="123290"/>
-                    </a:moveTo>
-                    <a:lnTo>
-                      <a:pt x="842481" y="0"/>
-                    </a:lnTo>
-                    <a:lnTo>
-                      <a:pt x="1767155" y="1202076"/>
-                    </a:lnTo>
-                    <a:lnTo>
-                      <a:pt x="575353" y="1880170"/>
-                    </a:lnTo>
-                    <a:lnTo>
-                      <a:pt x="0" y="123290"/>
-                    </a:lnTo>
-                    <a:close/>
-                  </a:path>
-                </a:pathLst>
-              </a:custGeom>
-              <a:noFill/>
-              <a:ln>
-                <a:solidFill>
-                  <a:srgbClr val="92D050"/>
-                </a:solidFill>
-              </a:ln>
-            </p:spPr>
-            <p:style>
-              <a:lnRef idx="2">
-                <a:schemeClr val="accent1">
-                  <a:shade val="50000"/>
-                </a:schemeClr>
-              </a:lnRef>
-              <a:fillRef idx="1">
-                <a:schemeClr val="accent1"/>
-              </a:fillRef>
-              <a:effectRef idx="0">
-                <a:schemeClr val="accent1"/>
-              </a:effectRef>
-              <a:fontRef idx="minor">
-                <a:schemeClr val="lt1"/>
-              </a:fontRef>
-            </p:style>
-            <p:txBody>
-              <a:bodyPr rtlCol="0" anchor="ctr"/>
-              <a:lstStyle/>
-              <a:p>
-                <a:pPr algn="ctr"/>
-                <a:endParaRPr lang="en-US"/>
-              </a:p>
-            </p:txBody>
-          </p:sp>
-          <p:sp>
-            <p:nvSpPr>
-              <p:cNvPr id="93" name="Freeform 92">
-                <a:extLst>
-                  <a:ext uri="{FF2B5EF4-FFF2-40B4-BE49-F238E27FC236}">
-                    <a16:creationId xmlns:a16="http://schemas.microsoft.com/office/drawing/2014/main" id="{AB104962-2946-F94C-BA79-7D1EDA1EFE44}"/>
-                  </a:ext>
-                </a:extLst>
-              </p:cNvPr>
-              <p:cNvSpPr/>
-              <p:nvPr/>
-            </p:nvSpPr>
-            <p:spPr>
-              <a:xfrm>
-                <a:off x="3901956" y="2220925"/>
-                <a:ext cx="1767155" cy="1880170"/>
-              </a:xfrm>
-              <a:custGeom>
-                <a:avLst/>
-                <a:gdLst>
-                  <a:gd name="connsiteX0" fmla="*/ 0 w 1767155"/>
-                  <a:gd name="connsiteY0" fmla="*/ 123290 h 1880170"/>
-                  <a:gd name="connsiteX1" fmla="*/ 842481 w 1767155"/>
-                  <a:gd name="connsiteY1" fmla="*/ 0 h 1880170"/>
-                  <a:gd name="connsiteX2" fmla="*/ 1767155 w 1767155"/>
-                  <a:gd name="connsiteY2" fmla="*/ 1202076 h 1880170"/>
-                  <a:gd name="connsiteX3" fmla="*/ 575353 w 1767155"/>
-                  <a:gd name="connsiteY3" fmla="*/ 1880170 h 1880170"/>
-                  <a:gd name="connsiteX4" fmla="*/ 0 w 1767155"/>
-                  <a:gd name="connsiteY4" fmla="*/ 123290 h 1880170"/>
-                </a:gdLst>
-                <a:ahLst/>
-                <a:cxnLst>
-                  <a:cxn ang="0">
-                    <a:pos x="connsiteX0" y="connsiteY0"/>
-                  </a:cxn>
-                  <a:cxn ang="0">
-                    <a:pos x="connsiteX1" y="connsiteY1"/>
-                  </a:cxn>
-                  <a:cxn ang="0">
-                    <a:pos x="connsiteX2" y="connsiteY2"/>
-                  </a:cxn>
-                  <a:cxn ang="0">
-                    <a:pos x="connsiteX3" y="connsiteY3"/>
-                  </a:cxn>
-                  <a:cxn ang="0">
-                    <a:pos x="connsiteX4" y="connsiteY4"/>
-                  </a:cxn>
-                </a:cxnLst>
-                <a:rect l="l" t="t" r="r" b="b"/>
-                <a:pathLst>
-                  <a:path w="1767155" h="1880170">
-                    <a:moveTo>
-                      <a:pt x="0" y="123290"/>
-                    </a:moveTo>
-                    <a:lnTo>
-                      <a:pt x="842481" y="0"/>
-                    </a:lnTo>
-                    <a:lnTo>
-                      <a:pt x="1767155" y="1202076"/>
-                    </a:lnTo>
-                    <a:lnTo>
-                      <a:pt x="575353" y="1880170"/>
-                    </a:lnTo>
-                    <a:lnTo>
-                      <a:pt x="0" y="123290"/>
-                    </a:lnTo>
-                    <a:close/>
-                  </a:path>
-                </a:pathLst>
-              </a:custGeom>
-              <a:noFill/>
-              <a:ln>
-                <a:solidFill>
-                  <a:srgbClr val="FFC000"/>
-                </a:solidFill>
-              </a:ln>
-            </p:spPr>
-            <p:style>
-              <a:lnRef idx="2">
-                <a:schemeClr val="accent1">
-                  <a:shade val="50000"/>
-                </a:schemeClr>
-              </a:lnRef>
-              <a:fillRef idx="1">
-                <a:schemeClr val="accent1"/>
-              </a:fillRef>
-              <a:effectRef idx="0">
-                <a:schemeClr val="accent1"/>
-              </a:effectRef>
-              <a:fontRef idx="minor">
-                <a:schemeClr val="lt1"/>
-              </a:fontRef>
-            </p:style>
-            <p:txBody>
-              <a:bodyPr rtlCol="0" anchor="ctr"/>
-              <a:lstStyle/>
-              <a:p>
-                <a:pPr algn="ctr"/>
-                <a:endParaRPr lang="en-US"/>
-              </a:p>
-            </p:txBody>
-          </p:sp>
-          <p:sp>
-            <p:nvSpPr>
-              <p:cNvPr id="94" name="Freeform 93">
-                <a:extLst>
-                  <a:ext uri="{FF2B5EF4-FFF2-40B4-BE49-F238E27FC236}">
-                    <a16:creationId xmlns:a16="http://schemas.microsoft.com/office/drawing/2014/main" id="{DF78B9D8-BC1B-1C4D-933E-5210B8F5E63B}"/>
-                  </a:ext>
-                </a:extLst>
-              </p:cNvPr>
-              <p:cNvSpPr/>
-              <p:nvPr/>
-            </p:nvSpPr>
-            <p:spPr>
-              <a:xfrm>
-                <a:off x="3910156" y="1547755"/>
-                <a:ext cx="3534310" cy="3739793"/>
-              </a:xfrm>
-              <a:custGeom>
-                <a:avLst/>
-                <a:gdLst>
-                  <a:gd name="connsiteX0" fmla="*/ 0 w 3534310"/>
-                  <a:gd name="connsiteY0" fmla="*/ 801384 h 3739793"/>
-                  <a:gd name="connsiteX1" fmla="*/ 1191802 w 3534310"/>
-                  <a:gd name="connsiteY1" fmla="*/ 123290 h 3739793"/>
-                  <a:gd name="connsiteX2" fmla="*/ 2044557 w 3534310"/>
-                  <a:gd name="connsiteY2" fmla="*/ 0 h 3739793"/>
-                  <a:gd name="connsiteX3" fmla="*/ 2969232 w 3534310"/>
-                  <a:gd name="connsiteY3" fmla="*/ 1202076 h 3739793"/>
-                  <a:gd name="connsiteX4" fmla="*/ 3534310 w 3534310"/>
-                  <a:gd name="connsiteY4" fmla="*/ 2958957 h 3739793"/>
-                  <a:gd name="connsiteX5" fmla="*/ 2342508 w 3534310"/>
-                  <a:gd name="connsiteY5" fmla="*/ 3626777 h 3739793"/>
-                  <a:gd name="connsiteX6" fmla="*/ 1489753 w 3534310"/>
-                  <a:gd name="connsiteY6" fmla="*/ 3739793 h 3739793"/>
-                  <a:gd name="connsiteX7" fmla="*/ 565079 w 3534310"/>
-                  <a:gd name="connsiteY7" fmla="*/ 2547991 h 3739793"/>
-                  <a:gd name="connsiteX8" fmla="*/ 0 w 3534310"/>
-                  <a:gd name="connsiteY8" fmla="*/ 801384 h 3739793"/>
-                </a:gdLst>
-                <a:ahLst/>
-                <a:cxnLst>
-                  <a:cxn ang="0">
-                    <a:pos x="connsiteX0" y="connsiteY0"/>
-                  </a:cxn>
-                  <a:cxn ang="0">
-                    <a:pos x="connsiteX1" y="connsiteY1"/>
-                  </a:cxn>
-                  <a:cxn ang="0">
-                    <a:pos x="connsiteX2" y="connsiteY2"/>
-                  </a:cxn>
-                  <a:cxn ang="0">
-                    <a:pos x="connsiteX3" y="connsiteY3"/>
-                  </a:cxn>
-                  <a:cxn ang="0">
-                    <a:pos x="connsiteX4" y="connsiteY4"/>
-                  </a:cxn>
-                  <a:cxn ang="0">
-                    <a:pos x="connsiteX5" y="connsiteY5"/>
-                  </a:cxn>
-                  <a:cxn ang="0">
-                    <a:pos x="connsiteX6" y="connsiteY6"/>
-                  </a:cxn>
-                  <a:cxn ang="0">
-                    <a:pos x="connsiteX7" y="connsiteY7"/>
-                  </a:cxn>
-                  <a:cxn ang="0">
-                    <a:pos x="connsiteX8" y="connsiteY8"/>
-                  </a:cxn>
-                </a:cxnLst>
-                <a:rect l="l" t="t" r="r" b="b"/>
-                <a:pathLst>
-                  <a:path w="3534310" h="3739793">
-                    <a:moveTo>
-                      <a:pt x="0" y="801384"/>
-                    </a:moveTo>
-                    <a:lnTo>
-                      <a:pt x="1191802" y="123290"/>
-                    </a:lnTo>
-                    <a:lnTo>
-                      <a:pt x="2044557" y="0"/>
-                    </a:lnTo>
-                    <a:lnTo>
-                      <a:pt x="2969232" y="1202076"/>
-                    </a:lnTo>
-                    <a:lnTo>
-                      <a:pt x="3534310" y="2958957"/>
-                    </a:lnTo>
-                    <a:lnTo>
-                      <a:pt x="2342508" y="3626777"/>
-                    </a:lnTo>
-                    <a:lnTo>
-                      <a:pt x="1489753" y="3739793"/>
-                    </a:lnTo>
-                    <a:lnTo>
-                      <a:pt x="565079" y="2547991"/>
-                    </a:lnTo>
-                    <a:lnTo>
-                      <a:pt x="0" y="801384"/>
-                    </a:lnTo>
-                    <a:close/>
-                  </a:path>
-                </a:pathLst>
-              </a:custGeom>
-              <a:noFill/>
-              <a:ln>
-                <a:prstDash val="dash"/>
-              </a:ln>
-            </p:spPr>
-            <p:style>
-              <a:lnRef idx="2">
-                <a:schemeClr val="accent1">
-                  <a:shade val="50000"/>
-                </a:schemeClr>
-              </a:lnRef>
-              <a:fillRef idx="1">
-                <a:schemeClr val="accent1"/>
-              </a:fillRef>
-              <a:effectRef idx="0">
-                <a:schemeClr val="accent1"/>
-              </a:effectRef>
-              <a:fontRef idx="minor">
-                <a:schemeClr val="lt1"/>
-              </a:fontRef>
-            </p:style>
-            <p:txBody>
-              <a:bodyPr rtlCol="0" anchor="ctr"/>
-              <a:lstStyle/>
-              <a:p>
-                <a:pPr algn="ctr"/>
-                <a:endParaRPr lang="en-US"/>
-              </a:p>
-            </p:txBody>
-          </p:sp>
-          <p:cxnSp>
-            <p:nvCxnSpPr>
-              <p:cNvPr id="95" name="Straight Arrow Connector 94">
-                <a:extLst>
-                  <a:ext uri="{FF2B5EF4-FFF2-40B4-BE49-F238E27FC236}">
-                    <a16:creationId xmlns:a16="http://schemas.microsoft.com/office/drawing/2014/main" id="{FBC1AA6E-FD0E-3141-AEEA-B8C5309592DD}"/>
-                  </a:ext>
-                </a:extLst>
-              </p:cNvPr>
-              <p:cNvCxnSpPr>
-                <a:cxnSpLocks/>
-              </p:cNvCxnSpPr>
-              <p:nvPr/>
-            </p:nvCxnSpPr>
-            <p:spPr>
-              <a:xfrm flipV="1">
-                <a:off x="5160811" y="3511644"/>
-                <a:ext cx="352344" cy="213435"/>
-              </a:xfrm>
-              <a:prstGeom prst="straightConnector1">
-                <a:avLst/>
-              </a:prstGeom>
-              <a:ln>
-                <a:solidFill>
-                  <a:schemeClr val="accent1"/>
-                </a:solidFill>
-                <a:tailEnd type="triangle"/>
-              </a:ln>
-            </p:spPr>
-            <p:style>
-              <a:lnRef idx="1">
-                <a:schemeClr val="accent1"/>
-              </a:lnRef>
-              <a:fillRef idx="0">
-                <a:schemeClr val="accent1"/>
-              </a:fillRef>
-              <a:effectRef idx="0">
-                <a:schemeClr val="accent1"/>
-              </a:effectRef>
-              <a:fontRef idx="minor">
-                <a:schemeClr val="tx1"/>
-              </a:fontRef>
-            </p:style>
-          </p:cxnSp>
-          <p:cxnSp>
-            <p:nvCxnSpPr>
-              <p:cNvPr id="96" name="Straight Arrow Connector 95">
-                <a:extLst>
-                  <a:ext uri="{FF2B5EF4-FFF2-40B4-BE49-F238E27FC236}">
-                    <a16:creationId xmlns:a16="http://schemas.microsoft.com/office/drawing/2014/main" id="{1EC5C13D-D621-E14D-9B64-DA5FB3A9A569}"/>
-                  </a:ext>
-                </a:extLst>
-              </p:cNvPr>
-              <p:cNvCxnSpPr>
-                <a:cxnSpLocks/>
-              </p:cNvCxnSpPr>
-              <p:nvPr/>
-            </p:nvCxnSpPr>
-            <p:spPr>
-              <a:xfrm flipH="1">
-                <a:off x="5081902" y="3448244"/>
-                <a:ext cx="392746" cy="61472"/>
-              </a:xfrm>
-              <a:prstGeom prst="straightConnector1">
-                <a:avLst/>
-              </a:prstGeom>
-              <a:ln>
-                <a:solidFill>
-                  <a:schemeClr val="accent6"/>
-                </a:solidFill>
-                <a:tailEnd type="triangle"/>
-              </a:ln>
-            </p:spPr>
-            <p:style>
-              <a:lnRef idx="1">
-                <a:schemeClr val="accent1"/>
-              </a:lnRef>
-              <a:fillRef idx="0">
-                <a:schemeClr val="accent1"/>
-              </a:fillRef>
-              <a:effectRef idx="0">
-                <a:schemeClr val="accent1"/>
-              </a:effectRef>
-              <a:fontRef idx="minor">
-                <a:schemeClr val="tx1"/>
-              </a:fontRef>
-            </p:style>
-          </p:cxnSp>
-          <p:cxnSp>
-            <p:nvCxnSpPr>
-              <p:cNvPr id="97" name="Straight Arrow Connector 96">
-                <a:extLst>
-                  <a:ext uri="{FF2B5EF4-FFF2-40B4-BE49-F238E27FC236}">
-                    <a16:creationId xmlns:a16="http://schemas.microsoft.com/office/drawing/2014/main" id="{F52AA9B3-D526-904D-842D-6B85552022F8}"/>
-                  </a:ext>
-                </a:extLst>
-              </p:cNvPr>
-              <p:cNvCxnSpPr>
-                <a:cxnSpLocks/>
-              </p:cNvCxnSpPr>
-              <p:nvPr/>
-            </p:nvCxnSpPr>
-            <p:spPr>
-              <a:xfrm flipH="1" flipV="1">
-                <a:off x="5965495" y="3793192"/>
-                <a:ext cx="251275" cy="340062"/>
-              </a:xfrm>
-              <a:prstGeom prst="straightConnector1">
-                <a:avLst/>
-              </a:prstGeom>
-              <a:ln>
-                <a:solidFill>
-                  <a:schemeClr val="accent4"/>
-                </a:solidFill>
-                <a:tailEnd type="triangle"/>
-              </a:ln>
-            </p:spPr>
-            <p:style>
-              <a:lnRef idx="1">
-                <a:schemeClr val="accent1"/>
-              </a:lnRef>
-              <a:fillRef idx="0">
-                <a:schemeClr val="accent1"/>
-              </a:fillRef>
-              <a:effectRef idx="0">
-                <a:schemeClr val="accent1"/>
-              </a:effectRef>
-              <a:fontRef idx="minor">
-                <a:schemeClr val="tx1"/>
-              </a:fontRef>
-            </p:style>
-          </p:cxnSp>
-          <p:cxnSp>
-            <p:nvCxnSpPr>
-              <p:cNvPr id="98" name="Straight Arrow Connector 97">
-                <a:extLst>
-                  <a:ext uri="{FF2B5EF4-FFF2-40B4-BE49-F238E27FC236}">
-                    <a16:creationId xmlns:a16="http://schemas.microsoft.com/office/drawing/2014/main" id="{C89332E8-1BAF-9347-9940-6DF3B580A3F4}"/>
-                  </a:ext>
-                </a:extLst>
-              </p:cNvPr>
-              <p:cNvCxnSpPr>
-                <a:cxnSpLocks/>
-              </p:cNvCxnSpPr>
-              <p:nvPr/>
-            </p:nvCxnSpPr>
-            <p:spPr>
-              <a:xfrm>
-                <a:off x="5763944" y="3686764"/>
-                <a:ext cx="206947" cy="615181"/>
-              </a:xfrm>
-              <a:prstGeom prst="straightConnector1">
-                <a:avLst/>
-              </a:prstGeom>
-              <a:ln>
-                <a:solidFill>
-                  <a:srgbClr val="FF0000"/>
-                </a:solidFill>
-                <a:tailEnd type="triangle"/>
-              </a:ln>
-            </p:spPr>
-            <p:style>
-              <a:lnRef idx="1">
-                <a:schemeClr val="accent1"/>
-              </a:lnRef>
-              <a:fillRef idx="0">
-                <a:schemeClr val="accent1"/>
-              </a:fillRef>
-              <a:effectRef idx="0">
-                <a:schemeClr val="accent1"/>
-              </a:effectRef>
-              <a:fontRef idx="minor">
-                <a:schemeClr val="tx1"/>
-              </a:fontRef>
-            </p:style>
-          </p:cxnSp>
-        </p:grpSp>
+              </a:solidFill>
+              <a:tailEnd type="triangle"/>
+            </a:ln>
+          </p:spPr>
+          <p:style>
+            <a:lnRef idx="1">
+              <a:schemeClr val="accent1"/>
+            </a:lnRef>
+            <a:fillRef idx="0">
+              <a:schemeClr val="accent1"/>
+            </a:fillRef>
+            <a:effectRef idx="0">
+              <a:schemeClr val="accent1"/>
+            </a:effectRef>
+            <a:fontRef idx="minor">
+              <a:schemeClr val="tx1"/>
+            </a:fontRef>
+          </p:style>
+        </p:cxnSp>
+        <p:cxnSp>
+          <p:nvCxnSpPr>
+            <p:cNvPr id="96" name="Straight Arrow Connector 95">
+              <a:extLst>
+                <a:ext uri="{FF2B5EF4-FFF2-40B4-BE49-F238E27FC236}">
+                  <a16:creationId xmlns:a16="http://schemas.microsoft.com/office/drawing/2014/main" id="{1EC5C13D-D621-E14D-9B64-DA5FB3A9A569}"/>
+                </a:ext>
+              </a:extLst>
+            </p:cNvPr>
+            <p:cNvCxnSpPr>
+              <a:cxnSpLocks/>
+            </p:cNvCxnSpPr>
+            <p:nvPr/>
+          </p:nvCxnSpPr>
+          <p:spPr>
+            <a:xfrm flipH="1">
+              <a:off x="5081902" y="3448244"/>
+              <a:ext cx="392746" cy="61472"/>
+            </a:xfrm>
+            <a:prstGeom prst="straightConnector1">
+              <a:avLst/>
+            </a:prstGeom>
+            <a:ln>
+              <a:solidFill>
+                <a:schemeClr val="accent6"/>
+              </a:solidFill>
+              <a:tailEnd type="triangle"/>
+            </a:ln>
+          </p:spPr>
+          <p:style>
+            <a:lnRef idx="1">
+              <a:schemeClr val="accent1"/>
+            </a:lnRef>
+            <a:fillRef idx="0">
+              <a:schemeClr val="accent1"/>
+            </a:fillRef>
+            <a:effectRef idx="0">
+              <a:schemeClr val="accent1"/>
+            </a:effectRef>
+            <a:fontRef idx="minor">
+              <a:schemeClr val="tx1"/>
+            </a:fontRef>
+          </p:style>
+        </p:cxnSp>
+        <p:cxnSp>
+          <p:nvCxnSpPr>
+            <p:cNvPr id="97" name="Straight Arrow Connector 96">
+              <a:extLst>
+                <a:ext uri="{FF2B5EF4-FFF2-40B4-BE49-F238E27FC236}">
+                  <a16:creationId xmlns:a16="http://schemas.microsoft.com/office/drawing/2014/main" id="{F52AA9B3-D526-904D-842D-6B85552022F8}"/>
+                </a:ext>
+              </a:extLst>
+            </p:cNvPr>
+            <p:cNvCxnSpPr>
+              <a:cxnSpLocks/>
+            </p:cNvCxnSpPr>
+            <p:nvPr/>
+          </p:nvCxnSpPr>
+          <p:spPr>
+            <a:xfrm flipH="1" flipV="1">
+              <a:off x="5965495" y="3793192"/>
+              <a:ext cx="251275" cy="340062"/>
+            </a:xfrm>
+            <a:prstGeom prst="straightConnector1">
+              <a:avLst/>
+            </a:prstGeom>
+            <a:ln>
+              <a:solidFill>
+                <a:schemeClr val="accent4"/>
+              </a:solidFill>
+              <a:tailEnd type="triangle"/>
+            </a:ln>
+          </p:spPr>
+          <p:style>
+            <a:lnRef idx="1">
+              <a:schemeClr val="accent1"/>
+            </a:lnRef>
+            <a:fillRef idx="0">
+              <a:schemeClr val="accent1"/>
+            </a:fillRef>
+            <a:effectRef idx="0">
+              <a:schemeClr val="accent1"/>
+            </a:effectRef>
+            <a:fontRef idx="minor">
+              <a:schemeClr val="tx1"/>
+            </a:fontRef>
+          </p:style>
+        </p:cxnSp>
+        <p:cxnSp>
+          <p:nvCxnSpPr>
+            <p:cNvPr id="98" name="Straight Arrow Connector 97">
+              <a:extLst>
+                <a:ext uri="{FF2B5EF4-FFF2-40B4-BE49-F238E27FC236}">
+                  <a16:creationId xmlns:a16="http://schemas.microsoft.com/office/drawing/2014/main" id="{C89332E8-1BAF-9347-9940-6DF3B580A3F4}"/>
+                </a:ext>
+              </a:extLst>
+            </p:cNvPr>
+            <p:cNvCxnSpPr>
+              <a:cxnSpLocks/>
+            </p:cNvCxnSpPr>
+            <p:nvPr/>
+          </p:nvCxnSpPr>
+          <p:spPr>
+            <a:xfrm>
+              <a:off x="5763944" y="3686764"/>
+              <a:ext cx="206947" cy="615181"/>
+            </a:xfrm>
+            <a:prstGeom prst="straightConnector1">
+              <a:avLst/>
+            </a:prstGeom>
+            <a:ln>
+              <a:solidFill>
+                <a:srgbClr val="FF0000"/>
+              </a:solidFill>
+              <a:tailEnd type="triangle"/>
+            </a:ln>
+          </p:spPr>
+          <p:style>
+            <a:lnRef idx="1">
+              <a:schemeClr val="accent1"/>
+            </a:lnRef>
+            <a:fillRef idx="0">
+              <a:schemeClr val="accent1"/>
+            </a:fillRef>
+            <a:effectRef idx="0">
+              <a:schemeClr val="accent1"/>
+            </a:effectRef>
+            <a:fontRef idx="minor">
+              <a:schemeClr val="tx1"/>
+            </a:fontRef>
+          </p:style>
+        </p:cxnSp>
       </p:grpSp>
       <p:sp>
         <p:nvSpPr>
-          <p:cNvPr id="3" name="Rectangle 2">
+          <p:cNvPr id="2" name="TextBox 1">
             <a:extLst>
               <a:ext uri="{FF2B5EF4-FFF2-40B4-BE49-F238E27FC236}">
-                <a16:creationId xmlns:a16="http://schemas.microsoft.com/office/drawing/2014/main" id="{E1367F04-D5E5-324F-8712-DBD8FB3F0957}"/>
+                <a16:creationId xmlns:a16="http://schemas.microsoft.com/office/drawing/2014/main" id="{0D30CF8A-8DEA-124E-B072-BE6D47B5B622}"/>
+              </a:ext>
+            </a:extLst>
+          </p:cNvPr>
+          <p:cNvSpPr txBox="1"/>
+          <p:nvPr/>
+        </p:nvSpPr>
+        <p:spPr>
+          <a:xfrm>
+            <a:off x="448394" y="116848"/>
+            <a:ext cx="11743606" cy="523220"/>
+          </a:xfrm>
+          <a:prstGeom prst="rect">
+            <a:avLst/>
+          </a:prstGeom>
+          <a:noFill/>
+        </p:spPr>
+        <p:txBody>
+          <a:bodyPr wrap="square" rtlCol="0">
+            <a:spAutoFit/>
+          </a:bodyPr>
+          <a:lstStyle/>
+          <a:p>
+            <a:r>
+              <a:rPr lang="en-US" sz="2800" dirty="0">
+                <a:latin typeface="Times" pitchFamily="2" charset="0"/>
+              </a:rPr>
+              <a:t>Workspace         Translate workspace around (0,0)      </a:t>
+            </a:r>
+            <a:r>
+              <a:rPr lang="en-US" sz="2800" dirty="0" err="1">
+                <a:latin typeface="Times" pitchFamily="2" charset="0"/>
+              </a:rPr>
+              <a:t>Δ</a:t>
+            </a:r>
+            <a:r>
+              <a:rPr lang="en-US" sz="2800" dirty="0">
+                <a:latin typeface="Times" pitchFamily="2" charset="0"/>
+              </a:rPr>
+              <a:t> configuration space</a:t>
+            </a:r>
+          </a:p>
+        </p:txBody>
+      </p:sp>
+      <p:pic>
+        <p:nvPicPr>
+          <p:cNvPr id="7" name="Picture 6">
+            <a:extLst>
+              <a:ext uri="{FF2B5EF4-FFF2-40B4-BE49-F238E27FC236}">
+                <a16:creationId xmlns:a16="http://schemas.microsoft.com/office/drawing/2014/main" id="{24FD7855-DD2D-3546-86FF-4912C9CF5A5C}"/>
+              </a:ext>
+            </a:extLst>
+          </p:cNvPr>
+          <p:cNvPicPr>
+            <a:picLocks noChangeAspect="1"/>
+          </p:cNvPicPr>
+          <p:nvPr/>
+        </p:nvPicPr>
+        <p:blipFill>
+          <a:blip r:embed="rId4"/>
+          <a:stretch>
+            <a:fillRect/>
+          </a:stretch>
+        </p:blipFill>
+        <p:spPr>
+          <a:xfrm>
+            <a:off x="7583122" y="640071"/>
+            <a:ext cx="4544720" cy="4769151"/>
+          </a:xfrm>
+          <a:prstGeom prst="rect">
+            <a:avLst/>
+          </a:prstGeom>
+        </p:spPr>
+      </p:pic>
+      <p:sp>
+        <p:nvSpPr>
+          <p:cNvPr id="11" name="Rectangle 10">
+            <a:extLst>
+              <a:ext uri="{FF2B5EF4-FFF2-40B4-BE49-F238E27FC236}">
+                <a16:creationId xmlns:a16="http://schemas.microsoft.com/office/drawing/2014/main" id="{58B2B669-FA1F-514D-AFA7-948F16527EC9}"/>
               </a:ext>
             </a:extLst>
           </p:cNvPr>
@@ -4799,14 +4813,191 @@
         </p:nvSpPr>
         <p:spPr>
           <a:xfrm>
-            <a:off x="537328" y="471340"/>
-            <a:ext cx="311084" cy="302214"/>
+            <a:off x="288602" y="4252124"/>
+            <a:ext cx="159792" cy="159792"/>
           </a:xfrm>
           <a:prstGeom prst="rect">
             <a:avLst/>
           </a:prstGeom>
           <a:solidFill>
-            <a:schemeClr val="bg1"/>
+            <a:srgbClr val="0022F2"/>
+          </a:solidFill>
+          <a:ln>
+            <a:solidFill>
+              <a:schemeClr val="tx1"/>
+            </a:solidFill>
+          </a:ln>
+        </p:spPr>
+        <p:style>
+          <a:lnRef idx="2">
+            <a:schemeClr val="accent1">
+              <a:shade val="50000"/>
+            </a:schemeClr>
+          </a:lnRef>
+          <a:fillRef idx="1">
+            <a:schemeClr val="accent1"/>
+          </a:fillRef>
+          <a:effectRef idx="0">
+            <a:schemeClr val="accent1"/>
+          </a:effectRef>
+          <a:fontRef idx="minor">
+            <a:schemeClr val="lt1"/>
+          </a:fontRef>
+        </p:style>
+        <p:txBody>
+          <a:bodyPr rot="0" spcFirstLastPara="0" vertOverflow="overflow" horzOverflow="overflow" vert="horz" wrap="square" lIns="91440" tIns="45720" rIns="91440" bIns="45720" numCol="1" spcCol="0" rtlCol="0" fromWordArt="0" anchor="ctr" anchorCtr="0" forceAA="0" compatLnSpc="1">
+            <a:prstTxWarp prst="textNoShape">
+              <a:avLst/>
+            </a:prstTxWarp>
+            <a:noAutofit/>
+          </a:bodyPr>
+          <a:lstStyle/>
+          <a:p>
+            <a:pPr algn="ctr"/>
+            <a:endParaRPr lang="en-US"/>
+          </a:p>
+        </p:txBody>
+      </p:sp>
+      <p:sp>
+        <p:nvSpPr>
+          <p:cNvPr id="61" name="Rectangle 60">
+            <a:extLst>
+              <a:ext uri="{FF2B5EF4-FFF2-40B4-BE49-F238E27FC236}">
+                <a16:creationId xmlns:a16="http://schemas.microsoft.com/office/drawing/2014/main" id="{CFB72972-4E94-4B4A-BBFF-25893F8B8199}"/>
+              </a:ext>
+            </a:extLst>
+          </p:cNvPr>
+          <p:cNvSpPr/>
+          <p:nvPr/>
+        </p:nvSpPr>
+        <p:spPr>
+          <a:xfrm>
+            <a:off x="288602" y="4668530"/>
+            <a:ext cx="159792" cy="159792"/>
+          </a:xfrm>
+          <a:prstGeom prst="rect">
+            <a:avLst/>
+          </a:prstGeom>
+          <a:solidFill>
+            <a:srgbClr val="BA7231"/>
+          </a:solidFill>
+          <a:ln>
+            <a:solidFill>
+              <a:schemeClr val="tx1"/>
+            </a:solidFill>
+          </a:ln>
+        </p:spPr>
+        <p:style>
+          <a:lnRef idx="2">
+            <a:schemeClr val="accent1">
+              <a:shade val="50000"/>
+            </a:schemeClr>
+          </a:lnRef>
+          <a:fillRef idx="1">
+            <a:schemeClr val="accent1"/>
+          </a:fillRef>
+          <a:effectRef idx="0">
+            <a:schemeClr val="accent1"/>
+          </a:effectRef>
+          <a:fontRef idx="minor">
+            <a:schemeClr val="lt1"/>
+          </a:fontRef>
+        </p:style>
+        <p:txBody>
+          <a:bodyPr rot="0" spcFirstLastPara="0" vertOverflow="overflow" horzOverflow="overflow" vert="horz" wrap="square" lIns="91440" tIns="45720" rIns="91440" bIns="45720" numCol="1" spcCol="0" rtlCol="0" fromWordArt="0" anchor="ctr" anchorCtr="0" forceAA="0" compatLnSpc="1">
+            <a:prstTxWarp prst="textNoShape">
+              <a:avLst/>
+            </a:prstTxWarp>
+            <a:noAutofit/>
+          </a:bodyPr>
+          <a:lstStyle/>
+          <a:p>
+            <a:pPr algn="ctr"/>
+            <a:endParaRPr lang="en-US"/>
+          </a:p>
+        </p:txBody>
+      </p:sp>
+      <p:sp>
+        <p:nvSpPr>
+          <p:cNvPr id="62" name="Rectangle 61">
+            <a:extLst>
+              <a:ext uri="{FF2B5EF4-FFF2-40B4-BE49-F238E27FC236}">
+                <a16:creationId xmlns:a16="http://schemas.microsoft.com/office/drawing/2014/main" id="{43051DE9-FFB5-834D-80DB-1C554C7E0842}"/>
+              </a:ext>
+            </a:extLst>
+          </p:cNvPr>
+          <p:cNvSpPr/>
+          <p:nvPr/>
+        </p:nvSpPr>
+        <p:spPr>
+          <a:xfrm>
+            <a:off x="288602" y="5084936"/>
+            <a:ext cx="159792" cy="159792"/>
+          </a:xfrm>
+          <a:prstGeom prst="rect">
+            <a:avLst/>
+          </a:prstGeom>
+          <a:solidFill>
+            <a:srgbClr val="847AAE"/>
+          </a:solidFill>
+          <a:ln>
+            <a:solidFill>
+              <a:schemeClr val="tx1"/>
+            </a:solidFill>
+          </a:ln>
+        </p:spPr>
+        <p:style>
+          <a:lnRef idx="2">
+            <a:schemeClr val="accent1">
+              <a:shade val="50000"/>
+            </a:schemeClr>
+          </a:lnRef>
+          <a:fillRef idx="1">
+            <a:schemeClr val="accent1"/>
+          </a:fillRef>
+          <a:effectRef idx="0">
+            <a:schemeClr val="accent1"/>
+          </a:effectRef>
+          <a:fontRef idx="minor">
+            <a:schemeClr val="lt1"/>
+          </a:fontRef>
+        </p:style>
+        <p:txBody>
+          <a:bodyPr rot="0" spcFirstLastPara="0" vertOverflow="overflow" horzOverflow="overflow" vert="horz" wrap="square" lIns="91440" tIns="45720" rIns="91440" bIns="45720" numCol="1" spcCol="0" rtlCol="0" fromWordArt="0" anchor="ctr" anchorCtr="0" forceAA="0" compatLnSpc="1">
+            <a:prstTxWarp prst="textNoShape">
+              <a:avLst/>
+            </a:prstTxWarp>
+            <a:noAutofit/>
+          </a:bodyPr>
+          <a:lstStyle/>
+          <a:p>
+            <a:pPr algn="ctr"/>
+            <a:endParaRPr lang="en-US"/>
+          </a:p>
+        </p:txBody>
+      </p:sp>
+      <p:sp>
+        <p:nvSpPr>
+          <p:cNvPr id="64" name="Rectangle 63">
+            <a:extLst>
+              <a:ext uri="{FF2B5EF4-FFF2-40B4-BE49-F238E27FC236}">
+                <a16:creationId xmlns:a16="http://schemas.microsoft.com/office/drawing/2014/main" id="{E665266F-AE2C-9942-8DE9-9BCB996399FC}"/>
+              </a:ext>
+            </a:extLst>
+          </p:cNvPr>
+          <p:cNvSpPr/>
+          <p:nvPr/>
+        </p:nvSpPr>
+        <p:spPr>
+          <a:xfrm>
+            <a:off x="910385" y="3416552"/>
+            <a:ext cx="149752" cy="149752"/>
+          </a:xfrm>
+          <a:prstGeom prst="rect">
+            <a:avLst/>
+          </a:prstGeom>
+          <a:solidFill>
+            <a:srgbClr val="4CA62F"/>
           </a:solidFill>
           <a:ln>
             <a:noFill/>
@@ -4829,7 +5020,12 @@
           </a:fontRef>
         </p:style>
         <p:txBody>
-          <a:bodyPr rtlCol="0" anchor="ctr"/>
+          <a:bodyPr rot="0" spcFirstLastPara="0" vertOverflow="overflow" horzOverflow="overflow" vert="horz" wrap="square" lIns="91440" tIns="45720" rIns="91440" bIns="45720" numCol="1" spcCol="0" rtlCol="0" fromWordArt="0" anchor="ctr" anchorCtr="0" forceAA="0" compatLnSpc="1">
+            <a:prstTxWarp prst="textNoShape">
+              <a:avLst/>
+            </a:prstTxWarp>
+            <a:noAutofit/>
+          </a:bodyPr>
           <a:lstStyle/>
           <a:p>
             <a:pPr algn="ctr"/>
@@ -4839,38 +5035,400 @@
       </p:sp>
       <p:sp>
         <p:nvSpPr>
-          <p:cNvPr id="2" name="TextBox 1">
+          <p:cNvPr id="65" name="Rectangle 64">
             <a:extLst>
               <a:ext uri="{FF2B5EF4-FFF2-40B4-BE49-F238E27FC236}">
-                <a16:creationId xmlns:a16="http://schemas.microsoft.com/office/drawing/2014/main" id="{0D30CF8A-8DEA-124E-B072-BE6D47B5B622}"/>
+                <a16:creationId xmlns:a16="http://schemas.microsoft.com/office/drawing/2014/main" id="{E24AC2C9-6761-E049-85E8-F2B2518BB1D5}"/>
               </a:ext>
             </a:extLst>
           </p:cNvPr>
-          <p:cNvSpPr txBox="1"/>
+          <p:cNvSpPr/>
           <p:nvPr/>
         </p:nvSpPr>
         <p:spPr>
           <a:xfrm>
-            <a:off x="448394" y="345448"/>
-            <a:ext cx="329938" cy="553998"/>
+            <a:off x="2026170" y="3416552"/>
+            <a:ext cx="149752" cy="149752"/>
           </a:xfrm>
           <a:prstGeom prst="rect">
             <a:avLst/>
           </a:prstGeom>
-          <a:noFill/>
+          <a:solidFill>
+            <a:srgbClr val="0022F2"/>
+          </a:solidFill>
+          <a:ln>
+            <a:noFill/>
+          </a:ln>
         </p:spPr>
-        <p:txBody>
-          <a:bodyPr wrap="square" rtlCol="0">
-            <a:spAutoFit/>
+        <p:style>
+          <a:lnRef idx="2">
+            <a:schemeClr val="accent1">
+              <a:shade val="50000"/>
+            </a:schemeClr>
+          </a:lnRef>
+          <a:fillRef idx="1">
+            <a:schemeClr val="accent1"/>
+          </a:fillRef>
+          <a:effectRef idx="0">
+            <a:schemeClr val="accent1"/>
+          </a:effectRef>
+          <a:fontRef idx="minor">
+            <a:schemeClr val="lt1"/>
+          </a:fontRef>
+        </p:style>
+        <p:txBody>
+          <a:bodyPr rot="0" spcFirstLastPara="0" vertOverflow="overflow" horzOverflow="overflow" vert="horz" wrap="square" lIns="91440" tIns="45720" rIns="91440" bIns="45720" numCol="1" spcCol="0" rtlCol="0" fromWordArt="0" anchor="ctr" anchorCtr="0" forceAA="0" compatLnSpc="1">
+            <a:prstTxWarp prst="textNoShape">
+              <a:avLst/>
+            </a:prstTxWarp>
+            <a:noAutofit/>
           </a:bodyPr>
           <a:lstStyle/>
           <a:p>
-            <a:r>
-              <a:rPr lang="en-US" sz="3000" dirty="0">
-                <a:latin typeface="Times" pitchFamily="2" charset="0"/>
-              </a:rPr>
-              <a:t>W</a:t>
-            </a:r>
+            <a:pPr algn="ctr"/>
+            <a:endParaRPr lang="en-US"/>
+          </a:p>
+        </p:txBody>
+      </p:sp>
+      <p:sp>
+        <p:nvSpPr>
+          <p:cNvPr id="66" name="Rectangle 65">
+            <a:extLst>
+              <a:ext uri="{FF2B5EF4-FFF2-40B4-BE49-F238E27FC236}">
+                <a16:creationId xmlns:a16="http://schemas.microsoft.com/office/drawing/2014/main" id="{4DB78C68-E128-5D48-BEED-CDD40F43CAFE}"/>
+              </a:ext>
+            </a:extLst>
+          </p:cNvPr>
+          <p:cNvSpPr/>
+          <p:nvPr/>
+        </p:nvSpPr>
+        <p:spPr>
+          <a:xfrm>
+            <a:off x="1458365" y="3416552"/>
+            <a:ext cx="149752" cy="149752"/>
+          </a:xfrm>
+          <a:prstGeom prst="rect">
+            <a:avLst/>
+          </a:prstGeom>
+          <a:solidFill>
+            <a:srgbClr val="FF0000"/>
+          </a:solidFill>
+          <a:ln>
+            <a:noFill/>
+          </a:ln>
+        </p:spPr>
+        <p:style>
+          <a:lnRef idx="2">
+            <a:schemeClr val="accent1">
+              <a:shade val="50000"/>
+            </a:schemeClr>
+          </a:lnRef>
+          <a:fillRef idx="1">
+            <a:schemeClr val="accent1"/>
+          </a:fillRef>
+          <a:effectRef idx="0">
+            <a:schemeClr val="accent1"/>
+          </a:effectRef>
+          <a:fontRef idx="minor">
+            <a:schemeClr val="lt1"/>
+          </a:fontRef>
+        </p:style>
+        <p:txBody>
+          <a:bodyPr rot="0" spcFirstLastPara="0" vertOverflow="overflow" horzOverflow="overflow" vert="horz" wrap="square" lIns="91440" tIns="45720" rIns="91440" bIns="45720" numCol="1" spcCol="0" rtlCol="0" fromWordArt="0" anchor="ctr" anchorCtr="0" forceAA="0" compatLnSpc="1">
+            <a:prstTxWarp prst="textNoShape">
+              <a:avLst/>
+            </a:prstTxWarp>
+            <a:noAutofit/>
+          </a:bodyPr>
+          <a:lstStyle/>
+          <a:p>
+            <a:pPr algn="ctr"/>
+            <a:endParaRPr lang="en-US"/>
+          </a:p>
+        </p:txBody>
+      </p:sp>
+      <p:sp>
+        <p:nvSpPr>
+          <p:cNvPr id="12" name="Oval 11">
+            <a:extLst>
+              <a:ext uri="{FF2B5EF4-FFF2-40B4-BE49-F238E27FC236}">
+                <a16:creationId xmlns:a16="http://schemas.microsoft.com/office/drawing/2014/main" id="{06F09D02-CECB-5047-A27C-7FA1D0D05EA4}"/>
+              </a:ext>
+            </a:extLst>
+          </p:cNvPr>
+          <p:cNvSpPr/>
+          <p:nvPr/>
+        </p:nvSpPr>
+        <p:spPr>
+          <a:xfrm>
+            <a:off x="1195574" y="1485749"/>
+            <a:ext cx="106209" cy="106209"/>
+          </a:xfrm>
+          <a:prstGeom prst="ellipse">
+            <a:avLst/>
+          </a:prstGeom>
+          <a:solidFill>
+            <a:srgbClr val="0022F2"/>
+          </a:solidFill>
+          <a:ln>
+            <a:noFill/>
+          </a:ln>
+        </p:spPr>
+        <p:style>
+          <a:lnRef idx="2">
+            <a:schemeClr val="accent1">
+              <a:shade val="50000"/>
+            </a:schemeClr>
+          </a:lnRef>
+          <a:fillRef idx="1">
+            <a:schemeClr val="accent1"/>
+          </a:fillRef>
+          <a:effectRef idx="0">
+            <a:schemeClr val="accent1"/>
+          </a:effectRef>
+          <a:fontRef idx="minor">
+            <a:schemeClr val="lt1"/>
+          </a:fontRef>
+        </p:style>
+        <p:txBody>
+          <a:bodyPr rot="0" spcFirstLastPara="0" vertOverflow="overflow" horzOverflow="overflow" vert="horz" wrap="square" lIns="91440" tIns="45720" rIns="91440" bIns="45720" numCol="1" spcCol="0" rtlCol="0" fromWordArt="0" anchor="ctr" anchorCtr="0" forceAA="0" compatLnSpc="1">
+            <a:prstTxWarp prst="textNoShape">
+              <a:avLst/>
+            </a:prstTxWarp>
+            <a:noAutofit/>
+          </a:bodyPr>
+          <a:lstStyle/>
+          <a:p>
+            <a:pPr algn="ctr"/>
+            <a:endParaRPr lang="en-US"/>
+          </a:p>
+        </p:txBody>
+      </p:sp>
+      <p:sp>
+        <p:nvSpPr>
+          <p:cNvPr id="68" name="Oval 67">
+            <a:extLst>
+              <a:ext uri="{FF2B5EF4-FFF2-40B4-BE49-F238E27FC236}">
+                <a16:creationId xmlns:a16="http://schemas.microsoft.com/office/drawing/2014/main" id="{BD2372F7-4468-5343-848D-1C1C51E9E34D}"/>
+              </a:ext>
+            </a:extLst>
+          </p:cNvPr>
+          <p:cNvSpPr/>
+          <p:nvPr/>
+        </p:nvSpPr>
+        <p:spPr>
+          <a:xfrm>
+            <a:off x="1677097" y="1329963"/>
+            <a:ext cx="101171" cy="101171"/>
+          </a:xfrm>
+          <a:prstGeom prst="ellipse">
+            <a:avLst/>
+          </a:prstGeom>
+          <a:solidFill>
+            <a:srgbClr val="FF0000"/>
+          </a:solidFill>
+          <a:ln>
+            <a:noFill/>
+          </a:ln>
+        </p:spPr>
+        <p:style>
+          <a:lnRef idx="2">
+            <a:schemeClr val="accent1">
+              <a:shade val="50000"/>
+            </a:schemeClr>
+          </a:lnRef>
+          <a:fillRef idx="1">
+            <a:schemeClr val="accent1"/>
+          </a:fillRef>
+          <a:effectRef idx="0">
+            <a:schemeClr val="accent1"/>
+          </a:effectRef>
+          <a:fontRef idx="minor">
+            <a:schemeClr val="lt1"/>
+          </a:fontRef>
+        </p:style>
+        <p:txBody>
+          <a:bodyPr rot="0" spcFirstLastPara="0" vertOverflow="overflow" horzOverflow="overflow" vert="horz" wrap="square" lIns="91440" tIns="45720" rIns="91440" bIns="45720" numCol="1" spcCol="0" rtlCol="0" fromWordArt="0" anchor="ctr" anchorCtr="0" forceAA="0" compatLnSpc="1">
+            <a:prstTxWarp prst="textNoShape">
+              <a:avLst/>
+            </a:prstTxWarp>
+            <a:noAutofit/>
+          </a:bodyPr>
+          <a:lstStyle/>
+          <a:p>
+            <a:pPr algn="ctr"/>
+            <a:endParaRPr lang="en-US"/>
+          </a:p>
+        </p:txBody>
+      </p:sp>
+      <p:sp>
+        <p:nvSpPr>
+          <p:cNvPr id="69" name="Oval 68">
+            <a:extLst>
+              <a:ext uri="{FF2B5EF4-FFF2-40B4-BE49-F238E27FC236}">
+                <a16:creationId xmlns:a16="http://schemas.microsoft.com/office/drawing/2014/main" id="{E57033BA-90E7-F941-9E54-9670E7B1278F}"/>
+              </a:ext>
+            </a:extLst>
+          </p:cNvPr>
+          <p:cNvSpPr/>
+          <p:nvPr/>
+        </p:nvSpPr>
+        <p:spPr>
+          <a:xfrm>
+            <a:off x="2015355" y="3827840"/>
+            <a:ext cx="171382" cy="171382"/>
+          </a:xfrm>
+          <a:prstGeom prst="ellipse">
+            <a:avLst/>
+          </a:prstGeom>
+          <a:solidFill>
+            <a:srgbClr val="0022F2"/>
+          </a:solidFill>
+          <a:ln>
+            <a:noFill/>
+          </a:ln>
+        </p:spPr>
+        <p:style>
+          <a:lnRef idx="2">
+            <a:schemeClr val="accent1">
+              <a:shade val="50000"/>
+            </a:schemeClr>
+          </a:lnRef>
+          <a:fillRef idx="1">
+            <a:schemeClr val="accent1"/>
+          </a:fillRef>
+          <a:effectRef idx="0">
+            <a:schemeClr val="accent1"/>
+          </a:effectRef>
+          <a:fontRef idx="minor">
+            <a:schemeClr val="lt1"/>
+          </a:fontRef>
+        </p:style>
+        <p:txBody>
+          <a:bodyPr rot="0" spcFirstLastPara="0" vertOverflow="overflow" horzOverflow="overflow" vert="horz" wrap="square" lIns="91440" tIns="45720" rIns="91440" bIns="45720" numCol="1" spcCol="0" rtlCol="0" fromWordArt="0" anchor="ctr" anchorCtr="0" forceAA="0" compatLnSpc="1">
+            <a:prstTxWarp prst="textNoShape">
+              <a:avLst/>
+            </a:prstTxWarp>
+            <a:noAutofit/>
+          </a:bodyPr>
+          <a:lstStyle/>
+          <a:p>
+            <a:pPr algn="ctr"/>
+            <a:endParaRPr lang="en-US"/>
+          </a:p>
+        </p:txBody>
+      </p:sp>
+      <p:sp>
+        <p:nvSpPr>
+          <p:cNvPr id="70" name="Oval 69">
+            <a:extLst>
+              <a:ext uri="{FF2B5EF4-FFF2-40B4-BE49-F238E27FC236}">
+                <a16:creationId xmlns:a16="http://schemas.microsoft.com/office/drawing/2014/main" id="{1E9ADF8E-8C0C-8947-A72F-AF9692FC1F5D}"/>
+              </a:ext>
+            </a:extLst>
+          </p:cNvPr>
+          <p:cNvSpPr/>
+          <p:nvPr/>
+        </p:nvSpPr>
+        <p:spPr>
+          <a:xfrm>
+            <a:off x="1443283" y="3823573"/>
+            <a:ext cx="179916" cy="179916"/>
+          </a:xfrm>
+          <a:prstGeom prst="ellipse">
+            <a:avLst/>
+          </a:prstGeom>
+          <a:solidFill>
+            <a:srgbClr val="FF0000"/>
+          </a:solidFill>
+          <a:ln>
+            <a:noFill/>
+          </a:ln>
+        </p:spPr>
+        <p:style>
+          <a:lnRef idx="2">
+            <a:schemeClr val="accent1">
+              <a:shade val="50000"/>
+            </a:schemeClr>
+          </a:lnRef>
+          <a:fillRef idx="1">
+            <a:schemeClr val="accent1"/>
+          </a:fillRef>
+          <a:effectRef idx="0">
+            <a:schemeClr val="accent1"/>
+          </a:effectRef>
+          <a:fontRef idx="minor">
+            <a:schemeClr val="lt1"/>
+          </a:fontRef>
+        </p:style>
+        <p:txBody>
+          <a:bodyPr rot="0" spcFirstLastPara="0" vertOverflow="overflow" horzOverflow="overflow" vert="horz" wrap="square" lIns="91440" tIns="45720" rIns="91440" bIns="45720" numCol="1" spcCol="0" rtlCol="0" fromWordArt="0" anchor="ctr" anchorCtr="0" forceAA="0" compatLnSpc="1">
+            <a:prstTxWarp prst="textNoShape">
+              <a:avLst/>
+            </a:prstTxWarp>
+            <a:noAutofit/>
+          </a:bodyPr>
+          <a:lstStyle/>
+          <a:p>
+            <a:pPr algn="ctr"/>
+            <a:endParaRPr lang="en-US"/>
+          </a:p>
+        </p:txBody>
+      </p:sp>
+      <p:sp>
+        <p:nvSpPr>
+          <p:cNvPr id="71" name="Oval 70">
+            <a:extLst>
+              <a:ext uri="{FF2B5EF4-FFF2-40B4-BE49-F238E27FC236}">
+                <a16:creationId xmlns:a16="http://schemas.microsoft.com/office/drawing/2014/main" id="{5DBC6BC6-0548-5D42-BF25-451754E6AE8C}"/>
+              </a:ext>
+            </a:extLst>
+          </p:cNvPr>
+          <p:cNvSpPr/>
+          <p:nvPr/>
+        </p:nvSpPr>
+        <p:spPr>
+          <a:xfrm>
+            <a:off x="895303" y="3823573"/>
+            <a:ext cx="179916" cy="179916"/>
+          </a:xfrm>
+          <a:prstGeom prst="ellipse">
+            <a:avLst/>
+          </a:prstGeom>
+          <a:solidFill>
+            <a:srgbClr val="74FA4C"/>
+          </a:solidFill>
+          <a:ln>
+            <a:noFill/>
+          </a:ln>
+        </p:spPr>
+        <p:style>
+          <a:lnRef idx="2">
+            <a:schemeClr val="accent1">
+              <a:shade val="50000"/>
+            </a:schemeClr>
+          </a:lnRef>
+          <a:fillRef idx="1">
+            <a:schemeClr val="accent1"/>
+          </a:fillRef>
+          <a:effectRef idx="0">
+            <a:schemeClr val="accent1"/>
+          </a:effectRef>
+          <a:fontRef idx="minor">
+            <a:schemeClr val="lt1"/>
+          </a:fontRef>
+        </p:style>
+        <p:txBody>
+          <a:bodyPr rot="0" spcFirstLastPara="0" vertOverflow="overflow" horzOverflow="overflow" vert="horz" wrap="square" lIns="91440" tIns="45720" rIns="91440" bIns="45720" numCol="1" spcCol="0" rtlCol="0" fromWordArt="0" anchor="ctr" anchorCtr="0" forceAA="0" compatLnSpc="1">
+            <a:prstTxWarp prst="textNoShape">
+              <a:avLst/>
+            </a:prstTxWarp>
+            <a:noAutofit/>
+          </a:bodyPr>
+          <a:lstStyle/>
+          <a:p>
+            <a:pPr algn="ctr"/>
+            <a:endParaRPr lang="en-US"/>
           </a:p>
         </p:txBody>
       </p:sp>

</xml_diff>